<commit_message>
added initial questions doc
</commit_message>
<xml_diff>
--- a/DrinkandBeHappy_AY.pptx
+++ b/DrinkandBeHappy_AY.pptx
@@ -5,7 +5,7 @@
     <p:sldMasterId id="2147483648" r:id="rId1"/>
   </p:sldMasterIdLst>
   <p:notesMasterIdLst>
-    <p:notesMasterId r:id="rId14"/>
+    <p:notesMasterId r:id="rId17"/>
   </p:notesMasterIdLst>
   <p:sldIdLst>
     <p:sldId id="263" r:id="rId2"/>
@@ -20,6 +20,9 @@
     <p:sldId id="267" r:id="rId11"/>
     <p:sldId id="268" r:id="rId12"/>
     <p:sldId id="262" r:id="rId13"/>
+    <p:sldId id="274" r:id="rId14"/>
+    <p:sldId id="275" r:id="rId15"/>
+    <p:sldId id="276" r:id="rId16"/>
   </p:sldIdLst>
   <p:sldSz cx="12192000" cy="6858000"/>
   <p:notesSz cx="6858000" cy="9144000"/>
@@ -5616,6 +5619,396 @@
 </p:sld>
 </file>
 
+<file path=ppt/slides/slide13.xml><?xml version="1.0" encoding="utf-8"?>
+<p:sld xmlns:a="http://schemas.openxmlformats.org/drawingml/2006/main" xmlns:r="http://schemas.openxmlformats.org/officeDocument/2006/relationships" xmlns:p="http://schemas.openxmlformats.org/presentationml/2006/main">
+  <p:cSld>
+    <p:spTree>
+      <p:nvGrpSpPr>
+        <p:cNvPr id="1" name=""/>
+        <p:cNvGrpSpPr/>
+        <p:nvPr/>
+      </p:nvGrpSpPr>
+      <p:grpSpPr>
+        <a:xfrm>
+          <a:off x="0" y="0"/>
+          <a:ext cx="0" cy="0"/>
+          <a:chOff x="0" y="0"/>
+          <a:chExt cx="0" cy="0"/>
+        </a:xfrm>
+      </p:grpSpPr>
+      <p:sp>
+        <p:nvSpPr>
+          <p:cNvPr id="2" name="Title 1">
+            <a:extLst>
+              <a:ext uri="{FF2B5EF4-FFF2-40B4-BE49-F238E27FC236}">
+                <a16:creationId xmlns:a16="http://schemas.microsoft.com/office/drawing/2014/main" id="{C2D1F501-644D-4E69-9113-C701BB8C3ECE}"/>
+              </a:ext>
+            </a:extLst>
+          </p:cNvPr>
+          <p:cNvSpPr>
+            <a:spLocks noGrp="1"/>
+          </p:cNvSpPr>
+          <p:nvPr>
+            <p:ph type="title"/>
+          </p:nvPr>
+        </p:nvSpPr>
+        <p:spPr>
+          <a:xfrm>
+            <a:off x="839788" y="365125"/>
+            <a:ext cx="4646612" cy="1325563"/>
+          </a:xfrm>
+        </p:spPr>
+        <p:txBody>
+          <a:bodyPr/>
+          <a:lstStyle/>
+          <a:p>
+            <a:r>
+              <a:rPr lang="en-US" dirty="0"/>
+              <a:t>WHISKERS</a:t>
+            </a:r>
+          </a:p>
+        </p:txBody>
+      </p:sp>
+      <p:pic>
+        <p:nvPicPr>
+          <p:cNvPr id="3" name="Picture 2">
+            <a:extLst>
+              <a:ext uri="{FF2B5EF4-FFF2-40B4-BE49-F238E27FC236}">
+                <a16:creationId xmlns:a16="http://schemas.microsoft.com/office/drawing/2014/main" id="{A6B6B4DC-B390-4B98-B3F1-A0284A4AD3CF}"/>
+              </a:ext>
+            </a:extLst>
+          </p:cNvPr>
+          <p:cNvPicPr>
+            <a:picLocks noChangeAspect="1"/>
+          </p:cNvPicPr>
+          <p:nvPr/>
+        </p:nvPicPr>
+        <p:blipFill>
+          <a:blip r:embed="rId2"/>
+          <a:stretch>
+            <a:fillRect/>
+          </a:stretch>
+        </p:blipFill>
+        <p:spPr>
+          <a:xfrm>
+            <a:off x="599440" y="1402887"/>
+            <a:ext cx="7212969" cy="4794714"/>
+          </a:xfrm>
+          <a:prstGeom prst="rect">
+            <a:avLst/>
+          </a:prstGeom>
+        </p:spPr>
+      </p:pic>
+    </p:spTree>
+    <p:extLst>
+      <p:ext uri="{BB962C8B-B14F-4D97-AF65-F5344CB8AC3E}">
+        <p14:creationId xmlns:p14="http://schemas.microsoft.com/office/powerpoint/2010/main" val="3688275955"/>
+      </p:ext>
+    </p:extLst>
+  </p:cSld>
+  <p:clrMapOvr>
+    <a:masterClrMapping/>
+  </p:clrMapOvr>
+</p:sld>
+</file>
+
+<file path=ppt/slides/slide14.xml><?xml version="1.0" encoding="utf-8"?>
+<p:sld xmlns:a="http://schemas.openxmlformats.org/drawingml/2006/main" xmlns:r="http://schemas.openxmlformats.org/officeDocument/2006/relationships" xmlns:p="http://schemas.openxmlformats.org/presentationml/2006/main">
+  <p:cSld>
+    <p:spTree>
+      <p:nvGrpSpPr>
+        <p:cNvPr id="1" name=""/>
+        <p:cNvGrpSpPr/>
+        <p:nvPr/>
+      </p:nvGrpSpPr>
+      <p:grpSpPr>
+        <a:xfrm>
+          <a:off x="0" y="0"/>
+          <a:ext cx="0" cy="0"/>
+          <a:chOff x="0" y="0"/>
+          <a:chExt cx="0" cy="0"/>
+        </a:xfrm>
+      </p:grpSpPr>
+      <p:sp>
+        <p:nvSpPr>
+          <p:cNvPr id="2" name="Title 1">
+            <a:extLst>
+              <a:ext uri="{FF2B5EF4-FFF2-40B4-BE49-F238E27FC236}">
+                <a16:creationId xmlns:a16="http://schemas.microsoft.com/office/drawing/2014/main" id="{C2D1F501-644D-4E69-9113-C701BB8C3ECE}"/>
+              </a:ext>
+            </a:extLst>
+          </p:cNvPr>
+          <p:cNvSpPr>
+            <a:spLocks noGrp="1"/>
+          </p:cNvSpPr>
+          <p:nvPr>
+            <p:ph type="title"/>
+          </p:nvPr>
+        </p:nvSpPr>
+        <p:spPr>
+          <a:xfrm>
+            <a:off x="839788" y="365125"/>
+            <a:ext cx="6668452" cy="1325563"/>
+          </a:xfrm>
+        </p:spPr>
+        <p:txBody>
+          <a:bodyPr/>
+          <a:lstStyle/>
+          <a:p>
+            <a:r>
+              <a:rPr lang="en-US" dirty="0"/>
+              <a:t>HAPPINESS IS A WARM GUN</a:t>
+            </a:r>
+          </a:p>
+        </p:txBody>
+      </p:sp>
+      <p:pic>
+        <p:nvPicPr>
+          <p:cNvPr id="4" name="Picture 3">
+            <a:extLst>
+              <a:ext uri="{FF2B5EF4-FFF2-40B4-BE49-F238E27FC236}">
+                <a16:creationId xmlns:a16="http://schemas.microsoft.com/office/drawing/2014/main" id="{DDB04923-39EB-4938-9E91-4BAEC6768B38}"/>
+              </a:ext>
+            </a:extLst>
+          </p:cNvPr>
+          <p:cNvPicPr>
+            <a:picLocks noChangeAspect="1"/>
+          </p:cNvPicPr>
+          <p:nvPr/>
+        </p:nvPicPr>
+        <p:blipFill>
+          <a:blip r:embed="rId2"/>
+          <a:stretch>
+            <a:fillRect/>
+          </a:stretch>
+        </p:blipFill>
+        <p:spPr>
+          <a:xfrm>
+            <a:off x="753756" y="1690688"/>
+            <a:ext cx="9832963" cy="4573969"/>
+          </a:xfrm>
+          <a:prstGeom prst="rect">
+            <a:avLst/>
+          </a:prstGeom>
+        </p:spPr>
+      </p:pic>
+    </p:spTree>
+    <p:extLst>
+      <p:ext uri="{BB962C8B-B14F-4D97-AF65-F5344CB8AC3E}">
+        <p14:creationId xmlns:p14="http://schemas.microsoft.com/office/powerpoint/2010/main" val="2836160905"/>
+      </p:ext>
+    </p:extLst>
+  </p:cSld>
+  <p:clrMapOvr>
+    <a:masterClrMapping/>
+  </p:clrMapOvr>
+</p:sld>
+</file>
+
+<file path=ppt/slides/slide15.xml><?xml version="1.0" encoding="utf-8"?>
+<p:sld xmlns:a="http://schemas.openxmlformats.org/drawingml/2006/main" xmlns:r="http://schemas.openxmlformats.org/officeDocument/2006/relationships" xmlns:p="http://schemas.openxmlformats.org/presentationml/2006/main">
+  <p:cSld>
+    <p:spTree>
+      <p:nvGrpSpPr>
+        <p:cNvPr id="1" name=""/>
+        <p:cNvGrpSpPr/>
+        <p:nvPr/>
+      </p:nvGrpSpPr>
+      <p:grpSpPr>
+        <a:xfrm>
+          <a:off x="0" y="0"/>
+          <a:ext cx="0" cy="0"/>
+          <a:chOff x="0" y="0"/>
+          <a:chExt cx="0" cy="0"/>
+        </a:xfrm>
+      </p:grpSpPr>
+      <p:sp>
+        <p:nvSpPr>
+          <p:cNvPr id="2" name="Title 1">
+            <a:extLst>
+              <a:ext uri="{FF2B5EF4-FFF2-40B4-BE49-F238E27FC236}">
+                <a16:creationId xmlns:a16="http://schemas.microsoft.com/office/drawing/2014/main" id="{4096859C-4953-4471-B003-8826552CA288}"/>
+              </a:ext>
+            </a:extLst>
+          </p:cNvPr>
+          <p:cNvSpPr>
+            <a:spLocks noGrp="1"/>
+          </p:cNvSpPr>
+          <p:nvPr>
+            <p:ph type="title"/>
+          </p:nvPr>
+        </p:nvSpPr>
+        <p:spPr/>
+        <p:txBody>
+          <a:bodyPr/>
+          <a:lstStyle/>
+          <a:p>
+            <a:r>
+              <a:rPr lang="en-US" dirty="0"/>
+              <a:t>INITIAL DATA and QUESTIONS</a:t>
+            </a:r>
+          </a:p>
+        </p:txBody>
+      </p:sp>
+      <p:sp>
+        <p:nvSpPr>
+          <p:cNvPr id="3" name="Text Placeholder 2">
+            <a:extLst>
+              <a:ext uri="{FF2B5EF4-FFF2-40B4-BE49-F238E27FC236}">
+                <a16:creationId xmlns:a16="http://schemas.microsoft.com/office/drawing/2014/main" id="{F4A7A130-0720-473C-BD8E-63846BA155AA}"/>
+              </a:ext>
+            </a:extLst>
+          </p:cNvPr>
+          <p:cNvSpPr>
+            <a:spLocks noGrp="1"/>
+          </p:cNvSpPr>
+          <p:nvPr>
+            <p:ph type="body" idx="1"/>
+          </p:nvPr>
+        </p:nvSpPr>
+        <p:spPr/>
+        <p:txBody>
+          <a:bodyPr/>
+          <a:lstStyle/>
+          <a:p>
+            <a:r>
+              <a:rPr lang="en-US" dirty="0"/>
+              <a:t>DATA</a:t>
+            </a:r>
+          </a:p>
+        </p:txBody>
+      </p:sp>
+      <p:sp>
+        <p:nvSpPr>
+          <p:cNvPr id="4" name="Content Placeholder 3">
+            <a:extLst>
+              <a:ext uri="{FF2B5EF4-FFF2-40B4-BE49-F238E27FC236}">
+                <a16:creationId xmlns:a16="http://schemas.microsoft.com/office/drawing/2014/main" id="{23953C53-E4F8-4349-B16E-B6E80AACD019}"/>
+              </a:ext>
+            </a:extLst>
+          </p:cNvPr>
+          <p:cNvSpPr>
+            <a:spLocks noGrp="1"/>
+          </p:cNvSpPr>
+          <p:nvPr>
+            <p:ph sz="half" idx="2"/>
+          </p:nvPr>
+        </p:nvSpPr>
+        <p:spPr/>
+        <p:txBody>
+          <a:bodyPr>
+            <a:normAutofit fontScale="85000" lnSpcReduction="20000"/>
+          </a:bodyPr>
+          <a:lstStyle/>
+          <a:p>
+            <a:r>
+              <a:rPr lang="en-US" dirty="0"/>
+              <a:t>WORLD HAPPINESS REPORT</a:t>
+            </a:r>
+          </a:p>
+          <a:p>
+            <a:r>
+              <a:rPr lang="en-US" dirty="0"/>
+              <a:t>WORLD ALCOHOL CONSUMPTION</a:t>
+            </a:r>
+          </a:p>
+          <a:p>
+            <a:r>
+              <a:rPr lang="en-US" dirty="0"/>
+              <a:t>INCOME INEQUALITY BY COUNTRY</a:t>
+            </a:r>
+          </a:p>
+        </p:txBody>
+      </p:sp>
+      <p:sp>
+        <p:nvSpPr>
+          <p:cNvPr id="5" name="Text Placeholder 4">
+            <a:extLst>
+              <a:ext uri="{FF2B5EF4-FFF2-40B4-BE49-F238E27FC236}">
+                <a16:creationId xmlns:a16="http://schemas.microsoft.com/office/drawing/2014/main" id="{0BE9FC8D-E848-43C5-B313-20B6377C13AC}"/>
+              </a:ext>
+            </a:extLst>
+          </p:cNvPr>
+          <p:cNvSpPr>
+            <a:spLocks noGrp="1"/>
+          </p:cNvSpPr>
+          <p:nvPr>
+            <p:ph type="body" sz="quarter" idx="3"/>
+          </p:nvPr>
+        </p:nvSpPr>
+        <p:spPr/>
+        <p:txBody>
+          <a:bodyPr/>
+          <a:lstStyle/>
+          <a:p>
+            <a:r>
+              <a:rPr lang="en-US" dirty="0"/>
+              <a:t>QUESTIONS?</a:t>
+            </a:r>
+          </a:p>
+        </p:txBody>
+      </p:sp>
+      <p:sp>
+        <p:nvSpPr>
+          <p:cNvPr id="6" name="Content Placeholder 5">
+            <a:extLst>
+              <a:ext uri="{FF2B5EF4-FFF2-40B4-BE49-F238E27FC236}">
+                <a16:creationId xmlns:a16="http://schemas.microsoft.com/office/drawing/2014/main" id="{56124A13-20E0-4F50-A04B-9D2CE13D75D0}"/>
+              </a:ext>
+            </a:extLst>
+          </p:cNvPr>
+          <p:cNvSpPr>
+            <a:spLocks noGrp="1"/>
+          </p:cNvSpPr>
+          <p:nvPr>
+            <p:ph sz="quarter" idx="4"/>
+          </p:nvPr>
+        </p:nvSpPr>
+        <p:spPr/>
+        <p:txBody>
+          <a:bodyPr>
+            <a:normAutofit fontScale="85000" lnSpcReduction="20000"/>
+          </a:bodyPr>
+          <a:lstStyle/>
+          <a:p>
+            <a:r>
+              <a:rPr lang="en-US" dirty="0"/>
+              <a:t>What countries are happiest? And are they located in specific geographic region?</a:t>
+            </a:r>
+          </a:p>
+          <a:p>
+            <a:r>
+              <a:rPr lang="en-US" dirty="0"/>
+              <a:t>What countries consume the least/most amount of alcohol?</a:t>
+            </a:r>
+          </a:p>
+          <a:p>
+            <a:r>
+              <a:rPr lang="en-US" dirty="0"/>
+              <a:t>Which countries suffer from greatest amount of income inequality?</a:t>
+            </a:r>
+          </a:p>
+          <a:p>
+            <a:r>
+              <a:rPr lang="en-US" dirty="0"/>
+              <a:t>How do these three pieces of data correlate? Is income inequality an indicator of happiness? Or is alcohol consumption?</a:t>
+            </a:r>
+          </a:p>
+        </p:txBody>
+      </p:sp>
+    </p:spTree>
+    <p:extLst>
+      <p:ext uri="{BB962C8B-B14F-4D97-AF65-F5344CB8AC3E}">
+        <p14:creationId xmlns:p14="http://schemas.microsoft.com/office/powerpoint/2010/main" val="1883424442"/>
+      </p:ext>
+    </p:extLst>
+  </p:cSld>
+  <p:clrMapOvr>
+    <a:masterClrMapping/>
+  </p:clrMapOvr>
+</p:sld>
+</file>
+
 <file path=ppt/slides/slide2.xml><?xml version="1.0" encoding="utf-8"?>
 <p:sld xmlns:a="http://schemas.openxmlformats.org/drawingml/2006/main" xmlns:r="http://schemas.openxmlformats.org/officeDocument/2006/relationships" xmlns:p="http://schemas.openxmlformats.org/presentationml/2006/main">
   <p:cSld>
@@ -6001,15 +6394,15 @@
         </p:nvSpPr>
         <p:spPr>
           <a:xfrm>
-            <a:off x="5519635" y="1509605"/>
-            <a:ext cx="6096000" cy="1323439"/>
+            <a:off x="3000801" y="1509605"/>
+            <a:ext cx="8614834" cy="3785652"/>
           </a:xfrm>
           <a:prstGeom prst="rect">
             <a:avLst/>
           </a:prstGeom>
         </p:spPr>
         <p:txBody>
-          <a:bodyPr>
+          <a:bodyPr wrap="square">
             <a:spAutoFit/>
           </a:bodyPr>
           <a:lstStyle/>
@@ -6020,18 +6413,113 @@
             </a:pPr>
             <a:r>
               <a:rPr lang="en-US" sz="2000" dirty="0"/>
-              <a:t>The questions you and your group found interesting, and what motivated you to answer them</a:t>
-            </a:r>
-          </a:p>
-          <a:p>
-            <a:pPr marL="285750" lvl="3" indent="-285750">
+              <a:t>What are the most/least happy countries in the world?</a:t>
+            </a:r>
+          </a:p>
+          <a:p>
+            <a:pPr marL="742950" lvl="5" indent="-285750">
               <a:buFont typeface="Arial" panose="020B0604020202020204" pitchFamily="34" charset="0"/>
               <a:buChar char="•"/>
             </a:pPr>
             <a:r>
               <a:rPr lang="en-US" sz="2000" dirty="0"/>
-              <a:t>Where and how you found the data you used to answer these questions</a:t>
-            </a:r>
+              <a:t>What are the components of that score?</a:t>
+            </a:r>
+          </a:p>
+          <a:p>
+            <a:pPr marL="742950" lvl="5" indent="-285750">
+              <a:buFont typeface="Arial" panose="020B0604020202020204" pitchFamily="34" charset="0"/>
+              <a:buChar char="•"/>
+            </a:pPr>
+            <a:r>
+              <a:rPr lang="en-US" sz="2000" dirty="0"/>
+              <a:t>How are they measured?</a:t>
+            </a:r>
+          </a:p>
+          <a:p>
+            <a:pPr marL="742950" lvl="5" indent="-285750">
+              <a:buFont typeface="Arial" panose="020B0604020202020204" pitchFamily="34" charset="0"/>
+              <a:buChar char="•"/>
+            </a:pPr>
+            <a:r>
+              <a:rPr lang="en-US" sz="2000" dirty="0"/>
+              <a:t>Which elements are most impactful/weighted?</a:t>
+            </a:r>
+          </a:p>
+          <a:p>
+            <a:pPr marL="285750" lvl="4" indent="-285750">
+              <a:buFont typeface="Arial" panose="020B0604020202020204" pitchFamily="34" charset="0"/>
+              <a:buChar char="•"/>
+            </a:pPr>
+            <a:r>
+              <a:rPr lang="en-US" sz="2000" dirty="0"/>
+              <a:t>Which countries have the most/least alcohol consumption?</a:t>
+            </a:r>
+          </a:p>
+          <a:p>
+            <a:pPr marL="742950" lvl="5" indent="-285750">
+              <a:buFont typeface="Arial" panose="020B0604020202020204" pitchFamily="34" charset="0"/>
+              <a:buChar char="•"/>
+            </a:pPr>
+            <a:r>
+              <a:rPr lang="en-US" sz="2000" dirty="0"/>
+              <a:t>Is it specific to a region/continent/sub-continent?</a:t>
+            </a:r>
+          </a:p>
+          <a:p>
+            <a:pPr marL="742950" lvl="5" indent="-285750">
+              <a:buFont typeface="Arial" panose="020B0604020202020204" pitchFamily="34" charset="0"/>
+              <a:buChar char="•"/>
+            </a:pPr>
+            <a:r>
+              <a:rPr lang="en-US" sz="2000" dirty="0"/>
+              <a:t>Do countries have preferences for wine/beer/spirits?</a:t>
+            </a:r>
+          </a:p>
+          <a:p>
+            <a:pPr marL="285750" lvl="4" indent="-285750">
+              <a:buFont typeface="Arial" panose="020B0604020202020204" pitchFamily="34" charset="0"/>
+              <a:buChar char="•"/>
+            </a:pPr>
+            <a:r>
+              <a:rPr lang="en-US" sz="2000" dirty="0"/>
+              <a:t>Which countries have the most/least income inequality?</a:t>
+            </a:r>
+          </a:p>
+          <a:p>
+            <a:pPr marL="742950" lvl="5" indent="-285750">
+              <a:buFont typeface="Arial" panose="020B0604020202020204" pitchFamily="34" charset="0"/>
+              <a:buChar char="•"/>
+            </a:pPr>
+            <a:r>
+              <a:rPr lang="en-US" sz="2000" dirty="0"/>
+              <a:t>Do these countries have similar governmental policies?</a:t>
+            </a:r>
+          </a:p>
+          <a:p>
+            <a:pPr marL="742950" lvl="5" indent="-285750">
+              <a:buFont typeface="Arial" panose="020B0604020202020204" pitchFamily="34" charset="0"/>
+              <a:buChar char="•"/>
+            </a:pPr>
+            <a:r>
+              <a:rPr lang="en-US" sz="2000" dirty="0"/>
+              <a:t>Are they considered developed or developing nations?</a:t>
+            </a:r>
+          </a:p>
+          <a:p>
+            <a:pPr marL="285750" lvl="4" indent="-285750">
+              <a:buFont typeface="Arial" panose="020B0604020202020204" pitchFamily="34" charset="0"/>
+              <a:buChar char="•"/>
+            </a:pPr>
+            <a:r>
+              <a:rPr lang="en-US" sz="2000" dirty="0"/>
+              <a:t>Is either income inequality or alcohol consumption a potential indicator of happiness a country’s </a:t>
+            </a:r>
+            <a:r>
+              <a:rPr lang="en-US" sz="2000"/>
+              <a:t>happiness?</a:t>
+            </a:r>
+            <a:endParaRPr lang="en-US" sz="2000" dirty="0"/>
           </a:p>
         </p:txBody>
       </p:sp>

</xml_diff>

<commit_message>
added data exploration and analysis slides in powerpoint DrinkAndBeHappy
</commit_message>
<xml_diff>
--- a/DrinkandBeHappy_AY.pptx
+++ b/DrinkandBeHappy_AY.pptx
@@ -5,7 +5,7 @@
     <p:sldMasterId id="2147483648" r:id="rId1"/>
   </p:sldMasterIdLst>
   <p:notesMasterIdLst>
-    <p:notesMasterId r:id="rId14"/>
+    <p:notesMasterId r:id="rId16"/>
   </p:notesMasterIdLst>
   <p:sldIdLst>
     <p:sldId id="263" r:id="rId2"/>
@@ -13,13 +13,15 @@
     <p:sldId id="270" r:id="rId4"/>
     <p:sldId id="273" r:id="rId5"/>
     <p:sldId id="264" r:id="rId6"/>
-    <p:sldId id="272" r:id="rId7"/>
-    <p:sldId id="271" r:id="rId8"/>
-    <p:sldId id="265" r:id="rId9"/>
-    <p:sldId id="266" r:id="rId10"/>
-    <p:sldId id="267" r:id="rId11"/>
-    <p:sldId id="268" r:id="rId12"/>
-    <p:sldId id="262" r:id="rId13"/>
+    <p:sldId id="265" r:id="rId7"/>
+    <p:sldId id="272" r:id="rId8"/>
+    <p:sldId id="274" r:id="rId9"/>
+    <p:sldId id="275" r:id="rId10"/>
+    <p:sldId id="271" r:id="rId11"/>
+    <p:sldId id="266" r:id="rId12"/>
+    <p:sldId id="267" r:id="rId13"/>
+    <p:sldId id="268" r:id="rId14"/>
+    <p:sldId id="262" r:id="rId15"/>
   </p:sldIdLst>
   <p:sldSz cx="12192000" cy="6858000"/>
   <p:notesSz cx="6858000" cy="9144000"/>
@@ -4381,6 +4383,1484 @@
           </a:p>
         </p:txBody>
       </p:sp>
+      <p:grpSp>
+        <p:nvGrpSpPr>
+          <p:cNvPr id="2" name="Group 1">
+            <a:extLst>
+              <a:ext uri="{FF2B5EF4-FFF2-40B4-BE49-F238E27FC236}">
+                <a16:creationId xmlns:a16="http://schemas.microsoft.com/office/drawing/2014/main" id="{0003F93F-024F-402C-9760-B3A204C64DF1}"/>
+              </a:ext>
+            </a:extLst>
+          </p:cNvPr>
+          <p:cNvGrpSpPr/>
+          <p:nvPr/>
+        </p:nvGrpSpPr>
+        <p:grpSpPr>
+          <a:xfrm>
+            <a:off x="-1" y="0"/>
+            <a:ext cx="12165566" cy="6858000"/>
+            <a:chOff x="-1" y="0"/>
+            <a:chExt cx="12165566" cy="6858000"/>
+          </a:xfrm>
+        </p:grpSpPr>
+        <p:sp>
+          <p:nvSpPr>
+            <p:cNvPr id="14" name="Rectangle 13">
+              <a:extLst>
+                <a:ext uri="{FF2B5EF4-FFF2-40B4-BE49-F238E27FC236}">
+                  <a16:creationId xmlns:a16="http://schemas.microsoft.com/office/drawing/2014/main" id="{33E5F303-EAC6-47BA-BC08-2AA48388F971}"/>
+                </a:ext>
+              </a:extLst>
+            </p:cNvPr>
+            <p:cNvSpPr/>
+            <p:nvPr/>
+          </p:nvSpPr>
+          <p:spPr>
+            <a:xfrm>
+              <a:off x="1006777" y="0"/>
+              <a:ext cx="1830655" cy="6858000"/>
+            </a:xfrm>
+            <a:prstGeom prst="rect">
+              <a:avLst/>
+            </a:prstGeom>
+            <a:solidFill>
+              <a:srgbClr val="7EA861"/>
+            </a:solidFill>
+            <a:ln>
+              <a:solidFill>
+                <a:srgbClr val="7EA861"/>
+              </a:solidFill>
+            </a:ln>
+          </p:spPr>
+          <p:style>
+            <a:lnRef idx="2">
+              <a:schemeClr val="accent1">
+                <a:shade val="50000"/>
+              </a:schemeClr>
+            </a:lnRef>
+            <a:fillRef idx="1">
+              <a:schemeClr val="accent1"/>
+            </a:fillRef>
+            <a:effectRef idx="0">
+              <a:schemeClr val="accent1"/>
+            </a:effectRef>
+            <a:fontRef idx="minor">
+              <a:schemeClr val="lt1"/>
+            </a:fontRef>
+          </p:style>
+          <p:txBody>
+            <a:bodyPr rtlCol="0" anchor="ctr"/>
+            <a:lstStyle/>
+            <a:p>
+              <a:pPr algn="ctr"/>
+              <a:endParaRPr lang="en-US" dirty="0"/>
+            </a:p>
+          </p:txBody>
+        </p:sp>
+        <p:sp>
+          <p:nvSpPr>
+            <p:cNvPr id="11" name="Rectangle 10">
+              <a:extLst>
+                <a:ext uri="{FF2B5EF4-FFF2-40B4-BE49-F238E27FC236}">
+                  <a16:creationId xmlns:a16="http://schemas.microsoft.com/office/drawing/2014/main" id="{8FF6D1F6-BE0D-405C-9028-EC70AF75D232}"/>
+                </a:ext>
+              </a:extLst>
+            </p:cNvPr>
+            <p:cNvSpPr/>
+            <p:nvPr/>
+          </p:nvSpPr>
+          <p:spPr>
+            <a:xfrm>
+              <a:off x="-1" y="0"/>
+              <a:ext cx="2013557" cy="6858000"/>
+            </a:xfrm>
+            <a:prstGeom prst="rect">
+              <a:avLst/>
+            </a:prstGeom>
+            <a:solidFill>
+              <a:srgbClr val="262626"/>
+            </a:solidFill>
+          </p:spPr>
+          <p:style>
+            <a:lnRef idx="2">
+              <a:schemeClr val="accent1">
+                <a:shade val="50000"/>
+              </a:schemeClr>
+            </a:lnRef>
+            <a:fillRef idx="1">
+              <a:schemeClr val="accent1"/>
+            </a:fillRef>
+            <a:effectRef idx="0">
+              <a:schemeClr val="accent1"/>
+            </a:effectRef>
+            <a:fontRef idx="minor">
+              <a:schemeClr val="lt1"/>
+            </a:fontRef>
+          </p:style>
+          <p:txBody>
+            <a:bodyPr rtlCol="0" anchor="ctr"/>
+            <a:lstStyle/>
+            <a:p>
+              <a:pPr algn="ctr"/>
+              <a:endParaRPr lang="en-US"/>
+            </a:p>
+          </p:txBody>
+        </p:sp>
+        <p:sp>
+          <p:nvSpPr>
+            <p:cNvPr id="23" name="Rectangle 22">
+              <a:extLst>
+                <a:ext uri="{FF2B5EF4-FFF2-40B4-BE49-F238E27FC236}">
+                  <a16:creationId xmlns:a16="http://schemas.microsoft.com/office/drawing/2014/main" id="{28403A2A-F5B0-4C1E-92F8-F68B4185D272}"/>
+                </a:ext>
+              </a:extLst>
+            </p:cNvPr>
+            <p:cNvSpPr/>
+            <p:nvPr/>
+          </p:nvSpPr>
+          <p:spPr>
+            <a:xfrm>
+              <a:off x="2499360" y="6541462"/>
+              <a:ext cx="9666205" cy="316538"/>
+            </a:xfrm>
+            <a:prstGeom prst="rect">
+              <a:avLst/>
+            </a:prstGeom>
+            <a:solidFill>
+              <a:srgbClr val="7EA861"/>
+            </a:solidFill>
+            <a:ln>
+              <a:solidFill>
+                <a:srgbClr val="7EA861"/>
+              </a:solidFill>
+            </a:ln>
+          </p:spPr>
+          <p:style>
+            <a:lnRef idx="2">
+              <a:schemeClr val="accent1">
+                <a:shade val="50000"/>
+              </a:schemeClr>
+            </a:lnRef>
+            <a:fillRef idx="1">
+              <a:schemeClr val="accent1"/>
+            </a:fillRef>
+            <a:effectRef idx="0">
+              <a:schemeClr val="accent1"/>
+            </a:effectRef>
+            <a:fontRef idx="minor">
+              <a:schemeClr val="lt1"/>
+            </a:fontRef>
+          </p:style>
+          <p:txBody>
+            <a:bodyPr rtlCol="0" anchor="ctr"/>
+            <a:lstStyle/>
+            <a:p>
+              <a:pPr algn="ctr"/>
+              <a:endParaRPr lang="en-US"/>
+            </a:p>
+          </p:txBody>
+        </p:sp>
+      </p:grpSp>
+      <p:sp>
+        <p:nvSpPr>
+          <p:cNvPr id="16" name="TextBox 15">
+            <a:extLst>
+              <a:ext uri="{FF2B5EF4-FFF2-40B4-BE49-F238E27FC236}">
+                <a16:creationId xmlns:a16="http://schemas.microsoft.com/office/drawing/2014/main" id="{28E357FE-66D7-4860-8B9C-16293153E14E}"/>
+              </a:ext>
+            </a:extLst>
+          </p:cNvPr>
+          <p:cNvSpPr txBox="1"/>
+          <p:nvPr/>
+        </p:nvSpPr>
+        <p:spPr>
+          <a:xfrm>
+            <a:off x="2928872" y="848926"/>
+            <a:ext cx="6593224" cy="369332"/>
+          </a:xfrm>
+          <a:prstGeom prst="rect">
+            <a:avLst/>
+          </a:prstGeom>
+          <a:noFill/>
+        </p:spPr>
+        <p:txBody>
+          <a:bodyPr wrap="square" rtlCol="0">
+            <a:spAutoFit/>
+          </a:bodyPr>
+          <a:lstStyle/>
+          <a:p>
+            <a:r>
+              <a:rPr lang="en-US" b="1" dirty="0">
+                <a:solidFill>
+                  <a:schemeClr val="accent6">
+                    <a:lumMod val="75000"/>
+                  </a:schemeClr>
+                </a:solidFill>
+              </a:rPr>
+              <a:t>Where’s the information?</a:t>
+            </a:r>
+            <a:endParaRPr lang="en-US" b="1" dirty="0"/>
+          </a:p>
+        </p:txBody>
+      </p:sp>
+      <p:sp>
+        <p:nvSpPr>
+          <p:cNvPr id="3" name="Rectangle 2">
+            <a:extLst>
+              <a:ext uri="{FF2B5EF4-FFF2-40B4-BE49-F238E27FC236}">
+                <a16:creationId xmlns:a16="http://schemas.microsoft.com/office/drawing/2014/main" id="{69480590-2FF0-4D28-B943-D29C7874E490}"/>
+              </a:ext>
+            </a:extLst>
+          </p:cNvPr>
+          <p:cNvSpPr/>
+          <p:nvPr/>
+        </p:nvSpPr>
+        <p:spPr>
+          <a:xfrm>
+            <a:off x="5519635" y="1405508"/>
+            <a:ext cx="6096000" cy="1323439"/>
+          </a:xfrm>
+          <a:prstGeom prst="rect">
+            <a:avLst/>
+          </a:prstGeom>
+        </p:spPr>
+        <p:txBody>
+          <a:bodyPr>
+            <a:spAutoFit/>
+          </a:bodyPr>
+          <a:lstStyle/>
+          <a:p>
+            <a:pPr marL="285750" lvl="3" indent="-285750">
+              <a:buFont typeface="Arial" panose="020B0604020202020204" pitchFamily="34" charset="0"/>
+              <a:buChar char="•"/>
+            </a:pPr>
+            <a:r>
+              <a:rPr lang="en-US" sz="2000" dirty="0"/>
+              <a:t>The data exploration and cleanup process (accompanied by your </a:t>
+            </a:r>
+            <a:r>
+              <a:rPr lang="en-US" sz="2000" dirty="0" err="1"/>
+              <a:t>Jupyter</a:t>
+            </a:r>
+            <a:r>
+              <a:rPr lang="en-US" sz="2000" dirty="0"/>
+              <a:t> Notebook)</a:t>
+            </a:r>
+          </a:p>
+          <a:p>
+            <a:pPr marL="285750" lvl="3" indent="-285750">
+              <a:buFont typeface="Arial" panose="020B0604020202020204" pitchFamily="34" charset="0"/>
+              <a:buChar char="•"/>
+            </a:pPr>
+            <a:r>
+              <a:rPr lang="en-US" sz="2000" dirty="0"/>
+              <a:t>The analysis process (accompanied by your </a:t>
+            </a:r>
+            <a:r>
+              <a:rPr lang="en-US" sz="2000" dirty="0" err="1"/>
+              <a:t>Jupyter</a:t>
+            </a:r>
+            <a:r>
+              <a:rPr lang="en-US" sz="2000" dirty="0"/>
+              <a:t> Notebook)</a:t>
+            </a:r>
+          </a:p>
+        </p:txBody>
+      </p:sp>
+      <p:sp>
+        <p:nvSpPr>
+          <p:cNvPr id="20" name="Subtitle 2">
+            <a:extLst>
+              <a:ext uri="{FF2B5EF4-FFF2-40B4-BE49-F238E27FC236}">
+                <a16:creationId xmlns:a16="http://schemas.microsoft.com/office/drawing/2014/main" id="{A57814C1-BF80-4E15-B171-D6F88EAE04E4}"/>
+              </a:ext>
+            </a:extLst>
+          </p:cNvPr>
+          <p:cNvSpPr txBox="1">
+            <a:spLocks/>
+          </p:cNvSpPr>
+          <p:nvPr/>
+        </p:nvSpPr>
+        <p:spPr>
+          <a:xfrm>
+            <a:off x="1778000" y="20859"/>
+            <a:ext cx="8236968" cy="838831"/>
+          </a:xfrm>
+          <a:prstGeom prst="rect">
+            <a:avLst/>
+          </a:prstGeom>
+        </p:spPr>
+        <p:txBody>
+          <a:bodyPr vert="horz" lIns="91440" tIns="45720" rIns="91440" bIns="45720" rtlCol="0" anchor="b">
+            <a:noAutofit/>
+          </a:bodyPr>
+          <a:lstStyle>
+            <a:lvl1pPr marL="0" indent="0" algn="l" defTabSz="914400" rtl="0" eaLnBrk="1" latinLnBrk="0" hangingPunct="1">
+              <a:lnSpc>
+                <a:spcPct val="90000"/>
+              </a:lnSpc>
+              <a:spcBef>
+                <a:spcPts val="1000"/>
+              </a:spcBef>
+              <a:buFont typeface="Arial" panose="020B0604020202020204" pitchFamily="34" charset="0"/>
+              <a:buNone/>
+              <a:defRPr sz="2400" b="1" kern="1200">
+                <a:solidFill>
+                  <a:schemeClr val="tx1"/>
+                </a:solidFill>
+                <a:latin typeface="+mn-lt"/>
+                <a:ea typeface="+mn-ea"/>
+                <a:cs typeface="+mn-cs"/>
+              </a:defRPr>
+            </a:lvl1pPr>
+            <a:lvl2pPr marL="457200" indent="0" algn="l" defTabSz="914400" rtl="0" eaLnBrk="1" latinLnBrk="0" hangingPunct="1">
+              <a:lnSpc>
+                <a:spcPct val="90000"/>
+              </a:lnSpc>
+              <a:spcBef>
+                <a:spcPts val="500"/>
+              </a:spcBef>
+              <a:buFont typeface="Arial" panose="020B0604020202020204" pitchFamily="34" charset="0"/>
+              <a:buNone/>
+              <a:defRPr sz="2000" b="1" kern="1200">
+                <a:solidFill>
+                  <a:schemeClr val="tx1"/>
+                </a:solidFill>
+                <a:latin typeface="+mn-lt"/>
+                <a:ea typeface="+mn-ea"/>
+                <a:cs typeface="+mn-cs"/>
+              </a:defRPr>
+            </a:lvl2pPr>
+            <a:lvl3pPr marL="914400" indent="0" algn="l" defTabSz="914400" rtl="0" eaLnBrk="1" latinLnBrk="0" hangingPunct="1">
+              <a:lnSpc>
+                <a:spcPct val="90000"/>
+              </a:lnSpc>
+              <a:spcBef>
+                <a:spcPts val="500"/>
+              </a:spcBef>
+              <a:buFont typeface="Arial" panose="020B0604020202020204" pitchFamily="34" charset="0"/>
+              <a:buNone/>
+              <a:defRPr sz="1800" b="1" kern="1200">
+                <a:solidFill>
+                  <a:schemeClr val="tx1"/>
+                </a:solidFill>
+                <a:latin typeface="+mn-lt"/>
+                <a:ea typeface="+mn-ea"/>
+                <a:cs typeface="+mn-cs"/>
+              </a:defRPr>
+            </a:lvl3pPr>
+            <a:lvl4pPr marL="1371600" indent="0" algn="l" defTabSz="914400" rtl="0" eaLnBrk="1" latinLnBrk="0" hangingPunct="1">
+              <a:lnSpc>
+                <a:spcPct val="90000"/>
+              </a:lnSpc>
+              <a:spcBef>
+                <a:spcPts val="500"/>
+              </a:spcBef>
+              <a:buFont typeface="Arial" panose="020B0604020202020204" pitchFamily="34" charset="0"/>
+              <a:buNone/>
+              <a:defRPr sz="1600" b="1" kern="1200">
+                <a:solidFill>
+                  <a:schemeClr val="tx1"/>
+                </a:solidFill>
+                <a:latin typeface="+mn-lt"/>
+                <a:ea typeface="+mn-ea"/>
+                <a:cs typeface="+mn-cs"/>
+              </a:defRPr>
+            </a:lvl4pPr>
+            <a:lvl5pPr marL="1828800" indent="0" algn="l" defTabSz="914400" rtl="0" eaLnBrk="1" latinLnBrk="0" hangingPunct="1">
+              <a:lnSpc>
+                <a:spcPct val="90000"/>
+              </a:lnSpc>
+              <a:spcBef>
+                <a:spcPts val="500"/>
+              </a:spcBef>
+              <a:buFont typeface="Arial" panose="020B0604020202020204" pitchFamily="34" charset="0"/>
+              <a:buNone/>
+              <a:defRPr sz="1600" b="1" kern="1200">
+                <a:solidFill>
+                  <a:schemeClr val="tx1"/>
+                </a:solidFill>
+                <a:latin typeface="+mn-lt"/>
+                <a:ea typeface="+mn-ea"/>
+                <a:cs typeface="+mn-cs"/>
+              </a:defRPr>
+            </a:lvl5pPr>
+            <a:lvl6pPr marL="2286000" indent="0" algn="l" defTabSz="914400" rtl="0" eaLnBrk="1" latinLnBrk="0" hangingPunct="1">
+              <a:lnSpc>
+                <a:spcPct val="90000"/>
+              </a:lnSpc>
+              <a:spcBef>
+                <a:spcPts val="500"/>
+              </a:spcBef>
+              <a:buFont typeface="Arial" panose="020B0604020202020204" pitchFamily="34" charset="0"/>
+              <a:buNone/>
+              <a:defRPr sz="1600" b="1" kern="1200">
+                <a:solidFill>
+                  <a:schemeClr val="tx1"/>
+                </a:solidFill>
+                <a:latin typeface="+mn-lt"/>
+                <a:ea typeface="+mn-ea"/>
+                <a:cs typeface="+mn-cs"/>
+              </a:defRPr>
+            </a:lvl6pPr>
+            <a:lvl7pPr marL="2743200" indent="0" algn="l" defTabSz="914400" rtl="0" eaLnBrk="1" latinLnBrk="0" hangingPunct="1">
+              <a:lnSpc>
+                <a:spcPct val="90000"/>
+              </a:lnSpc>
+              <a:spcBef>
+                <a:spcPts val="500"/>
+              </a:spcBef>
+              <a:buFont typeface="Arial" panose="020B0604020202020204" pitchFamily="34" charset="0"/>
+              <a:buNone/>
+              <a:defRPr sz="1600" b="1" kern="1200">
+                <a:solidFill>
+                  <a:schemeClr val="tx1"/>
+                </a:solidFill>
+                <a:latin typeface="+mn-lt"/>
+                <a:ea typeface="+mn-ea"/>
+                <a:cs typeface="+mn-cs"/>
+              </a:defRPr>
+            </a:lvl7pPr>
+            <a:lvl8pPr marL="3200400" indent="0" algn="l" defTabSz="914400" rtl="0" eaLnBrk="1" latinLnBrk="0" hangingPunct="1">
+              <a:lnSpc>
+                <a:spcPct val="90000"/>
+              </a:lnSpc>
+              <a:spcBef>
+                <a:spcPts val="500"/>
+              </a:spcBef>
+              <a:buFont typeface="Arial" panose="020B0604020202020204" pitchFamily="34" charset="0"/>
+              <a:buNone/>
+              <a:defRPr sz="1600" b="1" kern="1200">
+                <a:solidFill>
+                  <a:schemeClr val="tx1"/>
+                </a:solidFill>
+                <a:latin typeface="+mn-lt"/>
+                <a:ea typeface="+mn-ea"/>
+                <a:cs typeface="+mn-cs"/>
+              </a:defRPr>
+            </a:lvl8pPr>
+            <a:lvl9pPr marL="3657600" indent="0" algn="l" defTabSz="914400" rtl="0" eaLnBrk="1" latinLnBrk="0" hangingPunct="1">
+              <a:lnSpc>
+                <a:spcPct val="90000"/>
+              </a:lnSpc>
+              <a:spcBef>
+                <a:spcPts val="500"/>
+              </a:spcBef>
+              <a:buFont typeface="Arial" panose="020B0604020202020204" pitchFamily="34" charset="0"/>
+              <a:buNone/>
+              <a:defRPr sz="1600" b="1" kern="1200">
+                <a:solidFill>
+                  <a:schemeClr val="tx1"/>
+                </a:solidFill>
+                <a:latin typeface="+mn-lt"/>
+                <a:ea typeface="+mn-ea"/>
+                <a:cs typeface="+mn-cs"/>
+              </a:defRPr>
+            </a:lvl9pPr>
+          </a:lstStyle>
+          <a:p>
+            <a:pPr algn="r"/>
+            <a:r>
+              <a:rPr lang="en-US" sz="3600" dirty="0"/>
+              <a:t>Data Exploration &amp; Clean-up Process</a:t>
+            </a:r>
+            <a:endParaRPr lang="en-US" sz="3600" dirty="0">
+              <a:solidFill>
+                <a:srgbClr val="000000"/>
+              </a:solidFill>
+            </a:endParaRPr>
+          </a:p>
+        </p:txBody>
+      </p:sp>
+      <p:sp>
+        <p:nvSpPr>
+          <p:cNvPr id="4" name="Rectangle 3">
+            <a:extLst>
+              <a:ext uri="{FF2B5EF4-FFF2-40B4-BE49-F238E27FC236}">
+                <a16:creationId xmlns:a16="http://schemas.microsoft.com/office/drawing/2014/main" id="{A7A3A4F4-CC49-41CD-8A92-003B16BA2A95}"/>
+              </a:ext>
+            </a:extLst>
+          </p:cNvPr>
+          <p:cNvSpPr/>
+          <p:nvPr/>
+        </p:nvSpPr>
+        <p:spPr>
+          <a:xfrm>
+            <a:off x="3642840" y="3091781"/>
+            <a:ext cx="6096000" cy="1938992"/>
+          </a:xfrm>
+          <a:prstGeom prst="rect">
+            <a:avLst/>
+          </a:prstGeom>
+        </p:spPr>
+        <p:txBody>
+          <a:bodyPr>
+            <a:spAutoFit/>
+          </a:bodyPr>
+          <a:lstStyle/>
+          <a:p>
+            <a:pPr marL="285750" lvl="3" indent="-285750">
+              <a:buFont typeface="Arial" panose="020B0604020202020204" pitchFamily="34" charset="0"/>
+              <a:buChar char="•"/>
+            </a:pPr>
+            <a:r>
+              <a:rPr lang="en-US" sz="2000" dirty="0"/>
+              <a:t>Your conclusions. This should include a numerical summary as well as visualizations of that summary</a:t>
+            </a:r>
+          </a:p>
+          <a:p>
+            <a:pPr marL="285750" lvl="3" indent="-285750">
+              <a:buFont typeface="Arial" panose="020B0604020202020204" pitchFamily="34" charset="0"/>
+              <a:buChar char="•"/>
+            </a:pPr>
+            <a:r>
+              <a:rPr lang="en-US" sz="2000" dirty="0"/>
+              <a:t>Discuss the implications of your findings. This is where you get to have an open-ended discussion about what your findings "mean</a:t>
+            </a:r>
+          </a:p>
+          <a:p>
+            <a:pPr marL="285750" lvl="3" indent="-285750">
+              <a:buFont typeface="Arial" panose="020B0604020202020204" pitchFamily="34" charset="0"/>
+              <a:buChar char="•"/>
+            </a:pPr>
+            <a:r>
+              <a:rPr lang="en-US" sz="2000" dirty="0"/>
+              <a:t>Q&amp;A session to follow your presentation</a:t>
+            </a:r>
+          </a:p>
+        </p:txBody>
+      </p:sp>
+    </p:spTree>
+    <p:extLst>
+      <p:ext uri="{BB962C8B-B14F-4D97-AF65-F5344CB8AC3E}">
+        <p14:creationId xmlns:p14="http://schemas.microsoft.com/office/powerpoint/2010/main" val="653423298"/>
+      </p:ext>
+    </p:extLst>
+  </p:cSld>
+  <p:clrMapOvr>
+    <a:masterClrMapping/>
+  </p:clrMapOvr>
+</p:sld>
+</file>
+
+<file path=ppt/slides/slide11.xml><?xml version="1.0" encoding="utf-8"?>
+<p:sld xmlns:a="http://schemas.openxmlformats.org/drawingml/2006/main" xmlns:r="http://schemas.openxmlformats.org/officeDocument/2006/relationships" xmlns:p="http://schemas.openxmlformats.org/presentationml/2006/main">
+  <p:cSld>
+    <p:bg>
+      <p:bgPr>
+        <a:solidFill>
+          <a:srgbClr val="542C39"/>
+        </a:solidFill>
+        <a:effectLst/>
+      </p:bgPr>
+    </p:bg>
+    <p:spTree>
+      <p:nvGrpSpPr>
+        <p:cNvPr id="1" name=""/>
+        <p:cNvGrpSpPr/>
+        <p:nvPr/>
+      </p:nvGrpSpPr>
+      <p:grpSpPr>
+        <a:xfrm>
+          <a:off x="0" y="0"/>
+          <a:ext cx="0" cy="0"/>
+          <a:chOff x="0" y="0"/>
+          <a:chExt cx="0" cy="0"/>
+        </a:xfrm>
+      </p:grpSpPr>
+      <p:sp>
+        <p:nvSpPr>
+          <p:cNvPr id="18" name="Rectangle 14">
+            <a:extLst>
+              <a:ext uri="{FF2B5EF4-FFF2-40B4-BE49-F238E27FC236}">
+                <a16:creationId xmlns:a16="http://schemas.microsoft.com/office/drawing/2014/main" id="{6753252F-4873-4F63-801D-CC719279A7D5}"/>
+              </a:ext>
+              <a:ext uri="{C183D7F6-B498-43B3-948B-1728B52AA6E4}">
+                <adec:decorative xmlns:adec="http://schemas.microsoft.com/office/drawing/2017/decorative" val="1"/>
+              </a:ext>
+            </a:extLst>
+          </p:cNvPr>
+          <p:cNvSpPr>
+            <a:spLocks noGrp="1" noRot="1" noChangeAspect="1" noMove="1" noResize="1" noEditPoints="1" noAdjustHandles="1" noChangeArrowheads="1" noChangeShapeType="1" noTextEdit="1"/>
+          </p:cNvSpPr>
+          <p:nvPr>
+            <p:extLst>
+              <p:ext uri="{386F3935-93C4-4BCD-93E2-E3B085C9AB24}">
+                <p16:designElem xmlns:p16="http://schemas.microsoft.com/office/powerpoint/2015/main" val="1"/>
+              </p:ext>
+            </p:extLst>
+          </p:nvPr>
+        </p:nvSpPr>
+        <p:spPr>
+          <a:xfrm>
+            <a:off x="0" y="0"/>
+            <a:ext cx="12192000" cy="6858000"/>
+          </a:xfrm>
+          <a:prstGeom prst="rect">
+            <a:avLst/>
+          </a:prstGeom>
+          <a:solidFill>
+            <a:srgbClr val="FFFFFF"/>
+          </a:solidFill>
+          <a:ln>
+            <a:noFill/>
+          </a:ln>
+        </p:spPr>
+        <p:style>
+          <a:lnRef idx="2">
+            <a:schemeClr val="accent1">
+              <a:shade val="50000"/>
+            </a:schemeClr>
+          </a:lnRef>
+          <a:fillRef idx="1">
+            <a:schemeClr val="accent1"/>
+          </a:fillRef>
+          <a:effectRef idx="0">
+            <a:schemeClr val="accent1"/>
+          </a:effectRef>
+          <a:fontRef idx="minor">
+            <a:schemeClr val="lt1"/>
+          </a:fontRef>
+        </p:style>
+        <p:txBody>
+          <a:bodyPr rtlCol="0" anchor="ctr"/>
+          <a:lstStyle/>
+          <a:p>
+            <a:pPr algn="ctr"/>
+            <a:endParaRPr lang="en-US"/>
+          </a:p>
+        </p:txBody>
+      </p:sp>
+      <p:sp>
+        <p:nvSpPr>
+          <p:cNvPr id="17" name="Rectangle 16">
+            <a:extLst>
+              <a:ext uri="{FF2B5EF4-FFF2-40B4-BE49-F238E27FC236}">
+                <a16:creationId xmlns:a16="http://schemas.microsoft.com/office/drawing/2014/main" id="{047C8CCB-F95D-4249-92DD-651249D3535A}"/>
+              </a:ext>
+              <a:ext uri="{C183D7F6-B498-43B3-948B-1728B52AA6E4}">
+                <adec:decorative xmlns:adec="http://schemas.microsoft.com/office/drawing/2017/decorative" val="1"/>
+              </a:ext>
+            </a:extLst>
+          </p:cNvPr>
+          <p:cNvSpPr>
+            <a:spLocks noGrp="1" noRot="1" noChangeAspect="1" noMove="1" noResize="1" noEditPoints="1" noAdjustHandles="1" noChangeArrowheads="1" noChangeShapeType="1" noTextEdit="1"/>
+          </p:cNvSpPr>
+          <p:nvPr>
+            <p:extLst>
+              <p:ext uri="{386F3935-93C4-4BCD-93E2-E3B085C9AB24}">
+                <p16:designElem xmlns:p16="http://schemas.microsoft.com/office/powerpoint/2015/main" val="1"/>
+              </p:ext>
+            </p:extLst>
+          </p:nvPr>
+        </p:nvSpPr>
+        <p:spPr>
+          <a:xfrm>
+            <a:off x="0" y="0"/>
+            <a:ext cx="2013557" cy="6858000"/>
+          </a:xfrm>
+          <a:prstGeom prst="rect">
+            <a:avLst/>
+          </a:prstGeom>
+          <a:solidFill>
+            <a:srgbClr val="542C39"/>
+          </a:solidFill>
+          <a:ln>
+            <a:noFill/>
+          </a:ln>
+        </p:spPr>
+        <p:style>
+          <a:lnRef idx="2">
+            <a:schemeClr val="accent1">
+              <a:shade val="50000"/>
+            </a:schemeClr>
+          </a:lnRef>
+          <a:fillRef idx="1">
+            <a:schemeClr val="accent1"/>
+          </a:fillRef>
+          <a:effectRef idx="0">
+            <a:schemeClr val="accent1"/>
+          </a:effectRef>
+          <a:fontRef idx="minor">
+            <a:schemeClr val="lt1"/>
+          </a:fontRef>
+        </p:style>
+        <p:txBody>
+          <a:bodyPr rtlCol="0" anchor="ctr"/>
+          <a:lstStyle/>
+          <a:p>
+            <a:pPr algn="ctr"/>
+            <a:endParaRPr lang="en-US"/>
+          </a:p>
+        </p:txBody>
+      </p:sp>
+      <p:sp>
+        <p:nvSpPr>
+          <p:cNvPr id="23" name="Rectangle 22">
+            <a:extLst>
+              <a:ext uri="{FF2B5EF4-FFF2-40B4-BE49-F238E27FC236}">
+                <a16:creationId xmlns:a16="http://schemas.microsoft.com/office/drawing/2014/main" id="{28403A2A-F5B0-4C1E-92F8-F68B4185D272}"/>
+              </a:ext>
+            </a:extLst>
+          </p:cNvPr>
+          <p:cNvSpPr/>
+          <p:nvPr/>
+        </p:nvSpPr>
+        <p:spPr>
+          <a:xfrm>
+            <a:off x="2499360" y="6541462"/>
+            <a:ext cx="9666205" cy="316538"/>
+          </a:xfrm>
+          <a:prstGeom prst="rect">
+            <a:avLst/>
+          </a:prstGeom>
+          <a:solidFill>
+            <a:srgbClr val="7EA861"/>
+          </a:solidFill>
+          <a:ln>
+            <a:solidFill>
+              <a:srgbClr val="7EA861"/>
+            </a:solidFill>
+          </a:ln>
+        </p:spPr>
+        <p:style>
+          <a:lnRef idx="2">
+            <a:schemeClr val="accent1">
+              <a:shade val="50000"/>
+            </a:schemeClr>
+          </a:lnRef>
+          <a:fillRef idx="1">
+            <a:schemeClr val="accent1"/>
+          </a:fillRef>
+          <a:effectRef idx="0">
+            <a:schemeClr val="accent1"/>
+          </a:effectRef>
+          <a:fontRef idx="minor">
+            <a:schemeClr val="lt1"/>
+          </a:fontRef>
+        </p:style>
+        <p:txBody>
+          <a:bodyPr rtlCol="0" anchor="ctr"/>
+          <a:lstStyle/>
+          <a:p>
+            <a:pPr algn="ctr"/>
+            <a:endParaRPr lang="en-US"/>
+          </a:p>
+        </p:txBody>
+      </p:sp>
+      <p:pic>
+        <p:nvPicPr>
+          <p:cNvPr id="9" name="Content Placeholder 15" descr="A screenshot of a cell phone&#10;&#10;Description automatically generated">
+            <a:extLst>
+              <a:ext uri="{FF2B5EF4-FFF2-40B4-BE49-F238E27FC236}">
+                <a16:creationId xmlns:a16="http://schemas.microsoft.com/office/drawing/2014/main" id="{9F157A56-63A0-4AFD-85DB-BD84CD803572}"/>
+              </a:ext>
+            </a:extLst>
+          </p:cNvPr>
+          <p:cNvPicPr>
+            <a:picLocks noGrp="1" noChangeAspect="1"/>
+          </p:cNvPicPr>
+          <p:nvPr>
+            <p:ph sz="half" idx="2"/>
+          </p:nvPr>
+        </p:nvPicPr>
+        <p:blipFill rotWithShape="1">
+          <a:blip r:embed="rId2"/>
+          <a:srcRect l="10627" r="13937"/>
+          <a:stretch/>
+        </p:blipFill>
+        <p:spPr>
+          <a:xfrm>
+            <a:off x="2424322" y="1766948"/>
+            <a:ext cx="5209674" cy="3511723"/>
+          </a:xfrm>
+        </p:spPr>
+      </p:pic>
+      <p:sp>
+        <p:nvSpPr>
+          <p:cNvPr id="8" name="Subtitle 2">
+            <a:extLst>
+              <a:ext uri="{FF2B5EF4-FFF2-40B4-BE49-F238E27FC236}">
+                <a16:creationId xmlns:a16="http://schemas.microsoft.com/office/drawing/2014/main" id="{3FD876A2-3892-42BE-9CDA-650985982439}"/>
+              </a:ext>
+            </a:extLst>
+          </p:cNvPr>
+          <p:cNvSpPr txBox="1">
+            <a:spLocks/>
+          </p:cNvSpPr>
+          <p:nvPr/>
+        </p:nvSpPr>
+        <p:spPr>
+          <a:xfrm>
+            <a:off x="2555433" y="248456"/>
+            <a:ext cx="5354320" cy="597617"/>
+          </a:xfrm>
+          <a:prstGeom prst="rect">
+            <a:avLst/>
+          </a:prstGeom>
+        </p:spPr>
+        <p:txBody>
+          <a:bodyPr vert="horz" lIns="91440" tIns="45720" rIns="91440" bIns="45720" rtlCol="0" anchor="b">
+            <a:normAutofit fontScale="55000" lnSpcReduction="20000"/>
+          </a:bodyPr>
+          <a:lstStyle>
+            <a:lvl1pPr marL="0" indent="0" algn="l" defTabSz="914400" rtl="0" eaLnBrk="1" latinLnBrk="0" hangingPunct="1">
+              <a:lnSpc>
+                <a:spcPct val="90000"/>
+              </a:lnSpc>
+              <a:spcBef>
+                <a:spcPts val="1000"/>
+              </a:spcBef>
+              <a:buFont typeface="Arial" panose="020B0604020202020204" pitchFamily="34" charset="0"/>
+              <a:buNone/>
+              <a:defRPr sz="2400" b="1" kern="1200">
+                <a:solidFill>
+                  <a:schemeClr val="tx1"/>
+                </a:solidFill>
+                <a:latin typeface="+mn-lt"/>
+                <a:ea typeface="+mn-ea"/>
+                <a:cs typeface="+mn-cs"/>
+              </a:defRPr>
+            </a:lvl1pPr>
+            <a:lvl2pPr marL="457200" indent="0" algn="l" defTabSz="914400" rtl="0" eaLnBrk="1" latinLnBrk="0" hangingPunct="1">
+              <a:lnSpc>
+                <a:spcPct val="90000"/>
+              </a:lnSpc>
+              <a:spcBef>
+                <a:spcPts val="500"/>
+              </a:spcBef>
+              <a:buFont typeface="Arial" panose="020B0604020202020204" pitchFamily="34" charset="0"/>
+              <a:buNone/>
+              <a:defRPr sz="2000" b="1" kern="1200">
+                <a:solidFill>
+                  <a:schemeClr val="tx1"/>
+                </a:solidFill>
+                <a:latin typeface="+mn-lt"/>
+                <a:ea typeface="+mn-ea"/>
+                <a:cs typeface="+mn-cs"/>
+              </a:defRPr>
+            </a:lvl2pPr>
+            <a:lvl3pPr marL="914400" indent="0" algn="l" defTabSz="914400" rtl="0" eaLnBrk="1" latinLnBrk="0" hangingPunct="1">
+              <a:lnSpc>
+                <a:spcPct val="90000"/>
+              </a:lnSpc>
+              <a:spcBef>
+                <a:spcPts val="500"/>
+              </a:spcBef>
+              <a:buFont typeface="Arial" panose="020B0604020202020204" pitchFamily="34" charset="0"/>
+              <a:buNone/>
+              <a:defRPr sz="1800" b="1" kern="1200">
+                <a:solidFill>
+                  <a:schemeClr val="tx1"/>
+                </a:solidFill>
+                <a:latin typeface="+mn-lt"/>
+                <a:ea typeface="+mn-ea"/>
+                <a:cs typeface="+mn-cs"/>
+              </a:defRPr>
+            </a:lvl3pPr>
+            <a:lvl4pPr marL="1371600" indent="0" algn="l" defTabSz="914400" rtl="0" eaLnBrk="1" latinLnBrk="0" hangingPunct="1">
+              <a:lnSpc>
+                <a:spcPct val="90000"/>
+              </a:lnSpc>
+              <a:spcBef>
+                <a:spcPts val="500"/>
+              </a:spcBef>
+              <a:buFont typeface="Arial" panose="020B0604020202020204" pitchFamily="34" charset="0"/>
+              <a:buNone/>
+              <a:defRPr sz="1600" b="1" kern="1200">
+                <a:solidFill>
+                  <a:schemeClr val="tx1"/>
+                </a:solidFill>
+                <a:latin typeface="+mn-lt"/>
+                <a:ea typeface="+mn-ea"/>
+                <a:cs typeface="+mn-cs"/>
+              </a:defRPr>
+            </a:lvl4pPr>
+            <a:lvl5pPr marL="1828800" indent="0" algn="l" defTabSz="914400" rtl="0" eaLnBrk="1" latinLnBrk="0" hangingPunct="1">
+              <a:lnSpc>
+                <a:spcPct val="90000"/>
+              </a:lnSpc>
+              <a:spcBef>
+                <a:spcPts val="500"/>
+              </a:spcBef>
+              <a:buFont typeface="Arial" panose="020B0604020202020204" pitchFamily="34" charset="0"/>
+              <a:buNone/>
+              <a:defRPr sz="1600" b="1" kern="1200">
+                <a:solidFill>
+                  <a:schemeClr val="tx1"/>
+                </a:solidFill>
+                <a:latin typeface="+mn-lt"/>
+                <a:ea typeface="+mn-ea"/>
+                <a:cs typeface="+mn-cs"/>
+              </a:defRPr>
+            </a:lvl5pPr>
+            <a:lvl6pPr marL="2286000" indent="0" algn="l" defTabSz="914400" rtl="0" eaLnBrk="1" latinLnBrk="0" hangingPunct="1">
+              <a:lnSpc>
+                <a:spcPct val="90000"/>
+              </a:lnSpc>
+              <a:spcBef>
+                <a:spcPts val="500"/>
+              </a:spcBef>
+              <a:buFont typeface="Arial" panose="020B0604020202020204" pitchFamily="34" charset="0"/>
+              <a:buNone/>
+              <a:defRPr sz="1600" b="1" kern="1200">
+                <a:solidFill>
+                  <a:schemeClr val="tx1"/>
+                </a:solidFill>
+                <a:latin typeface="+mn-lt"/>
+                <a:ea typeface="+mn-ea"/>
+                <a:cs typeface="+mn-cs"/>
+              </a:defRPr>
+            </a:lvl6pPr>
+            <a:lvl7pPr marL="2743200" indent="0" algn="l" defTabSz="914400" rtl="0" eaLnBrk="1" latinLnBrk="0" hangingPunct="1">
+              <a:lnSpc>
+                <a:spcPct val="90000"/>
+              </a:lnSpc>
+              <a:spcBef>
+                <a:spcPts val="500"/>
+              </a:spcBef>
+              <a:buFont typeface="Arial" panose="020B0604020202020204" pitchFamily="34" charset="0"/>
+              <a:buNone/>
+              <a:defRPr sz="1600" b="1" kern="1200">
+                <a:solidFill>
+                  <a:schemeClr val="tx1"/>
+                </a:solidFill>
+                <a:latin typeface="+mn-lt"/>
+                <a:ea typeface="+mn-ea"/>
+                <a:cs typeface="+mn-cs"/>
+              </a:defRPr>
+            </a:lvl7pPr>
+            <a:lvl8pPr marL="3200400" indent="0" algn="l" defTabSz="914400" rtl="0" eaLnBrk="1" latinLnBrk="0" hangingPunct="1">
+              <a:lnSpc>
+                <a:spcPct val="90000"/>
+              </a:lnSpc>
+              <a:spcBef>
+                <a:spcPts val="500"/>
+              </a:spcBef>
+              <a:buFont typeface="Arial" panose="020B0604020202020204" pitchFamily="34" charset="0"/>
+              <a:buNone/>
+              <a:defRPr sz="1600" b="1" kern="1200">
+                <a:solidFill>
+                  <a:schemeClr val="tx1"/>
+                </a:solidFill>
+                <a:latin typeface="+mn-lt"/>
+                <a:ea typeface="+mn-ea"/>
+                <a:cs typeface="+mn-cs"/>
+              </a:defRPr>
+            </a:lvl8pPr>
+            <a:lvl9pPr marL="3657600" indent="0" algn="l" defTabSz="914400" rtl="0" eaLnBrk="1" latinLnBrk="0" hangingPunct="1">
+              <a:lnSpc>
+                <a:spcPct val="90000"/>
+              </a:lnSpc>
+              <a:spcBef>
+                <a:spcPts val="500"/>
+              </a:spcBef>
+              <a:buFont typeface="Arial" panose="020B0604020202020204" pitchFamily="34" charset="0"/>
+              <a:buNone/>
+              <a:defRPr sz="1600" b="1" kern="1200">
+                <a:solidFill>
+                  <a:schemeClr val="tx1"/>
+                </a:solidFill>
+                <a:latin typeface="+mn-lt"/>
+                <a:ea typeface="+mn-ea"/>
+                <a:cs typeface="+mn-cs"/>
+              </a:defRPr>
+            </a:lvl9pPr>
+          </a:lstStyle>
+          <a:p>
+            <a:pPr algn="r"/>
+            <a:r>
+              <a:rPr lang="en-US" sz="5400" dirty="0">
+                <a:solidFill>
+                  <a:srgbClr val="000000"/>
+                </a:solidFill>
+              </a:rPr>
+              <a:t>Conclusions: Happiness Factors</a:t>
+            </a:r>
+          </a:p>
+        </p:txBody>
+      </p:sp>
+      <p:sp>
+        <p:nvSpPr>
+          <p:cNvPr id="12" name="Rectangle 11">
+            <a:extLst>
+              <a:ext uri="{FF2B5EF4-FFF2-40B4-BE49-F238E27FC236}">
+                <a16:creationId xmlns:a16="http://schemas.microsoft.com/office/drawing/2014/main" id="{667506F0-E964-4E08-93A1-B31E6BB62A25}"/>
+              </a:ext>
+            </a:extLst>
+          </p:cNvPr>
+          <p:cNvSpPr/>
+          <p:nvPr/>
+        </p:nvSpPr>
+        <p:spPr>
+          <a:xfrm>
+            <a:off x="1006777" y="0"/>
+            <a:ext cx="1830655" cy="6858000"/>
+          </a:xfrm>
+          <a:prstGeom prst="rect">
+            <a:avLst/>
+          </a:prstGeom>
+          <a:solidFill>
+            <a:srgbClr val="7EA861"/>
+          </a:solidFill>
+          <a:ln>
+            <a:solidFill>
+              <a:srgbClr val="7EA861"/>
+            </a:solidFill>
+          </a:ln>
+        </p:spPr>
+        <p:style>
+          <a:lnRef idx="2">
+            <a:schemeClr val="accent1">
+              <a:shade val="50000"/>
+            </a:schemeClr>
+          </a:lnRef>
+          <a:fillRef idx="1">
+            <a:schemeClr val="accent1"/>
+          </a:fillRef>
+          <a:effectRef idx="0">
+            <a:schemeClr val="accent1"/>
+          </a:effectRef>
+          <a:fontRef idx="minor">
+            <a:schemeClr val="lt1"/>
+          </a:fontRef>
+        </p:style>
+        <p:txBody>
+          <a:bodyPr rtlCol="0" anchor="ctr"/>
+          <a:lstStyle/>
+          <a:p>
+            <a:pPr algn="ctr"/>
+            <a:endParaRPr lang="en-US"/>
+          </a:p>
+        </p:txBody>
+      </p:sp>
+      <p:pic>
+        <p:nvPicPr>
+          <p:cNvPr id="10" name="Content Placeholder 17" descr="A screenshot of a cell phone&#10;&#10;Description automatically generated">
+            <a:extLst>
+              <a:ext uri="{FF2B5EF4-FFF2-40B4-BE49-F238E27FC236}">
+                <a16:creationId xmlns:a16="http://schemas.microsoft.com/office/drawing/2014/main" id="{FFA15AE0-B7BB-49CB-9BD6-DD974CA10C3E}"/>
+              </a:ext>
+            </a:extLst>
+          </p:cNvPr>
+          <p:cNvPicPr>
+            <a:picLocks noGrp="1" noChangeAspect="1"/>
+          </p:cNvPicPr>
+          <p:nvPr>
+            <p:ph sz="quarter" idx="4"/>
+          </p:nvPr>
+        </p:nvPicPr>
+        <p:blipFill rotWithShape="1">
+          <a:blip r:embed="rId3"/>
+          <a:srcRect l="14281" r="16440"/>
+          <a:stretch/>
+        </p:blipFill>
+        <p:spPr>
+          <a:xfrm>
+            <a:off x="7355131" y="1766947"/>
+            <a:ext cx="4915353" cy="3511723"/>
+          </a:xfrm>
+        </p:spPr>
+      </p:pic>
+      <p:sp>
+        <p:nvSpPr>
+          <p:cNvPr id="11" name="Rectangle 10">
+            <a:extLst>
+              <a:ext uri="{FF2B5EF4-FFF2-40B4-BE49-F238E27FC236}">
+                <a16:creationId xmlns:a16="http://schemas.microsoft.com/office/drawing/2014/main" id="{8FF6D1F6-BE0D-405C-9028-EC70AF75D232}"/>
+              </a:ext>
+            </a:extLst>
+          </p:cNvPr>
+          <p:cNvSpPr/>
+          <p:nvPr/>
+        </p:nvSpPr>
+        <p:spPr>
+          <a:xfrm>
+            <a:off x="-1" y="0"/>
+            <a:ext cx="2013557" cy="6858000"/>
+          </a:xfrm>
+          <a:prstGeom prst="rect">
+            <a:avLst/>
+          </a:prstGeom>
+          <a:solidFill>
+            <a:srgbClr val="262626"/>
+          </a:solidFill>
+        </p:spPr>
+        <p:style>
+          <a:lnRef idx="2">
+            <a:schemeClr val="accent1">
+              <a:shade val="50000"/>
+            </a:schemeClr>
+          </a:lnRef>
+          <a:fillRef idx="1">
+            <a:schemeClr val="accent1"/>
+          </a:fillRef>
+          <a:effectRef idx="0">
+            <a:schemeClr val="accent1"/>
+          </a:effectRef>
+          <a:fontRef idx="minor">
+            <a:schemeClr val="lt1"/>
+          </a:fontRef>
+        </p:style>
+        <p:txBody>
+          <a:bodyPr rtlCol="0" anchor="ctr"/>
+          <a:lstStyle/>
+          <a:p>
+            <a:pPr algn="ctr"/>
+            <a:endParaRPr lang="en-US"/>
+          </a:p>
+        </p:txBody>
+      </p:sp>
+      <p:sp>
+        <p:nvSpPr>
+          <p:cNvPr id="13" name="TextBox 12">
+            <a:extLst>
+              <a:ext uri="{FF2B5EF4-FFF2-40B4-BE49-F238E27FC236}">
+                <a16:creationId xmlns:a16="http://schemas.microsoft.com/office/drawing/2014/main" id="{AFE8CD97-6182-471A-A81E-F229407DE265}"/>
+              </a:ext>
+            </a:extLst>
+          </p:cNvPr>
+          <p:cNvSpPr txBox="1"/>
+          <p:nvPr/>
+        </p:nvSpPr>
+        <p:spPr>
+          <a:xfrm>
+            <a:off x="2905153" y="783251"/>
+            <a:ext cx="7571373" cy="861774"/>
+          </a:xfrm>
+          <a:prstGeom prst="rect">
+            <a:avLst/>
+          </a:prstGeom>
+          <a:noFill/>
+        </p:spPr>
+        <p:txBody>
+          <a:bodyPr wrap="square" rtlCol="0">
+            <a:spAutoFit/>
+          </a:bodyPr>
+          <a:lstStyle/>
+          <a:p>
+            <a:r>
+              <a:rPr lang="en-US" b="1" dirty="0">
+                <a:solidFill>
+                  <a:schemeClr val="accent6">
+                    <a:lumMod val="75000"/>
+                  </a:schemeClr>
+                </a:solidFill>
+              </a:rPr>
+              <a:t>How do the different happiness factors correlate? </a:t>
+            </a:r>
+          </a:p>
+          <a:p>
+            <a:r>
+              <a:rPr lang="en-US" sz="1400" dirty="0"/>
+              <a:t>Analyzing household income</a:t>
+            </a:r>
+          </a:p>
+          <a:p>
+            <a:endParaRPr lang="en-US" dirty="0"/>
+          </a:p>
+        </p:txBody>
+      </p:sp>
+    </p:spTree>
+    <p:extLst>
+      <p:ext uri="{BB962C8B-B14F-4D97-AF65-F5344CB8AC3E}">
+        <p14:creationId xmlns:p14="http://schemas.microsoft.com/office/powerpoint/2010/main" val="551049074"/>
+      </p:ext>
+    </p:extLst>
+  </p:cSld>
+  <p:clrMapOvr>
+    <a:masterClrMapping/>
+  </p:clrMapOvr>
+  <p:timing>
+    <p:tnLst>
+      <p:par>
+        <p:cTn id="1" dur="indefinite" restart="never" nodeType="tmRoot">
+          <p:childTnLst>
+            <p:seq concurrent="1" nextAc="seek">
+              <p:cTn id="2" dur="indefinite" nodeType="mainSeq">
+                <p:childTnLst>
+                  <p:par>
+                    <p:cTn id="3" fill="hold">
+                      <p:stCondLst>
+                        <p:cond delay="indefinite"/>
+                      </p:stCondLst>
+                      <p:childTnLst>
+                        <p:par>
+                          <p:cTn id="4" fill="hold">
+                            <p:stCondLst>
+                              <p:cond delay="0"/>
+                            </p:stCondLst>
+                            <p:childTnLst>
+                              <p:par>
+                                <p:cTn id="5" presetID="9" presetClass="entr" presetSubtype="0" fill="hold" nodeType="clickEffect">
+                                  <p:stCondLst>
+                                    <p:cond delay="0"/>
+                                  </p:stCondLst>
+                                  <p:childTnLst>
+                                    <p:set>
+                                      <p:cBhvr>
+                                        <p:cTn id="6" dur="1" fill="hold">
+                                          <p:stCondLst>
+                                            <p:cond delay="0"/>
+                                          </p:stCondLst>
+                                        </p:cTn>
+                                        <p:tgtEl>
+                                          <p:spTgt spid="9"/>
+                                        </p:tgtEl>
+                                        <p:attrNameLst>
+                                          <p:attrName>style.visibility</p:attrName>
+                                        </p:attrNameLst>
+                                      </p:cBhvr>
+                                      <p:to>
+                                        <p:strVal val="visible"/>
+                                      </p:to>
+                                    </p:set>
+                                    <p:animEffect transition="in" filter="dissolve">
+                                      <p:cBhvr>
+                                        <p:cTn id="7" dur="500"/>
+                                        <p:tgtEl>
+                                          <p:spTgt spid="9"/>
+                                        </p:tgtEl>
+                                      </p:cBhvr>
+                                    </p:animEffect>
+                                  </p:childTnLst>
+                                </p:cTn>
+                              </p:par>
+                            </p:childTnLst>
+                          </p:cTn>
+                        </p:par>
+                      </p:childTnLst>
+                    </p:cTn>
+                  </p:par>
+                  <p:par>
+                    <p:cTn id="8" fill="hold">
+                      <p:stCondLst>
+                        <p:cond delay="indefinite"/>
+                      </p:stCondLst>
+                      <p:childTnLst>
+                        <p:par>
+                          <p:cTn id="9" fill="hold">
+                            <p:stCondLst>
+                              <p:cond delay="0"/>
+                            </p:stCondLst>
+                            <p:childTnLst>
+                              <p:par>
+                                <p:cTn id="10" presetID="9" presetClass="entr" presetSubtype="0" fill="hold" nodeType="clickEffect">
+                                  <p:stCondLst>
+                                    <p:cond delay="0"/>
+                                  </p:stCondLst>
+                                  <p:childTnLst>
+                                    <p:set>
+                                      <p:cBhvr>
+                                        <p:cTn id="11" dur="1" fill="hold">
+                                          <p:stCondLst>
+                                            <p:cond delay="0"/>
+                                          </p:stCondLst>
+                                        </p:cTn>
+                                        <p:tgtEl>
+                                          <p:spTgt spid="10"/>
+                                        </p:tgtEl>
+                                        <p:attrNameLst>
+                                          <p:attrName>style.visibility</p:attrName>
+                                        </p:attrNameLst>
+                                      </p:cBhvr>
+                                      <p:to>
+                                        <p:strVal val="visible"/>
+                                      </p:to>
+                                    </p:set>
+                                    <p:animEffect transition="in" filter="dissolve">
+                                      <p:cBhvr>
+                                        <p:cTn id="12" dur="500"/>
+                                        <p:tgtEl>
+                                          <p:spTgt spid="10"/>
+                                        </p:tgtEl>
+                                      </p:cBhvr>
+                                    </p:animEffect>
+                                  </p:childTnLst>
+                                </p:cTn>
+                              </p:par>
+                            </p:childTnLst>
+                          </p:cTn>
+                        </p:par>
+                      </p:childTnLst>
+                    </p:cTn>
+                  </p:par>
+                </p:childTnLst>
+              </p:cTn>
+              <p:prevCondLst>
+                <p:cond evt="onPrev" delay="0">
+                  <p:tgtEl>
+                    <p:sldTgt/>
+                  </p:tgtEl>
+                </p:cond>
+              </p:prevCondLst>
+              <p:nextCondLst>
+                <p:cond evt="onNext" delay="0">
+                  <p:tgtEl>
+                    <p:sldTgt/>
+                  </p:tgtEl>
+                </p:cond>
+              </p:nextCondLst>
+            </p:seq>
+          </p:childTnLst>
+        </p:cTn>
+      </p:par>
+    </p:tnLst>
+  </p:timing>
+</p:sld>
+</file>
+
+<file path=ppt/slides/slide12.xml><?xml version="1.0" encoding="utf-8"?>
+<p:sld xmlns:a="http://schemas.openxmlformats.org/drawingml/2006/main" xmlns:r="http://schemas.openxmlformats.org/officeDocument/2006/relationships" xmlns:p="http://schemas.openxmlformats.org/presentationml/2006/main">
+  <p:cSld>
+    <p:bg>
+      <p:bgPr>
+        <a:solidFill>
+          <a:srgbClr val="542C39"/>
+        </a:solidFill>
+        <a:effectLst/>
+      </p:bgPr>
+    </p:bg>
+    <p:spTree>
+      <p:nvGrpSpPr>
+        <p:cNvPr id="1" name=""/>
+        <p:cNvGrpSpPr/>
+        <p:nvPr/>
+      </p:nvGrpSpPr>
+      <p:grpSpPr>
+        <a:xfrm>
+          <a:off x="0" y="0"/>
+          <a:ext cx="0" cy="0"/>
+          <a:chOff x="0" y="0"/>
+          <a:chExt cx="0" cy="0"/>
+        </a:xfrm>
+      </p:grpSpPr>
+      <p:sp>
+        <p:nvSpPr>
+          <p:cNvPr id="18" name="Rectangle 14">
+            <a:extLst>
+              <a:ext uri="{FF2B5EF4-FFF2-40B4-BE49-F238E27FC236}">
+                <a16:creationId xmlns:a16="http://schemas.microsoft.com/office/drawing/2014/main" id="{6753252F-4873-4F63-801D-CC719279A7D5}"/>
+              </a:ext>
+              <a:ext uri="{C183D7F6-B498-43B3-948B-1728B52AA6E4}">
+                <adec:decorative xmlns:adec="http://schemas.microsoft.com/office/drawing/2017/decorative" val="1"/>
+              </a:ext>
+            </a:extLst>
+          </p:cNvPr>
+          <p:cNvSpPr>
+            <a:spLocks noGrp="1" noRot="1" noChangeAspect="1" noMove="1" noResize="1" noEditPoints="1" noAdjustHandles="1" noChangeArrowheads="1" noChangeShapeType="1" noTextEdit="1"/>
+          </p:cNvSpPr>
+          <p:nvPr>
+            <p:extLst>
+              <p:ext uri="{386F3935-93C4-4BCD-93E2-E3B085C9AB24}">
+                <p16:designElem xmlns:p16="http://schemas.microsoft.com/office/powerpoint/2015/main" val="1"/>
+              </p:ext>
+            </p:extLst>
+          </p:nvPr>
+        </p:nvSpPr>
+        <p:spPr>
+          <a:xfrm>
+            <a:off x="0" y="0"/>
+            <a:ext cx="12192000" cy="6858000"/>
+          </a:xfrm>
+          <a:prstGeom prst="rect">
+            <a:avLst/>
+          </a:prstGeom>
+          <a:solidFill>
+            <a:srgbClr val="FFFFFF"/>
+          </a:solidFill>
+          <a:ln>
+            <a:noFill/>
+          </a:ln>
+        </p:spPr>
+        <p:style>
+          <a:lnRef idx="2">
+            <a:schemeClr val="accent1">
+              <a:shade val="50000"/>
+            </a:schemeClr>
+          </a:lnRef>
+          <a:fillRef idx="1">
+            <a:schemeClr val="accent1"/>
+          </a:fillRef>
+          <a:effectRef idx="0">
+            <a:schemeClr val="accent1"/>
+          </a:effectRef>
+          <a:fontRef idx="minor">
+            <a:schemeClr val="lt1"/>
+          </a:fontRef>
+        </p:style>
+        <p:txBody>
+          <a:bodyPr rtlCol="0" anchor="ctr"/>
+          <a:lstStyle/>
+          <a:p>
+            <a:pPr algn="ctr"/>
+            <a:endParaRPr lang="en-US"/>
+          </a:p>
+        </p:txBody>
+      </p:sp>
+      <p:sp>
+        <p:nvSpPr>
+          <p:cNvPr id="17" name="Rectangle 16">
+            <a:extLst>
+              <a:ext uri="{FF2B5EF4-FFF2-40B4-BE49-F238E27FC236}">
+                <a16:creationId xmlns:a16="http://schemas.microsoft.com/office/drawing/2014/main" id="{047C8CCB-F95D-4249-92DD-651249D3535A}"/>
+              </a:ext>
+              <a:ext uri="{C183D7F6-B498-43B3-948B-1728B52AA6E4}">
+                <adec:decorative xmlns:adec="http://schemas.microsoft.com/office/drawing/2017/decorative" val="1"/>
+              </a:ext>
+            </a:extLst>
+          </p:cNvPr>
+          <p:cNvSpPr>
+            <a:spLocks noGrp="1" noRot="1" noChangeAspect="1" noMove="1" noResize="1" noEditPoints="1" noAdjustHandles="1" noChangeArrowheads="1" noChangeShapeType="1" noTextEdit="1"/>
+          </p:cNvSpPr>
+          <p:nvPr>
+            <p:extLst>
+              <p:ext uri="{386F3935-93C4-4BCD-93E2-E3B085C9AB24}">
+                <p16:designElem xmlns:p16="http://schemas.microsoft.com/office/powerpoint/2015/main" val="1"/>
+              </p:ext>
+            </p:extLst>
+          </p:nvPr>
+        </p:nvSpPr>
+        <p:spPr>
+          <a:xfrm>
+            <a:off x="0" y="0"/>
+            <a:ext cx="2013557" cy="6858000"/>
+          </a:xfrm>
+          <a:prstGeom prst="rect">
+            <a:avLst/>
+          </a:prstGeom>
+          <a:solidFill>
+            <a:srgbClr val="542C39"/>
+          </a:solidFill>
+          <a:ln>
+            <a:noFill/>
+          </a:ln>
+        </p:spPr>
+        <p:style>
+          <a:lnRef idx="2">
+            <a:schemeClr val="accent1">
+              <a:shade val="50000"/>
+            </a:schemeClr>
+          </a:lnRef>
+          <a:fillRef idx="1">
+            <a:schemeClr val="accent1"/>
+          </a:fillRef>
+          <a:effectRef idx="0">
+            <a:schemeClr val="accent1"/>
+          </a:effectRef>
+          <a:fontRef idx="minor">
+            <a:schemeClr val="lt1"/>
+          </a:fontRef>
+        </p:style>
+        <p:txBody>
+          <a:bodyPr rtlCol="0" anchor="ctr"/>
+          <a:lstStyle/>
+          <a:p>
+            <a:pPr algn="ctr"/>
+            <a:endParaRPr lang="en-US"/>
+          </a:p>
+        </p:txBody>
+      </p:sp>
       <p:sp>
         <p:nvSpPr>
           <p:cNvPr id="23" name="Rectangle 22">
@@ -5031,7 +6511,7 @@
 </p:sld>
 </file>
 
-<file path=ppt/slides/slide11.xml><?xml version="1.0" encoding="utf-8"?>
+<file path=ppt/slides/slide13.xml><?xml version="1.0" encoding="utf-8"?>
 <p:sld xmlns:a="http://schemas.openxmlformats.org/drawingml/2006/main" xmlns:r="http://schemas.openxmlformats.org/officeDocument/2006/relationships" xmlns:p="http://schemas.openxmlformats.org/presentationml/2006/main">
   <p:cSld>
     <p:bg>
@@ -5556,7 +7036,7 @@
 </p:sld>
 </file>
 
-<file path=ppt/slides/slide12.xml><?xml version="1.0" encoding="utf-8"?>
+<file path=ppt/slides/slide14.xml><?xml version="1.0" encoding="utf-8"?>
 <p:sld xmlns:a="http://schemas.openxmlformats.org/drawingml/2006/main" xmlns:r="http://schemas.openxmlformats.org/officeDocument/2006/relationships" xmlns:p="http://schemas.openxmlformats.org/presentationml/2006/main">
   <p:cSld>
     <p:spTree>
@@ -8013,72 +9493,6 @@
           </a:p>
         </p:txBody>
       </p:sp>
-      <p:sp>
-        <p:nvSpPr>
-          <p:cNvPr id="6" name="Rectangle 5">
-            <a:extLst>
-              <a:ext uri="{FF2B5EF4-FFF2-40B4-BE49-F238E27FC236}">
-                <a16:creationId xmlns:a16="http://schemas.microsoft.com/office/drawing/2014/main" id="{1C7D7DF3-24AA-4CDC-B870-2D7A29CFC50A}"/>
-              </a:ext>
-            </a:extLst>
-          </p:cNvPr>
-          <p:cNvSpPr>
-            <a:spLocks noChangeAspect="1"/>
-          </p:cNvSpPr>
-          <p:nvPr/>
-        </p:nvSpPr>
-        <p:spPr>
-          <a:xfrm>
-            <a:off x="2941665" y="5052486"/>
-            <a:ext cx="4043260" cy="1938992"/>
-          </a:xfrm>
-          <a:prstGeom prst="rect">
-            <a:avLst/>
-          </a:prstGeom>
-        </p:spPr>
-        <p:txBody>
-          <a:bodyPr wrap="square">
-            <a:spAutoFit/>
-          </a:bodyPr>
-          <a:lstStyle/>
-          <a:p>
-            <a:pPr marL="285750" lvl="3" indent="-285750">
-              <a:buFont typeface="Arial" panose="020B0604020202020204" pitchFamily="34" charset="0"/>
-              <a:buChar char="•"/>
-            </a:pPr>
-            <a:r>
-              <a:rPr lang="en-US" sz="2000" dirty="0"/>
-              <a:t>The data exploration and cleanup process (accompanied by your </a:t>
-            </a:r>
-            <a:r>
-              <a:rPr lang="en-US" sz="2000" dirty="0" err="1"/>
-              <a:t>Jupyter</a:t>
-            </a:r>
-            <a:r>
-              <a:rPr lang="en-US" sz="2000" dirty="0"/>
-              <a:t> Notebook)</a:t>
-            </a:r>
-          </a:p>
-          <a:p>
-            <a:pPr marL="285750" lvl="3" indent="-285750">
-              <a:buFont typeface="Arial" panose="020B0604020202020204" pitchFamily="34" charset="0"/>
-              <a:buChar char="•"/>
-            </a:pPr>
-            <a:r>
-              <a:rPr lang="en-US" sz="2000" dirty="0"/>
-              <a:t>The analysis process (accompanied by your </a:t>
-            </a:r>
-            <a:r>
-              <a:rPr lang="en-US" sz="2000" dirty="0" err="1"/>
-              <a:t>Jupyter</a:t>
-            </a:r>
-            <a:r>
-              <a:rPr lang="en-US" sz="2000" dirty="0"/>
-              <a:t> Notebook)</a:t>
-            </a:r>
-          </a:p>
-        </p:txBody>
-      </p:sp>
       <p:pic>
         <p:nvPicPr>
           <p:cNvPr id="1026" name="Picture 2" descr="Image result for cloud icon">
@@ -8191,8 +9605,38 @@
         </p:blipFill>
         <p:spPr>
           <a:xfrm>
-            <a:off x="5914924" y="1259539"/>
+            <a:off x="5950823" y="996184"/>
             <a:ext cx="6059630" cy="2368772"/>
+          </a:xfrm>
+          <a:prstGeom prst="rect">
+            <a:avLst/>
+          </a:prstGeom>
+        </p:spPr>
+      </p:pic>
+      <p:pic>
+        <p:nvPicPr>
+          <p:cNvPr id="3" name="Picture 2">
+            <a:extLst>
+              <a:ext uri="{FF2B5EF4-FFF2-40B4-BE49-F238E27FC236}">
+                <a16:creationId xmlns:a16="http://schemas.microsoft.com/office/drawing/2014/main" id="{E71B2E66-4986-47C6-920C-C371D3510AB1}"/>
+              </a:ext>
+            </a:extLst>
+          </p:cNvPr>
+          <p:cNvPicPr>
+            <a:picLocks noChangeAspect="1"/>
+          </p:cNvPicPr>
+          <p:nvPr/>
+        </p:nvPicPr>
+        <p:blipFill>
+          <a:blip r:embed="rId4"/>
+          <a:stretch>
+            <a:fillRect/>
+          </a:stretch>
+        </p:blipFill>
+        <p:spPr>
+          <a:xfrm>
+            <a:off x="6023728" y="3429000"/>
+            <a:ext cx="3259436" cy="2900467"/>
           </a:xfrm>
           <a:prstGeom prst="rect">
             <a:avLst/>
@@ -9035,6 +10479,793 @@
       </p:sp>
       <p:sp>
         <p:nvSpPr>
+          <p:cNvPr id="14" name="Rectangle 13">
+            <a:extLst>
+              <a:ext uri="{FF2B5EF4-FFF2-40B4-BE49-F238E27FC236}">
+                <a16:creationId xmlns:a16="http://schemas.microsoft.com/office/drawing/2014/main" id="{33E5F303-EAC6-47BA-BC08-2AA48388F971}"/>
+              </a:ext>
+            </a:extLst>
+          </p:cNvPr>
+          <p:cNvSpPr/>
+          <p:nvPr/>
+        </p:nvSpPr>
+        <p:spPr>
+          <a:xfrm>
+            <a:off x="1006777" y="0"/>
+            <a:ext cx="1830655" cy="6858000"/>
+          </a:xfrm>
+          <a:prstGeom prst="rect">
+            <a:avLst/>
+          </a:prstGeom>
+          <a:solidFill>
+            <a:srgbClr val="7EA861"/>
+          </a:solidFill>
+          <a:ln>
+            <a:solidFill>
+              <a:srgbClr val="7EA861"/>
+            </a:solidFill>
+          </a:ln>
+        </p:spPr>
+        <p:style>
+          <a:lnRef idx="2">
+            <a:schemeClr val="accent1">
+              <a:shade val="50000"/>
+            </a:schemeClr>
+          </a:lnRef>
+          <a:fillRef idx="1">
+            <a:schemeClr val="accent1"/>
+          </a:fillRef>
+          <a:effectRef idx="0">
+            <a:schemeClr val="accent1"/>
+          </a:effectRef>
+          <a:fontRef idx="minor">
+            <a:schemeClr val="lt1"/>
+          </a:fontRef>
+        </p:style>
+        <p:txBody>
+          <a:bodyPr rtlCol="0" anchor="ctr"/>
+          <a:lstStyle/>
+          <a:p>
+            <a:pPr algn="ctr"/>
+            <a:endParaRPr lang="en-US"/>
+          </a:p>
+        </p:txBody>
+      </p:sp>
+      <p:sp>
+        <p:nvSpPr>
+          <p:cNvPr id="17" name="Rectangle 16">
+            <a:extLst>
+              <a:ext uri="{FF2B5EF4-FFF2-40B4-BE49-F238E27FC236}">
+                <a16:creationId xmlns:a16="http://schemas.microsoft.com/office/drawing/2014/main" id="{047C8CCB-F95D-4249-92DD-651249D3535A}"/>
+              </a:ext>
+              <a:ext uri="{C183D7F6-B498-43B3-948B-1728B52AA6E4}">
+                <adec:decorative xmlns:adec="http://schemas.microsoft.com/office/drawing/2017/decorative" val="1"/>
+              </a:ext>
+            </a:extLst>
+          </p:cNvPr>
+          <p:cNvSpPr>
+            <a:spLocks noGrp="1" noRot="1" noChangeAspect="1" noMove="1" noResize="1" noEditPoints="1" noAdjustHandles="1" noChangeArrowheads="1" noChangeShapeType="1" noTextEdit="1"/>
+          </p:cNvSpPr>
+          <p:nvPr>
+            <p:extLst>
+              <p:ext uri="{386F3935-93C4-4BCD-93E2-E3B085C9AB24}">
+                <p16:designElem xmlns:p16="http://schemas.microsoft.com/office/powerpoint/2015/main" val="1"/>
+              </p:ext>
+            </p:extLst>
+          </p:nvPr>
+        </p:nvSpPr>
+        <p:spPr>
+          <a:xfrm>
+            <a:off x="0" y="0"/>
+            <a:ext cx="2013557" cy="6858000"/>
+          </a:xfrm>
+          <a:prstGeom prst="rect">
+            <a:avLst/>
+          </a:prstGeom>
+          <a:solidFill>
+            <a:srgbClr val="542C39"/>
+          </a:solidFill>
+          <a:ln>
+            <a:noFill/>
+          </a:ln>
+        </p:spPr>
+        <p:style>
+          <a:lnRef idx="2">
+            <a:schemeClr val="accent1">
+              <a:shade val="50000"/>
+            </a:schemeClr>
+          </a:lnRef>
+          <a:fillRef idx="1">
+            <a:schemeClr val="accent1"/>
+          </a:fillRef>
+          <a:effectRef idx="0">
+            <a:schemeClr val="accent1"/>
+          </a:effectRef>
+          <a:fontRef idx="minor">
+            <a:schemeClr val="lt1"/>
+          </a:fontRef>
+        </p:style>
+        <p:txBody>
+          <a:bodyPr rtlCol="0" anchor="ctr"/>
+          <a:lstStyle/>
+          <a:p>
+            <a:pPr algn="ctr"/>
+            <a:endParaRPr lang="en-US"/>
+          </a:p>
+        </p:txBody>
+      </p:sp>
+      <p:sp>
+        <p:nvSpPr>
+          <p:cNvPr id="11" name="Rectangle 10">
+            <a:extLst>
+              <a:ext uri="{FF2B5EF4-FFF2-40B4-BE49-F238E27FC236}">
+                <a16:creationId xmlns:a16="http://schemas.microsoft.com/office/drawing/2014/main" id="{8FF6D1F6-BE0D-405C-9028-EC70AF75D232}"/>
+              </a:ext>
+            </a:extLst>
+          </p:cNvPr>
+          <p:cNvSpPr/>
+          <p:nvPr/>
+        </p:nvSpPr>
+        <p:spPr>
+          <a:xfrm>
+            <a:off x="-1" y="0"/>
+            <a:ext cx="2013557" cy="6858000"/>
+          </a:xfrm>
+          <a:prstGeom prst="rect">
+            <a:avLst/>
+          </a:prstGeom>
+          <a:solidFill>
+            <a:srgbClr val="262626"/>
+          </a:solidFill>
+        </p:spPr>
+        <p:style>
+          <a:lnRef idx="2">
+            <a:schemeClr val="accent1">
+              <a:shade val="50000"/>
+            </a:schemeClr>
+          </a:lnRef>
+          <a:fillRef idx="1">
+            <a:schemeClr val="accent1"/>
+          </a:fillRef>
+          <a:effectRef idx="0">
+            <a:schemeClr val="accent1"/>
+          </a:effectRef>
+          <a:fontRef idx="minor">
+            <a:schemeClr val="lt1"/>
+          </a:fontRef>
+        </p:style>
+        <p:txBody>
+          <a:bodyPr rtlCol="0" anchor="ctr"/>
+          <a:lstStyle/>
+          <a:p>
+            <a:pPr algn="ctr"/>
+            <a:endParaRPr lang="en-US"/>
+          </a:p>
+        </p:txBody>
+      </p:sp>
+      <p:sp>
+        <p:nvSpPr>
+          <p:cNvPr id="23" name="Rectangle 22">
+            <a:extLst>
+              <a:ext uri="{FF2B5EF4-FFF2-40B4-BE49-F238E27FC236}">
+                <a16:creationId xmlns:a16="http://schemas.microsoft.com/office/drawing/2014/main" id="{28403A2A-F5B0-4C1E-92F8-F68B4185D272}"/>
+              </a:ext>
+            </a:extLst>
+          </p:cNvPr>
+          <p:cNvSpPr/>
+          <p:nvPr/>
+        </p:nvSpPr>
+        <p:spPr>
+          <a:xfrm>
+            <a:off x="2499360" y="6541462"/>
+            <a:ext cx="9666205" cy="316538"/>
+          </a:xfrm>
+          <a:prstGeom prst="rect">
+            <a:avLst/>
+          </a:prstGeom>
+          <a:solidFill>
+            <a:srgbClr val="7EA861"/>
+          </a:solidFill>
+          <a:ln>
+            <a:solidFill>
+              <a:srgbClr val="7EA861"/>
+            </a:solidFill>
+          </a:ln>
+        </p:spPr>
+        <p:style>
+          <a:lnRef idx="2">
+            <a:schemeClr val="accent1">
+              <a:shade val="50000"/>
+            </a:schemeClr>
+          </a:lnRef>
+          <a:fillRef idx="1">
+            <a:schemeClr val="accent1"/>
+          </a:fillRef>
+          <a:effectRef idx="0">
+            <a:schemeClr val="accent1"/>
+          </a:effectRef>
+          <a:fontRef idx="minor">
+            <a:schemeClr val="lt1"/>
+          </a:fontRef>
+        </p:style>
+        <p:txBody>
+          <a:bodyPr rtlCol="0" anchor="ctr"/>
+          <a:lstStyle/>
+          <a:p>
+            <a:pPr algn="ctr"/>
+            <a:endParaRPr lang="en-US"/>
+          </a:p>
+        </p:txBody>
+      </p:sp>
+      <p:pic>
+        <p:nvPicPr>
+          <p:cNvPr id="8" name="Graphic 7">
+            <a:extLst>
+              <a:ext uri="{FF2B5EF4-FFF2-40B4-BE49-F238E27FC236}">
+                <a16:creationId xmlns:a16="http://schemas.microsoft.com/office/drawing/2014/main" id="{DBFC207F-9F95-4B47-B561-FA585005A74A}"/>
+              </a:ext>
+            </a:extLst>
+          </p:cNvPr>
+          <p:cNvPicPr>
+            <a:picLocks noChangeAspect="1"/>
+          </p:cNvPicPr>
+          <p:nvPr/>
+        </p:nvPicPr>
+        <p:blipFill>
+          <a:blip r:embed="rId2">
+            <a:extLst>
+              <a:ext uri="{96DAC541-7B7A-43D3-8B79-37D633B846F1}">
+                <asvg:svgBlip xmlns:asvg="http://schemas.microsoft.com/office/drawing/2016/SVG/main" r:embed="rId3"/>
+              </a:ext>
+            </a:extLst>
+          </a:blip>
+          <a:stretch>
+            <a:fillRect/>
+          </a:stretch>
+        </p:blipFill>
+        <p:spPr>
+          <a:xfrm>
+            <a:off x="2968316" y="1691857"/>
+            <a:ext cx="3457884" cy="1258669"/>
+          </a:xfrm>
+          <a:prstGeom prst="rect">
+            <a:avLst/>
+          </a:prstGeom>
+        </p:spPr>
+      </p:pic>
+      <p:sp>
+        <p:nvSpPr>
+          <p:cNvPr id="9" name="TextBox 8">
+            <a:extLst>
+              <a:ext uri="{FF2B5EF4-FFF2-40B4-BE49-F238E27FC236}">
+                <a16:creationId xmlns:a16="http://schemas.microsoft.com/office/drawing/2014/main" id="{CE335163-405F-40F2-9D3D-CF98CF983DF9}"/>
+              </a:ext>
+            </a:extLst>
+          </p:cNvPr>
+          <p:cNvSpPr txBox="1"/>
+          <p:nvPr/>
+        </p:nvSpPr>
+        <p:spPr>
+          <a:xfrm>
+            <a:off x="3127107" y="3066549"/>
+            <a:ext cx="3669957" cy="1077218"/>
+          </a:xfrm>
+          <a:prstGeom prst="rect">
+            <a:avLst/>
+          </a:prstGeom>
+          <a:noFill/>
+        </p:spPr>
+        <p:txBody>
+          <a:bodyPr wrap="square" rtlCol="0">
+            <a:spAutoFit/>
+          </a:bodyPr>
+          <a:lstStyle/>
+          <a:p>
+            <a:r>
+              <a:rPr lang="en-US" b="1" dirty="0">
+                <a:solidFill>
+                  <a:schemeClr val="accent6">
+                    <a:lumMod val="75000"/>
+                  </a:schemeClr>
+                </a:solidFill>
+              </a:rPr>
+              <a:t>relative mean absolute difference</a:t>
+            </a:r>
+          </a:p>
+          <a:p>
+            <a:r>
+              <a:rPr lang="en-US" sz="1400" dirty="0"/>
+              <a:t>which is mathematically equivalent to the Lorenz curve definition</a:t>
+            </a:r>
+          </a:p>
+          <a:p>
+            <a:endParaRPr lang="en-US" dirty="0"/>
+          </a:p>
+        </p:txBody>
+      </p:sp>
+      <p:pic>
+        <p:nvPicPr>
+          <p:cNvPr id="10" name="Picture 9" descr="A close up of a knife&#10;&#10;Description automatically generated">
+            <a:extLst>
+              <a:ext uri="{FF2B5EF4-FFF2-40B4-BE49-F238E27FC236}">
+                <a16:creationId xmlns:a16="http://schemas.microsoft.com/office/drawing/2014/main" id="{FCC40411-337D-458D-9B3D-E88EBD257669}"/>
+              </a:ext>
+            </a:extLst>
+          </p:cNvPr>
+          <p:cNvPicPr>
+            <a:picLocks noChangeAspect="1"/>
+          </p:cNvPicPr>
+          <p:nvPr/>
+        </p:nvPicPr>
+        <p:blipFill>
+          <a:blip r:embed="rId4">
+            <a:duotone>
+              <a:schemeClr val="accent6">
+                <a:shade val="45000"/>
+                <a:satMod val="135000"/>
+              </a:schemeClr>
+              <a:prstClr val="white"/>
+            </a:duotone>
+          </a:blip>
+          <a:stretch>
+            <a:fillRect/>
+          </a:stretch>
+        </p:blipFill>
+        <p:spPr>
+          <a:xfrm>
+            <a:off x="7054524" y="1243338"/>
+            <a:ext cx="5111041" cy="5111041"/>
+          </a:xfrm>
+          <a:prstGeom prst="rect">
+            <a:avLst/>
+          </a:prstGeom>
+        </p:spPr>
+      </p:pic>
+      <p:sp>
+        <p:nvSpPr>
+          <p:cNvPr id="12" name="Subtitle 2">
+            <a:extLst>
+              <a:ext uri="{FF2B5EF4-FFF2-40B4-BE49-F238E27FC236}">
+                <a16:creationId xmlns:a16="http://schemas.microsoft.com/office/drawing/2014/main" id="{2C713AD6-EF9C-4F34-8470-883D14E40341}"/>
+              </a:ext>
+            </a:extLst>
+          </p:cNvPr>
+          <p:cNvSpPr txBox="1">
+            <a:spLocks/>
+          </p:cNvSpPr>
+          <p:nvPr/>
+        </p:nvSpPr>
+        <p:spPr>
+          <a:xfrm>
+            <a:off x="2499360" y="837717"/>
+            <a:ext cx="2867688" cy="695557"/>
+          </a:xfrm>
+          <a:prstGeom prst="rect">
+            <a:avLst/>
+          </a:prstGeom>
+        </p:spPr>
+        <p:txBody>
+          <a:bodyPr vert="horz" lIns="91440" tIns="45720" rIns="91440" bIns="45720" rtlCol="0" anchor="b">
+            <a:normAutofit/>
+          </a:bodyPr>
+          <a:lstStyle>
+            <a:lvl1pPr marL="0" indent="0" algn="l" defTabSz="914400" rtl="0" eaLnBrk="1" latinLnBrk="0" hangingPunct="1">
+              <a:lnSpc>
+                <a:spcPct val="90000"/>
+              </a:lnSpc>
+              <a:spcBef>
+                <a:spcPts val="1000"/>
+              </a:spcBef>
+              <a:buFont typeface="Arial" panose="020B0604020202020204" pitchFamily="34" charset="0"/>
+              <a:buNone/>
+              <a:defRPr sz="2400" b="1" kern="1200">
+                <a:solidFill>
+                  <a:schemeClr val="tx1"/>
+                </a:solidFill>
+                <a:latin typeface="+mn-lt"/>
+                <a:ea typeface="+mn-ea"/>
+                <a:cs typeface="+mn-cs"/>
+              </a:defRPr>
+            </a:lvl1pPr>
+            <a:lvl2pPr marL="457200" indent="0" algn="l" defTabSz="914400" rtl="0" eaLnBrk="1" latinLnBrk="0" hangingPunct="1">
+              <a:lnSpc>
+                <a:spcPct val="90000"/>
+              </a:lnSpc>
+              <a:spcBef>
+                <a:spcPts val="500"/>
+              </a:spcBef>
+              <a:buFont typeface="Arial" panose="020B0604020202020204" pitchFamily="34" charset="0"/>
+              <a:buNone/>
+              <a:defRPr sz="2000" b="1" kern="1200">
+                <a:solidFill>
+                  <a:schemeClr val="tx1"/>
+                </a:solidFill>
+                <a:latin typeface="+mn-lt"/>
+                <a:ea typeface="+mn-ea"/>
+                <a:cs typeface="+mn-cs"/>
+              </a:defRPr>
+            </a:lvl2pPr>
+            <a:lvl3pPr marL="914400" indent="0" algn="l" defTabSz="914400" rtl="0" eaLnBrk="1" latinLnBrk="0" hangingPunct="1">
+              <a:lnSpc>
+                <a:spcPct val="90000"/>
+              </a:lnSpc>
+              <a:spcBef>
+                <a:spcPts val="500"/>
+              </a:spcBef>
+              <a:buFont typeface="Arial" panose="020B0604020202020204" pitchFamily="34" charset="0"/>
+              <a:buNone/>
+              <a:defRPr sz="1800" b="1" kern="1200">
+                <a:solidFill>
+                  <a:schemeClr val="tx1"/>
+                </a:solidFill>
+                <a:latin typeface="+mn-lt"/>
+                <a:ea typeface="+mn-ea"/>
+                <a:cs typeface="+mn-cs"/>
+              </a:defRPr>
+            </a:lvl3pPr>
+            <a:lvl4pPr marL="1371600" indent="0" algn="l" defTabSz="914400" rtl="0" eaLnBrk="1" latinLnBrk="0" hangingPunct="1">
+              <a:lnSpc>
+                <a:spcPct val="90000"/>
+              </a:lnSpc>
+              <a:spcBef>
+                <a:spcPts val="500"/>
+              </a:spcBef>
+              <a:buFont typeface="Arial" panose="020B0604020202020204" pitchFamily="34" charset="0"/>
+              <a:buNone/>
+              <a:defRPr sz="1600" b="1" kern="1200">
+                <a:solidFill>
+                  <a:schemeClr val="tx1"/>
+                </a:solidFill>
+                <a:latin typeface="+mn-lt"/>
+                <a:ea typeface="+mn-ea"/>
+                <a:cs typeface="+mn-cs"/>
+              </a:defRPr>
+            </a:lvl4pPr>
+            <a:lvl5pPr marL="1828800" indent="0" algn="l" defTabSz="914400" rtl="0" eaLnBrk="1" latinLnBrk="0" hangingPunct="1">
+              <a:lnSpc>
+                <a:spcPct val="90000"/>
+              </a:lnSpc>
+              <a:spcBef>
+                <a:spcPts val="500"/>
+              </a:spcBef>
+              <a:buFont typeface="Arial" panose="020B0604020202020204" pitchFamily="34" charset="0"/>
+              <a:buNone/>
+              <a:defRPr sz="1600" b="1" kern="1200">
+                <a:solidFill>
+                  <a:schemeClr val="tx1"/>
+                </a:solidFill>
+                <a:latin typeface="+mn-lt"/>
+                <a:ea typeface="+mn-ea"/>
+                <a:cs typeface="+mn-cs"/>
+              </a:defRPr>
+            </a:lvl5pPr>
+            <a:lvl6pPr marL="2286000" indent="0" algn="l" defTabSz="914400" rtl="0" eaLnBrk="1" latinLnBrk="0" hangingPunct="1">
+              <a:lnSpc>
+                <a:spcPct val="90000"/>
+              </a:lnSpc>
+              <a:spcBef>
+                <a:spcPts val="500"/>
+              </a:spcBef>
+              <a:buFont typeface="Arial" panose="020B0604020202020204" pitchFamily="34" charset="0"/>
+              <a:buNone/>
+              <a:defRPr sz="1600" b="1" kern="1200">
+                <a:solidFill>
+                  <a:schemeClr val="tx1"/>
+                </a:solidFill>
+                <a:latin typeface="+mn-lt"/>
+                <a:ea typeface="+mn-ea"/>
+                <a:cs typeface="+mn-cs"/>
+              </a:defRPr>
+            </a:lvl6pPr>
+            <a:lvl7pPr marL="2743200" indent="0" algn="l" defTabSz="914400" rtl="0" eaLnBrk="1" latinLnBrk="0" hangingPunct="1">
+              <a:lnSpc>
+                <a:spcPct val="90000"/>
+              </a:lnSpc>
+              <a:spcBef>
+                <a:spcPts val="500"/>
+              </a:spcBef>
+              <a:buFont typeface="Arial" panose="020B0604020202020204" pitchFamily="34" charset="0"/>
+              <a:buNone/>
+              <a:defRPr sz="1600" b="1" kern="1200">
+                <a:solidFill>
+                  <a:schemeClr val="tx1"/>
+                </a:solidFill>
+                <a:latin typeface="+mn-lt"/>
+                <a:ea typeface="+mn-ea"/>
+                <a:cs typeface="+mn-cs"/>
+              </a:defRPr>
+            </a:lvl7pPr>
+            <a:lvl8pPr marL="3200400" indent="0" algn="l" defTabSz="914400" rtl="0" eaLnBrk="1" latinLnBrk="0" hangingPunct="1">
+              <a:lnSpc>
+                <a:spcPct val="90000"/>
+              </a:lnSpc>
+              <a:spcBef>
+                <a:spcPts val="500"/>
+              </a:spcBef>
+              <a:buFont typeface="Arial" panose="020B0604020202020204" pitchFamily="34" charset="0"/>
+              <a:buNone/>
+              <a:defRPr sz="1600" b="1" kern="1200">
+                <a:solidFill>
+                  <a:schemeClr val="tx1"/>
+                </a:solidFill>
+                <a:latin typeface="+mn-lt"/>
+                <a:ea typeface="+mn-ea"/>
+                <a:cs typeface="+mn-cs"/>
+              </a:defRPr>
+            </a:lvl8pPr>
+            <a:lvl9pPr marL="3657600" indent="0" algn="l" defTabSz="914400" rtl="0" eaLnBrk="1" latinLnBrk="0" hangingPunct="1">
+              <a:lnSpc>
+                <a:spcPct val="90000"/>
+              </a:lnSpc>
+              <a:spcBef>
+                <a:spcPts val="500"/>
+              </a:spcBef>
+              <a:buFont typeface="Arial" panose="020B0604020202020204" pitchFamily="34" charset="0"/>
+              <a:buNone/>
+              <a:defRPr sz="1600" b="1" kern="1200">
+                <a:solidFill>
+                  <a:schemeClr val="tx1"/>
+                </a:solidFill>
+                <a:latin typeface="+mn-lt"/>
+                <a:ea typeface="+mn-ea"/>
+                <a:cs typeface="+mn-cs"/>
+              </a:defRPr>
+            </a:lvl9pPr>
+          </a:lstStyle>
+          <a:p>
+            <a:pPr algn="r"/>
+            <a:r>
+              <a:rPr lang="en-US" sz="2200" dirty="0"/>
+              <a:t>The Gini Coefficient</a:t>
+            </a:r>
+            <a:endParaRPr lang="en-US" sz="2200" dirty="0">
+              <a:solidFill>
+                <a:srgbClr val="000000"/>
+              </a:solidFill>
+            </a:endParaRPr>
+          </a:p>
+        </p:txBody>
+      </p:sp>
+      <p:sp>
+        <p:nvSpPr>
+          <p:cNvPr id="13" name="TextBox 12">
+            <a:extLst>
+              <a:ext uri="{FF2B5EF4-FFF2-40B4-BE49-F238E27FC236}">
+                <a16:creationId xmlns:a16="http://schemas.microsoft.com/office/drawing/2014/main" id="{62FFA060-329C-4A11-AA1F-72AB8581F143}"/>
+              </a:ext>
+            </a:extLst>
+          </p:cNvPr>
+          <p:cNvSpPr txBox="1"/>
+          <p:nvPr/>
+        </p:nvSpPr>
+        <p:spPr>
+          <a:xfrm>
+            <a:off x="3127107" y="4173515"/>
+            <a:ext cx="3954560" cy="2031325"/>
+          </a:xfrm>
+          <a:prstGeom prst="rect">
+            <a:avLst/>
+          </a:prstGeom>
+          <a:noFill/>
+        </p:spPr>
+        <p:txBody>
+          <a:bodyPr wrap="square" rtlCol="0">
+            <a:spAutoFit/>
+          </a:bodyPr>
+          <a:lstStyle/>
+          <a:p>
+            <a:r>
+              <a:rPr lang="en-US" dirty="0"/>
+              <a:t>A single number aimed at measuring the degree of inequality in a distribution. It is most often used in economics to measure how far a country's wealth or income distribution deviates from a totally equal distribution</a:t>
+            </a:r>
+          </a:p>
+        </p:txBody>
+      </p:sp>
+      <p:sp>
+        <p:nvSpPr>
+          <p:cNvPr id="16" name="Rectangle 15">
+            <a:extLst>
+              <a:ext uri="{FF2B5EF4-FFF2-40B4-BE49-F238E27FC236}">
+                <a16:creationId xmlns:a16="http://schemas.microsoft.com/office/drawing/2014/main" id="{177093B0-C47F-46BD-97AF-50F2A5FFE834}"/>
+              </a:ext>
+            </a:extLst>
+          </p:cNvPr>
+          <p:cNvSpPr/>
+          <p:nvPr/>
+        </p:nvSpPr>
+        <p:spPr>
+          <a:xfrm>
+            <a:off x="2876370" y="188969"/>
+            <a:ext cx="4768998" cy="461665"/>
+          </a:xfrm>
+          <a:prstGeom prst="rect">
+            <a:avLst/>
+          </a:prstGeom>
+        </p:spPr>
+        <p:txBody>
+          <a:bodyPr wrap="none">
+            <a:spAutoFit/>
+          </a:bodyPr>
+          <a:lstStyle/>
+          <a:p>
+            <a:r>
+              <a:rPr lang="en-US" sz="2400" b="1" dirty="0">
+                <a:solidFill>
+                  <a:srgbClr val="002060"/>
+                </a:solidFill>
+              </a:rPr>
+              <a:t>Data Exploration: Happiness Factors</a:t>
+            </a:r>
+          </a:p>
+        </p:txBody>
+      </p:sp>
+      <p:pic>
+        <p:nvPicPr>
+          <p:cNvPr id="19" name="Picture 18">
+            <a:extLst>
+              <a:ext uri="{FF2B5EF4-FFF2-40B4-BE49-F238E27FC236}">
+                <a16:creationId xmlns:a16="http://schemas.microsoft.com/office/drawing/2014/main" id="{78C9E4AE-9E62-4D4C-90F3-7E7C809A3779}"/>
+              </a:ext>
+            </a:extLst>
+          </p:cNvPr>
+          <p:cNvPicPr>
+            <a:picLocks noChangeAspect="1"/>
+          </p:cNvPicPr>
+          <p:nvPr/>
+        </p:nvPicPr>
+        <p:blipFill>
+          <a:blip r:embed="rId5"/>
+          <a:stretch>
+            <a:fillRect/>
+          </a:stretch>
+        </p:blipFill>
+        <p:spPr>
+          <a:xfrm>
+            <a:off x="7684306" y="103682"/>
+            <a:ext cx="693284" cy="609249"/>
+          </a:xfrm>
+          <a:prstGeom prst="rect">
+            <a:avLst/>
+          </a:prstGeom>
+        </p:spPr>
+      </p:pic>
+      <p:sp>
+        <p:nvSpPr>
+          <p:cNvPr id="20" name="Rectangle 19">
+            <a:extLst>
+              <a:ext uri="{FF2B5EF4-FFF2-40B4-BE49-F238E27FC236}">
+                <a16:creationId xmlns:a16="http://schemas.microsoft.com/office/drawing/2014/main" id="{58C79B57-E5FD-440B-9767-F51524A11683}"/>
+              </a:ext>
+            </a:extLst>
+          </p:cNvPr>
+          <p:cNvSpPr/>
+          <p:nvPr/>
+        </p:nvSpPr>
+        <p:spPr>
+          <a:xfrm>
+            <a:off x="8436455" y="194717"/>
+            <a:ext cx="3015505" cy="369332"/>
+          </a:xfrm>
+          <a:prstGeom prst="rect">
+            <a:avLst/>
+          </a:prstGeom>
+        </p:spPr>
+        <p:txBody>
+          <a:bodyPr wrap="none">
+            <a:spAutoFit/>
+          </a:bodyPr>
+          <a:lstStyle/>
+          <a:p>
+            <a:r>
+              <a:rPr lang="en-US" dirty="0"/>
+              <a:t>UN World Happiness Rankings</a:t>
+            </a:r>
+          </a:p>
+        </p:txBody>
+      </p:sp>
+    </p:spTree>
+    <p:extLst>
+      <p:ext uri="{BB962C8B-B14F-4D97-AF65-F5344CB8AC3E}">
+        <p14:creationId xmlns:p14="http://schemas.microsoft.com/office/powerpoint/2010/main" val="1999621410"/>
+      </p:ext>
+    </p:extLst>
+  </p:cSld>
+  <p:clrMapOvr>
+    <a:masterClrMapping/>
+  </p:clrMapOvr>
+</p:sld>
+</file>
+
+<file path=ppt/slides/slide7.xml><?xml version="1.0" encoding="utf-8"?>
+<p:sld xmlns:a="http://schemas.openxmlformats.org/drawingml/2006/main" xmlns:r="http://schemas.openxmlformats.org/officeDocument/2006/relationships" xmlns:p="http://schemas.openxmlformats.org/presentationml/2006/main">
+  <p:cSld>
+    <p:bg>
+      <p:bgPr>
+        <a:solidFill>
+          <a:srgbClr val="542C39"/>
+        </a:solidFill>
+        <a:effectLst/>
+      </p:bgPr>
+    </p:bg>
+    <p:spTree>
+      <p:nvGrpSpPr>
+        <p:cNvPr id="1" name=""/>
+        <p:cNvGrpSpPr/>
+        <p:nvPr/>
+      </p:nvGrpSpPr>
+      <p:grpSpPr>
+        <a:xfrm>
+          <a:off x="0" y="0"/>
+          <a:ext cx="0" cy="0"/>
+          <a:chOff x="0" y="0"/>
+          <a:chExt cx="0" cy="0"/>
+        </a:xfrm>
+      </p:grpSpPr>
+      <p:sp>
+        <p:nvSpPr>
+          <p:cNvPr id="18" name="Rectangle 14">
+            <a:extLst>
+              <a:ext uri="{FF2B5EF4-FFF2-40B4-BE49-F238E27FC236}">
+                <a16:creationId xmlns:a16="http://schemas.microsoft.com/office/drawing/2014/main" id="{6753252F-4873-4F63-801D-CC719279A7D5}"/>
+              </a:ext>
+              <a:ext uri="{C183D7F6-B498-43B3-948B-1728B52AA6E4}">
+                <adec:decorative xmlns:adec="http://schemas.microsoft.com/office/drawing/2017/decorative" val="1"/>
+              </a:ext>
+            </a:extLst>
+          </p:cNvPr>
+          <p:cNvSpPr>
+            <a:spLocks noGrp="1" noRot="1" noChangeAspect="1" noMove="1" noResize="1" noEditPoints="1" noAdjustHandles="1" noChangeArrowheads="1" noChangeShapeType="1" noTextEdit="1"/>
+          </p:cNvSpPr>
+          <p:nvPr>
+            <p:extLst>
+              <p:ext uri="{386F3935-93C4-4BCD-93E2-E3B085C9AB24}">
+                <p16:designElem xmlns:p16="http://schemas.microsoft.com/office/powerpoint/2015/main" val="1"/>
+              </p:ext>
+            </p:extLst>
+          </p:nvPr>
+        </p:nvSpPr>
+        <p:spPr>
+          <a:xfrm>
+            <a:off x="0" y="0"/>
+            <a:ext cx="12192000" cy="6858000"/>
+          </a:xfrm>
+          <a:prstGeom prst="rect">
+            <a:avLst/>
+          </a:prstGeom>
+          <a:solidFill>
+            <a:srgbClr val="FFFFFF"/>
+          </a:solidFill>
+          <a:ln>
+            <a:noFill/>
+          </a:ln>
+        </p:spPr>
+        <p:style>
+          <a:lnRef idx="2">
+            <a:schemeClr val="accent1">
+              <a:shade val="50000"/>
+            </a:schemeClr>
+          </a:lnRef>
+          <a:fillRef idx="1">
+            <a:schemeClr val="accent1"/>
+          </a:fillRef>
+          <a:effectRef idx="0">
+            <a:schemeClr val="accent1"/>
+          </a:effectRef>
+          <a:fontRef idx="minor">
+            <a:schemeClr val="lt1"/>
+          </a:fontRef>
+        </p:style>
+        <p:txBody>
+          <a:bodyPr rtlCol="0" anchor="ctr"/>
+          <a:lstStyle/>
+          <a:p>
+            <a:pPr algn="ctr"/>
+            <a:endParaRPr lang="en-US"/>
+          </a:p>
+        </p:txBody>
+      </p:sp>
+      <p:sp>
+        <p:nvSpPr>
           <p:cNvPr id="17" name="Rectangle 16">
             <a:extLst>
               <a:ext uri="{FF2B5EF4-FFF2-40B4-BE49-F238E27FC236}">
@@ -9591,7 +11822,7 @@
 </p:sld>
 </file>
 
-<file path=ppt/slides/slide7.xml><?xml version="1.0" encoding="utf-8"?>
+<file path=ppt/slides/slide8.xml><?xml version="1.0" encoding="utf-8"?>
 <p:sld xmlns:a="http://schemas.openxmlformats.org/drawingml/2006/main" xmlns:r="http://schemas.openxmlformats.org/officeDocument/2006/relationships" xmlns:p="http://schemas.openxmlformats.org/presentationml/2006/main">
   <p:cSld>
     <p:bg>
@@ -9934,7 +12165,7 @@
         </p:nvSpPr>
         <p:spPr>
           <a:xfrm>
-            <a:off x="2928872" y="848926"/>
+            <a:off x="2854005" y="664260"/>
             <a:ext cx="6593224" cy="369332"/>
           </a:xfrm>
           <a:prstGeom prst="rect">
@@ -9964,70 +12195,6 @@
       </p:sp>
       <p:sp>
         <p:nvSpPr>
-          <p:cNvPr id="3" name="Rectangle 2">
-            <a:extLst>
-              <a:ext uri="{FF2B5EF4-FFF2-40B4-BE49-F238E27FC236}">
-                <a16:creationId xmlns:a16="http://schemas.microsoft.com/office/drawing/2014/main" id="{69480590-2FF0-4D28-B943-D29C7874E490}"/>
-              </a:ext>
-            </a:extLst>
-          </p:cNvPr>
-          <p:cNvSpPr/>
-          <p:nvPr/>
-        </p:nvSpPr>
-        <p:spPr>
-          <a:xfrm>
-            <a:off x="5519635" y="1405508"/>
-            <a:ext cx="6096000" cy="1323439"/>
-          </a:xfrm>
-          <a:prstGeom prst="rect">
-            <a:avLst/>
-          </a:prstGeom>
-        </p:spPr>
-        <p:txBody>
-          <a:bodyPr>
-            <a:spAutoFit/>
-          </a:bodyPr>
-          <a:lstStyle/>
-          <a:p>
-            <a:pPr marL="285750" lvl="3" indent="-285750">
-              <a:buFont typeface="Arial" panose="020B0604020202020204" pitchFamily="34" charset="0"/>
-              <a:buChar char="•"/>
-            </a:pPr>
-            <a:r>
-              <a:rPr lang="en-US" sz="2000" dirty="0"/>
-              <a:t>The data exploration and cleanup process (accompanied by your </a:t>
-            </a:r>
-            <a:r>
-              <a:rPr lang="en-US" sz="2000" dirty="0" err="1"/>
-              <a:t>Jupyter</a:t>
-            </a:r>
-            <a:r>
-              <a:rPr lang="en-US" sz="2000" dirty="0"/>
-              <a:t> Notebook)</a:t>
-            </a:r>
-          </a:p>
-          <a:p>
-            <a:pPr marL="285750" lvl="3" indent="-285750">
-              <a:buFont typeface="Arial" panose="020B0604020202020204" pitchFamily="34" charset="0"/>
-              <a:buChar char="•"/>
-            </a:pPr>
-            <a:r>
-              <a:rPr lang="en-US" sz="2000" dirty="0"/>
-              <a:t>The analysis process (accompanied by your </a:t>
-            </a:r>
-            <a:r>
-              <a:rPr lang="en-US" sz="2000" dirty="0" err="1"/>
-              <a:t>Jupyter</a:t>
-            </a:r>
-            <a:r>
-              <a:rPr lang="en-US" sz="2000" dirty="0"/>
-              <a:t> Notebook)</a:t>
-            </a:r>
-          </a:p>
-        </p:txBody>
-      </p:sp>
-      <p:sp>
-        <p:nvSpPr>
           <p:cNvPr id="20" name="Subtitle 2">
             <a:extLst>
               <a:ext uri="{FF2B5EF4-FFF2-40B4-BE49-F238E27FC236}">
@@ -10042,8 +12209,8 @@
         </p:nvSpPr>
         <p:spPr>
           <a:xfrm>
-            <a:off x="1778000" y="20859"/>
-            <a:ext cx="8236968" cy="838831"/>
+            <a:off x="2668588" y="-40496"/>
+            <a:ext cx="4033870" cy="838831"/>
           </a:xfrm>
           <a:prstGeom prst="rect">
             <a:avLst/>
@@ -10220,10 +12387,10 @@
           <a:p>
             <a:pPr algn="r"/>
             <a:r>
-              <a:rPr lang="en-US" sz="3600" dirty="0"/>
-              <a:t>Data Exploration &amp; Clean-up Process</a:t>
+              <a:rPr lang="en-US" sz="4000" dirty="0"/>
+              <a:t>A Deep Data Dive</a:t>
             </a:r>
-            <a:endParaRPr lang="en-US" sz="3600" dirty="0">
+            <a:endParaRPr lang="en-US" sz="4000" dirty="0">
               <a:solidFill>
                 <a:srgbClr val="000000"/>
               </a:solidFill>
@@ -10236,7 +12403,7 @@
           <p:cNvPr id="4" name="Rectangle 3">
             <a:extLst>
               <a:ext uri="{FF2B5EF4-FFF2-40B4-BE49-F238E27FC236}">
-                <a16:creationId xmlns:a16="http://schemas.microsoft.com/office/drawing/2014/main" id="{A7A3A4F4-CC49-41CD-8A92-003B16BA2A95}"/>
+                <a16:creationId xmlns:a16="http://schemas.microsoft.com/office/drawing/2014/main" id="{465AA7FF-9D7F-4763-BA9C-3E0486BFA425}"/>
               </a:ext>
             </a:extLst>
           </p:cNvPr>
@@ -10245,944 +12412,368 @@
         </p:nvSpPr>
         <p:spPr>
           <a:xfrm>
-            <a:off x="3642840" y="3091781"/>
-            <a:ext cx="6096000" cy="1938992"/>
+            <a:off x="2897064" y="1074088"/>
+            <a:ext cx="2928943" cy="461665"/>
           </a:xfrm>
           <a:prstGeom prst="rect">
             <a:avLst/>
           </a:prstGeom>
         </p:spPr>
         <p:txBody>
-          <a:bodyPr>
+          <a:bodyPr wrap="none">
             <a:spAutoFit/>
           </a:bodyPr>
           <a:lstStyle/>
           <a:p>
-            <a:pPr marL="285750" lvl="3" indent="-285750">
-              <a:buFont typeface="Arial" panose="020B0604020202020204" pitchFamily="34" charset="0"/>
-              <a:buChar char="•"/>
-            </a:pPr>
             <a:r>
-              <a:rPr lang="en-US" sz="2000" dirty="0"/>
-              <a:t>Your conclusions. This should include a numerical summary as well as visualizations of that summary</a:t>
+              <a:rPr lang="en-US" sz="2400" b="1" dirty="0">
+                <a:solidFill>
+                  <a:srgbClr val="002060"/>
+                </a:solidFill>
+              </a:rPr>
+              <a:t>Data Cleanup Process</a:t>
             </a:r>
           </a:p>
-          <a:p>
-            <a:pPr marL="285750" lvl="3" indent="-285750">
-              <a:buFont typeface="Arial" panose="020B0604020202020204" pitchFamily="34" charset="0"/>
-              <a:buChar char="•"/>
-            </a:pPr>
-            <a:r>
-              <a:rPr lang="en-US" sz="2000" dirty="0"/>
-              <a:t>Discuss the implications of your findings. This is where you get to have an open-ended discussion about what your findings "mean</a:t>
-            </a:r>
-          </a:p>
-          <a:p>
-            <a:pPr marL="285750" lvl="3" indent="-285750">
-              <a:buFont typeface="Arial" panose="020B0604020202020204" pitchFamily="34" charset="0"/>
-              <a:buChar char="•"/>
-            </a:pPr>
-            <a:r>
-              <a:rPr lang="en-US" sz="2000" dirty="0"/>
-              <a:t>Q&amp;A session to follow your presentation</a:t>
-            </a:r>
-          </a:p>
-        </p:txBody>
-      </p:sp>
-    </p:spTree>
-    <p:extLst>
-      <p:ext uri="{BB962C8B-B14F-4D97-AF65-F5344CB8AC3E}">
-        <p14:creationId xmlns:p14="http://schemas.microsoft.com/office/powerpoint/2010/main" val="653423298"/>
-      </p:ext>
-    </p:extLst>
-  </p:cSld>
-  <p:clrMapOvr>
-    <a:masterClrMapping/>
-  </p:clrMapOvr>
-</p:sld>
-</file>
-
-<file path=ppt/slides/slide8.xml><?xml version="1.0" encoding="utf-8"?>
-<p:sld xmlns:a="http://schemas.openxmlformats.org/drawingml/2006/main" xmlns:r="http://schemas.openxmlformats.org/officeDocument/2006/relationships" xmlns:p="http://schemas.openxmlformats.org/presentationml/2006/main">
-  <p:cSld>
-    <p:bg>
-      <p:bgPr>
-        <a:solidFill>
-          <a:srgbClr val="542C39"/>
-        </a:solidFill>
-        <a:effectLst/>
-      </p:bgPr>
-    </p:bg>
-    <p:spTree>
-      <p:nvGrpSpPr>
-        <p:cNvPr id="1" name=""/>
-        <p:cNvGrpSpPr/>
-        <p:nvPr/>
-      </p:nvGrpSpPr>
-      <p:grpSpPr>
-        <a:xfrm>
-          <a:off x="0" y="0"/>
-          <a:ext cx="0" cy="0"/>
-          <a:chOff x="0" y="0"/>
-          <a:chExt cx="0" cy="0"/>
-        </a:xfrm>
-      </p:grpSpPr>
-      <p:sp>
-        <p:nvSpPr>
-          <p:cNvPr id="18" name="Rectangle 14">
-            <a:extLst>
-              <a:ext uri="{FF2B5EF4-FFF2-40B4-BE49-F238E27FC236}">
-                <a16:creationId xmlns:a16="http://schemas.microsoft.com/office/drawing/2014/main" id="{6753252F-4873-4F63-801D-CC719279A7D5}"/>
-              </a:ext>
-              <a:ext uri="{C183D7F6-B498-43B3-948B-1728B52AA6E4}">
-                <adec:decorative xmlns:adec="http://schemas.microsoft.com/office/drawing/2017/decorative" val="1"/>
-              </a:ext>
-            </a:extLst>
-          </p:cNvPr>
-          <p:cNvSpPr>
-            <a:spLocks noGrp="1" noRot="1" noChangeAspect="1" noMove="1" noResize="1" noEditPoints="1" noAdjustHandles="1" noChangeArrowheads="1" noChangeShapeType="1" noTextEdit="1"/>
-          </p:cNvSpPr>
-          <p:nvPr>
-            <p:extLst>
-              <p:ext uri="{386F3935-93C4-4BCD-93E2-E3B085C9AB24}">
-                <p16:designElem xmlns:p16="http://schemas.microsoft.com/office/powerpoint/2015/main" val="1"/>
-              </p:ext>
-            </p:extLst>
-          </p:nvPr>
+        </p:txBody>
+      </p:sp>
+      <p:grpSp>
+        <p:nvGrpSpPr>
+          <p:cNvPr id="5" name="Group 4">
+            <a:extLst>
+              <a:ext uri="{FF2B5EF4-FFF2-40B4-BE49-F238E27FC236}">
+                <a16:creationId xmlns:a16="http://schemas.microsoft.com/office/drawing/2014/main" id="{2BF7A79D-84C9-4D03-8709-0E2331F57A72}"/>
+              </a:ext>
+            </a:extLst>
+          </p:cNvPr>
+          <p:cNvGrpSpPr/>
+          <p:nvPr/>
+        </p:nvGrpSpPr>
+        <p:grpSpPr>
+          <a:xfrm>
+            <a:off x="2948294" y="3299943"/>
+            <a:ext cx="8635578" cy="1477328"/>
+            <a:chOff x="2935585" y="2174845"/>
+            <a:chExt cx="8635578" cy="1477328"/>
+          </a:xfrm>
+        </p:grpSpPr>
+        <p:pic>
+          <p:nvPicPr>
+            <p:cNvPr id="1026" name="Picture 2" descr="Image result for cloud icon">
+              <a:extLst>
+                <a:ext uri="{FF2B5EF4-FFF2-40B4-BE49-F238E27FC236}">
+                  <a16:creationId xmlns:a16="http://schemas.microsoft.com/office/drawing/2014/main" id="{EF3F22E6-DE85-4799-8A5A-D8D7082918B9}"/>
+                </a:ext>
+              </a:extLst>
+            </p:cNvPr>
+            <p:cNvPicPr>
+              <a:picLocks noChangeAspect="1" noChangeArrowheads="1"/>
+            </p:cNvPicPr>
+            <p:nvPr/>
+          </p:nvPicPr>
+          <p:blipFill>
+            <a:blip r:embed="rId2">
+              <a:duotone>
+                <a:schemeClr val="accent6">
+                  <a:shade val="45000"/>
+                  <a:satMod val="135000"/>
+                </a:schemeClr>
+                <a:prstClr val="white"/>
+              </a:duotone>
+              <a:extLst>
+                <a:ext uri="{28A0092B-C50C-407E-A947-70E740481C1C}">
+                  <a14:useLocalDpi xmlns:a14="http://schemas.microsoft.com/office/drawing/2010/main" val="0"/>
+                </a:ext>
+              </a:extLst>
+            </a:blip>
+            <a:srcRect/>
+            <a:stretch>
+              <a:fillRect/>
+            </a:stretch>
+          </p:blipFill>
+          <p:spPr bwMode="auto">
+            <a:xfrm>
+              <a:off x="2935585" y="2406589"/>
+              <a:ext cx="557151" cy="385827"/>
+            </a:xfrm>
+            <a:prstGeom prst="rect">
+              <a:avLst/>
+            </a:prstGeom>
+            <a:noFill/>
+            <a:extLst>
+              <a:ext uri="{909E8E84-426E-40DD-AFC4-6F175D3DCCD1}">
+                <a14:hiddenFill xmlns:a14="http://schemas.microsoft.com/office/drawing/2010/main">
+                  <a:solidFill>
+                    <a:srgbClr val="FFFFFF"/>
+                  </a:solidFill>
+                </a14:hiddenFill>
+              </a:ext>
+            </a:extLst>
+          </p:spPr>
+        </p:pic>
+        <p:sp>
+          <p:nvSpPr>
+            <p:cNvPr id="7" name="Rectangle 6">
+              <a:extLst>
+                <a:ext uri="{FF2B5EF4-FFF2-40B4-BE49-F238E27FC236}">
+                  <a16:creationId xmlns:a16="http://schemas.microsoft.com/office/drawing/2014/main" id="{19D33CC2-70F4-4593-BFAD-4BECC08195B1}"/>
+                </a:ext>
+              </a:extLst>
+            </p:cNvPr>
+            <p:cNvSpPr/>
+            <p:nvPr/>
+          </p:nvSpPr>
+          <p:spPr>
+            <a:xfrm>
+              <a:off x="3492736" y="2174845"/>
+              <a:ext cx="4590937" cy="1477328"/>
+            </a:xfrm>
+            <a:prstGeom prst="rect">
+              <a:avLst/>
+            </a:prstGeom>
+          </p:spPr>
+          <p:txBody>
+            <a:bodyPr wrap="none">
+              <a:spAutoFit/>
+            </a:bodyPr>
+            <a:lstStyle/>
+            <a:p>
+              <a:endParaRPr lang="en-US" dirty="0"/>
+            </a:p>
+            <a:p>
+              <a:r>
+                <a:rPr lang="en-US" dirty="0"/>
+                <a:t>Resolve Google API country code misalignment</a:t>
+              </a:r>
+            </a:p>
+            <a:p>
+              <a:endParaRPr lang="en-US" dirty="0"/>
+            </a:p>
+            <a:p>
+              <a:endParaRPr lang="en-US" dirty="0"/>
+            </a:p>
+            <a:p>
+              <a:endParaRPr lang="en-US" dirty="0"/>
+            </a:p>
+          </p:txBody>
+        </p:sp>
+        <p:pic>
+          <p:nvPicPr>
+            <p:cNvPr id="3" name="Picture 2">
+              <a:extLst>
+                <a:ext uri="{FF2B5EF4-FFF2-40B4-BE49-F238E27FC236}">
+                  <a16:creationId xmlns:a16="http://schemas.microsoft.com/office/drawing/2014/main" id="{04650995-74AF-4406-BF07-C47B17385E2D}"/>
+                </a:ext>
+              </a:extLst>
+            </p:cNvPr>
+            <p:cNvPicPr>
+              <a:picLocks noChangeAspect="1"/>
+            </p:cNvPicPr>
+            <p:nvPr/>
+          </p:nvPicPr>
+          <p:blipFill>
+            <a:blip r:embed="rId3"/>
+            <a:stretch>
+              <a:fillRect/>
+            </a:stretch>
+          </p:blipFill>
+          <p:spPr>
+            <a:xfrm>
+              <a:off x="5500772" y="2792416"/>
+              <a:ext cx="6070391" cy="759854"/>
+            </a:xfrm>
+            <a:prstGeom prst="rect">
+              <a:avLst/>
+            </a:prstGeom>
+          </p:spPr>
+        </p:pic>
+      </p:grpSp>
+      <p:sp>
+        <p:nvSpPr>
+          <p:cNvPr id="9" name="Rectangle 8">
+            <a:extLst>
+              <a:ext uri="{FF2B5EF4-FFF2-40B4-BE49-F238E27FC236}">
+                <a16:creationId xmlns:a16="http://schemas.microsoft.com/office/drawing/2014/main" id="{4B522AEC-D3E4-4A24-8048-2FEBF6DF6650}"/>
+              </a:ext>
+            </a:extLst>
+          </p:cNvPr>
+          <p:cNvSpPr/>
+          <p:nvPr/>
         </p:nvSpPr>
         <p:spPr>
           <a:xfrm>
-            <a:off x="0" y="0"/>
-            <a:ext cx="12192000" cy="6858000"/>
-          </a:xfrm>
-          <a:prstGeom prst="rect">
-            <a:avLst/>
-          </a:prstGeom>
-          <a:solidFill>
-            <a:srgbClr val="FFFFFF"/>
-          </a:solidFill>
-          <a:ln>
-            <a:noFill/>
-          </a:ln>
-        </p:spPr>
-        <p:style>
-          <a:lnRef idx="2">
-            <a:schemeClr val="accent1">
-              <a:shade val="50000"/>
-            </a:schemeClr>
-          </a:lnRef>
-          <a:fillRef idx="1">
-            <a:schemeClr val="accent1"/>
-          </a:fillRef>
-          <a:effectRef idx="0">
-            <a:schemeClr val="accent1"/>
-          </a:effectRef>
-          <a:fontRef idx="minor">
-            <a:schemeClr val="lt1"/>
-          </a:fontRef>
-        </p:style>
-        <p:txBody>
-          <a:bodyPr rtlCol="0" anchor="ctr"/>
-          <a:lstStyle/>
-          <a:p>
-            <a:pPr algn="ctr"/>
-            <a:endParaRPr lang="en-US"/>
-          </a:p>
-        </p:txBody>
-      </p:sp>
-      <p:sp>
-        <p:nvSpPr>
-          <p:cNvPr id="14" name="Rectangle 13">
-            <a:extLst>
-              <a:ext uri="{FF2B5EF4-FFF2-40B4-BE49-F238E27FC236}">
-                <a16:creationId xmlns:a16="http://schemas.microsoft.com/office/drawing/2014/main" id="{33E5F303-EAC6-47BA-BC08-2AA48388F971}"/>
-              </a:ext>
-            </a:extLst>
-          </p:cNvPr>
-          <p:cNvSpPr/>
-          <p:nvPr/>
-        </p:nvSpPr>
-        <p:spPr>
-          <a:xfrm>
-            <a:off x="1006777" y="0"/>
-            <a:ext cx="1830655" cy="6858000"/>
-          </a:xfrm>
-          <a:prstGeom prst="rect">
-            <a:avLst/>
-          </a:prstGeom>
-          <a:solidFill>
-            <a:srgbClr val="7EA861"/>
-          </a:solidFill>
-          <a:ln>
-            <a:solidFill>
-              <a:srgbClr val="7EA861"/>
-            </a:solidFill>
-          </a:ln>
-        </p:spPr>
-        <p:style>
-          <a:lnRef idx="2">
-            <a:schemeClr val="accent1">
-              <a:shade val="50000"/>
-            </a:schemeClr>
-          </a:lnRef>
-          <a:fillRef idx="1">
-            <a:schemeClr val="accent1"/>
-          </a:fillRef>
-          <a:effectRef idx="0">
-            <a:schemeClr val="accent1"/>
-          </a:effectRef>
-          <a:fontRef idx="minor">
-            <a:schemeClr val="lt1"/>
-          </a:fontRef>
-        </p:style>
-        <p:txBody>
-          <a:bodyPr rtlCol="0" anchor="ctr"/>
-          <a:lstStyle/>
-          <a:p>
-            <a:pPr algn="ctr"/>
-            <a:endParaRPr lang="en-US"/>
-          </a:p>
-        </p:txBody>
-      </p:sp>
-      <p:sp>
-        <p:nvSpPr>
-          <p:cNvPr id="17" name="Rectangle 16">
-            <a:extLst>
-              <a:ext uri="{FF2B5EF4-FFF2-40B4-BE49-F238E27FC236}">
-                <a16:creationId xmlns:a16="http://schemas.microsoft.com/office/drawing/2014/main" id="{047C8CCB-F95D-4249-92DD-651249D3535A}"/>
-              </a:ext>
-              <a:ext uri="{C183D7F6-B498-43B3-948B-1728B52AA6E4}">
-                <adec:decorative xmlns:adec="http://schemas.microsoft.com/office/drawing/2017/decorative" val="1"/>
-              </a:ext>
-            </a:extLst>
-          </p:cNvPr>
-          <p:cNvSpPr>
-            <a:spLocks noGrp="1" noRot="1" noChangeAspect="1" noMove="1" noResize="1" noEditPoints="1" noAdjustHandles="1" noChangeArrowheads="1" noChangeShapeType="1" noTextEdit="1"/>
-          </p:cNvSpPr>
-          <p:nvPr>
-            <p:extLst>
-              <p:ext uri="{386F3935-93C4-4BCD-93E2-E3B085C9AB24}">
-                <p16:designElem xmlns:p16="http://schemas.microsoft.com/office/powerpoint/2015/main" val="1"/>
-              </p:ext>
-            </p:extLst>
-          </p:nvPr>
-        </p:nvSpPr>
-        <p:spPr>
-          <a:xfrm>
-            <a:off x="0" y="0"/>
-            <a:ext cx="2013557" cy="6858000"/>
-          </a:xfrm>
-          <a:prstGeom prst="rect">
-            <a:avLst/>
-          </a:prstGeom>
-          <a:solidFill>
-            <a:srgbClr val="542C39"/>
-          </a:solidFill>
-          <a:ln>
-            <a:noFill/>
-          </a:ln>
-        </p:spPr>
-        <p:style>
-          <a:lnRef idx="2">
-            <a:schemeClr val="accent1">
-              <a:shade val="50000"/>
-            </a:schemeClr>
-          </a:lnRef>
-          <a:fillRef idx="1">
-            <a:schemeClr val="accent1"/>
-          </a:fillRef>
-          <a:effectRef idx="0">
-            <a:schemeClr val="accent1"/>
-          </a:effectRef>
-          <a:fontRef idx="minor">
-            <a:schemeClr val="lt1"/>
-          </a:fontRef>
-        </p:style>
-        <p:txBody>
-          <a:bodyPr rtlCol="0" anchor="ctr"/>
-          <a:lstStyle/>
-          <a:p>
-            <a:pPr algn="ctr"/>
-            <a:endParaRPr lang="en-US"/>
-          </a:p>
-        </p:txBody>
-      </p:sp>
-      <p:sp>
-        <p:nvSpPr>
-          <p:cNvPr id="11" name="Rectangle 10">
-            <a:extLst>
-              <a:ext uri="{FF2B5EF4-FFF2-40B4-BE49-F238E27FC236}">
-                <a16:creationId xmlns:a16="http://schemas.microsoft.com/office/drawing/2014/main" id="{8FF6D1F6-BE0D-405C-9028-EC70AF75D232}"/>
-              </a:ext>
-            </a:extLst>
-          </p:cNvPr>
-          <p:cNvSpPr/>
-          <p:nvPr/>
-        </p:nvSpPr>
-        <p:spPr>
-          <a:xfrm>
-            <a:off x="-1" y="0"/>
-            <a:ext cx="2013557" cy="6858000"/>
-          </a:xfrm>
-          <a:prstGeom prst="rect">
-            <a:avLst/>
-          </a:prstGeom>
-          <a:solidFill>
-            <a:srgbClr val="262626"/>
-          </a:solidFill>
-        </p:spPr>
-        <p:style>
-          <a:lnRef idx="2">
-            <a:schemeClr val="accent1">
-              <a:shade val="50000"/>
-            </a:schemeClr>
-          </a:lnRef>
-          <a:fillRef idx="1">
-            <a:schemeClr val="accent1"/>
-          </a:fillRef>
-          <a:effectRef idx="0">
-            <a:schemeClr val="accent1"/>
-          </a:effectRef>
-          <a:fontRef idx="minor">
-            <a:schemeClr val="lt1"/>
-          </a:fontRef>
-        </p:style>
-        <p:txBody>
-          <a:bodyPr rtlCol="0" anchor="ctr"/>
-          <a:lstStyle/>
-          <a:p>
-            <a:pPr algn="ctr"/>
-            <a:endParaRPr lang="en-US"/>
-          </a:p>
-        </p:txBody>
-      </p:sp>
-      <p:sp>
-        <p:nvSpPr>
-          <p:cNvPr id="23" name="Rectangle 22">
-            <a:extLst>
-              <a:ext uri="{FF2B5EF4-FFF2-40B4-BE49-F238E27FC236}">
-                <a16:creationId xmlns:a16="http://schemas.microsoft.com/office/drawing/2014/main" id="{28403A2A-F5B0-4C1E-92F8-F68B4185D272}"/>
-              </a:ext>
-            </a:extLst>
-          </p:cNvPr>
-          <p:cNvSpPr/>
-          <p:nvPr/>
-        </p:nvSpPr>
-        <p:spPr>
-          <a:xfrm>
-            <a:off x="2499360" y="6541462"/>
-            <a:ext cx="9666205" cy="316538"/>
-          </a:xfrm>
-          <a:prstGeom prst="rect">
-            <a:avLst/>
-          </a:prstGeom>
-          <a:solidFill>
-            <a:srgbClr val="7EA861"/>
-          </a:solidFill>
-          <a:ln>
-            <a:solidFill>
-              <a:srgbClr val="7EA861"/>
-            </a:solidFill>
-          </a:ln>
-        </p:spPr>
-        <p:style>
-          <a:lnRef idx="2">
-            <a:schemeClr val="accent1">
-              <a:shade val="50000"/>
-            </a:schemeClr>
-          </a:lnRef>
-          <a:fillRef idx="1">
-            <a:schemeClr val="accent1"/>
-          </a:fillRef>
-          <a:effectRef idx="0">
-            <a:schemeClr val="accent1"/>
-          </a:effectRef>
-          <a:fontRef idx="minor">
-            <a:schemeClr val="lt1"/>
-          </a:fontRef>
-        </p:style>
-        <p:txBody>
-          <a:bodyPr rtlCol="0" anchor="ctr"/>
-          <a:lstStyle/>
-          <a:p>
-            <a:pPr algn="ctr"/>
-            <a:endParaRPr lang="en-US"/>
-          </a:p>
-        </p:txBody>
-      </p:sp>
-      <p:pic>
-        <p:nvPicPr>
-          <p:cNvPr id="8" name="Graphic 7">
-            <a:extLst>
-              <a:ext uri="{FF2B5EF4-FFF2-40B4-BE49-F238E27FC236}">
-                <a16:creationId xmlns:a16="http://schemas.microsoft.com/office/drawing/2014/main" id="{DBFC207F-9F95-4B47-B561-FA585005A74A}"/>
-              </a:ext>
-            </a:extLst>
-          </p:cNvPr>
-          <p:cNvPicPr>
-            <a:picLocks noChangeAspect="1"/>
-          </p:cNvPicPr>
-          <p:nvPr/>
-        </p:nvPicPr>
-        <p:blipFill>
-          <a:blip r:embed="rId2">
-            <a:extLst>
-              <a:ext uri="{96DAC541-7B7A-43D3-8B79-37D633B846F1}">
-                <asvg:svgBlip xmlns:asvg="http://schemas.microsoft.com/office/drawing/2016/SVG/main" r:embed="rId3"/>
-              </a:ext>
-            </a:extLst>
-          </a:blip>
-          <a:stretch>
-            <a:fillRect/>
-          </a:stretch>
-        </p:blipFill>
-        <p:spPr>
-          <a:xfrm>
-            <a:off x="2968316" y="1691857"/>
-            <a:ext cx="3457884" cy="1258669"/>
+            <a:off x="3492736" y="2132446"/>
+            <a:ext cx="2629053" cy="369332"/>
           </a:xfrm>
           <a:prstGeom prst="rect">
             <a:avLst/>
           </a:prstGeom>
         </p:spPr>
-      </p:pic>
-      <p:sp>
-        <p:nvSpPr>
-          <p:cNvPr id="9" name="TextBox 8">
-            <a:extLst>
-              <a:ext uri="{FF2B5EF4-FFF2-40B4-BE49-F238E27FC236}">
-                <a16:creationId xmlns:a16="http://schemas.microsoft.com/office/drawing/2014/main" id="{CE335163-405F-40F2-9D3D-CF98CF983DF9}"/>
-              </a:ext>
-            </a:extLst>
-          </p:cNvPr>
-          <p:cNvSpPr txBox="1"/>
+        <p:txBody>
+          <a:bodyPr wrap="none">
+            <a:spAutoFit/>
+          </a:bodyPr>
+          <a:lstStyle/>
+          <a:p>
+            <a:r>
+              <a:rPr lang="en-US" dirty="0"/>
+              <a:t>Create country master list</a:t>
+            </a:r>
+          </a:p>
+        </p:txBody>
+      </p:sp>
+      <p:sp>
+        <p:nvSpPr>
+          <p:cNvPr id="19" name="Rectangle 18">
+            <a:extLst>
+              <a:ext uri="{FF2B5EF4-FFF2-40B4-BE49-F238E27FC236}">
+                <a16:creationId xmlns:a16="http://schemas.microsoft.com/office/drawing/2014/main" id="{A9222D1D-9CCD-40FD-9AD4-BB11D18EB79F}"/>
+              </a:ext>
+            </a:extLst>
+          </p:cNvPr>
+          <p:cNvSpPr/>
           <p:nvPr/>
         </p:nvSpPr>
         <p:spPr>
           <a:xfrm>
-            <a:off x="3127107" y="3066549"/>
-            <a:ext cx="3669957" cy="1077218"/>
+            <a:off x="3741960" y="2428771"/>
+            <a:ext cx="5555367" cy="923330"/>
+          </a:xfrm>
+          <a:prstGeom prst="rect">
+            <a:avLst/>
+          </a:prstGeom>
+        </p:spPr>
+        <p:txBody>
+          <a:bodyPr wrap="none">
+            <a:spAutoFit/>
+          </a:bodyPr>
+          <a:lstStyle/>
+          <a:p>
+            <a:pPr marL="285750" indent="-285750">
+              <a:buFont typeface="Arial" panose="020B0604020202020204" pitchFamily="34" charset="0"/>
+              <a:buChar char="•"/>
+            </a:pPr>
+            <a:r>
+              <a:rPr lang="en-US" dirty="0"/>
+              <a:t>Determine master source of country codes and names</a:t>
+            </a:r>
+          </a:p>
+          <a:p>
+            <a:pPr marL="285750" indent="-285750">
+              <a:buFont typeface="Arial" panose="020B0604020202020204" pitchFamily="34" charset="0"/>
+              <a:buChar char="•"/>
+            </a:pPr>
+            <a:r>
+              <a:rPr lang="en-US" dirty="0"/>
+              <a:t>VLOOKUPs, comparisons between .</a:t>
+            </a:r>
+            <a:r>
+              <a:rPr lang="en-US" dirty="0" err="1"/>
+              <a:t>csvs</a:t>
+            </a:r>
+            <a:endParaRPr lang="en-US" dirty="0"/>
+          </a:p>
+          <a:p>
+            <a:endParaRPr lang="en-US" dirty="0"/>
+          </a:p>
+        </p:txBody>
+      </p:sp>
+      <p:pic>
+        <p:nvPicPr>
+          <p:cNvPr id="10" name="Picture 2" descr="Image result for excel icon">
+            <a:extLst>
+              <a:ext uri="{FF2B5EF4-FFF2-40B4-BE49-F238E27FC236}">
+                <a16:creationId xmlns:a16="http://schemas.microsoft.com/office/drawing/2014/main" id="{42BB2766-3C6E-4841-A02F-9A6AF40A178D}"/>
+              </a:ext>
+            </a:extLst>
+          </p:cNvPr>
+          <p:cNvPicPr>
+            <a:picLocks noChangeAspect="1" noChangeArrowheads="1"/>
+          </p:cNvPicPr>
+          <p:nvPr/>
+        </p:nvPicPr>
+        <p:blipFill>
+          <a:blip r:embed="rId4">
+            <a:extLst>
+              <a:ext uri="{28A0092B-C50C-407E-A947-70E740481C1C}">
+                <a14:useLocalDpi xmlns:a14="http://schemas.microsoft.com/office/drawing/2010/main" val="0"/>
+              </a:ext>
+            </a:extLst>
+          </a:blip>
+          <a:srcRect/>
+          <a:stretch>
+            <a:fillRect/>
+          </a:stretch>
+        </p:blipFill>
+        <p:spPr bwMode="auto">
+          <a:xfrm>
+            <a:off x="2948294" y="2107197"/>
+            <a:ext cx="419830" cy="419830"/>
           </a:xfrm>
           <a:prstGeom prst="rect">
             <a:avLst/>
           </a:prstGeom>
           <a:noFill/>
+          <a:extLst>
+            <a:ext uri="{909E8E84-426E-40DD-AFC4-6F175D3DCCD1}">
+              <a14:hiddenFill xmlns:a14="http://schemas.microsoft.com/office/drawing/2010/main">
+                <a:solidFill>
+                  <a:srgbClr val="FFFFFF"/>
+                </a:solidFill>
+              </a14:hiddenFill>
+            </a:ext>
+          </a:extLst>
         </p:spPr>
-        <p:txBody>
-          <a:bodyPr wrap="square" rtlCol="0">
-            <a:spAutoFit/>
-          </a:bodyPr>
-          <a:lstStyle/>
-          <a:p>
-            <a:r>
-              <a:rPr lang="en-US" b="1" dirty="0">
-                <a:solidFill>
-                  <a:schemeClr val="accent6">
-                    <a:lumMod val="75000"/>
-                  </a:schemeClr>
-                </a:solidFill>
-              </a:rPr>
-              <a:t>relative mean absolute difference</a:t>
-            </a:r>
-          </a:p>
-          <a:p>
-            <a:r>
-              <a:rPr lang="en-US" sz="1400" dirty="0"/>
-              <a:t>which is mathematically equivalent to the Lorenz curve definition</a:t>
-            </a:r>
-          </a:p>
-          <a:p>
-            <a:endParaRPr lang="en-US" dirty="0"/>
-          </a:p>
-        </p:txBody>
-      </p:sp>
-      <p:pic>
-        <p:nvPicPr>
-          <p:cNvPr id="10" name="Picture 9" descr="A close up of a knife&#10;&#10;Description automatically generated">
-            <a:extLst>
-              <a:ext uri="{FF2B5EF4-FFF2-40B4-BE49-F238E27FC236}">
-                <a16:creationId xmlns:a16="http://schemas.microsoft.com/office/drawing/2014/main" id="{FCC40411-337D-458D-9B3D-E88EBD257669}"/>
-              </a:ext>
-            </a:extLst>
-          </p:cNvPr>
-          <p:cNvPicPr>
-            <a:picLocks noChangeAspect="1"/>
-          </p:cNvPicPr>
+      </p:pic>
+      <p:sp>
+        <p:nvSpPr>
+          <p:cNvPr id="21" name="Rectangle 20">
+            <a:extLst>
+              <a:ext uri="{FF2B5EF4-FFF2-40B4-BE49-F238E27FC236}">
+                <a16:creationId xmlns:a16="http://schemas.microsoft.com/office/drawing/2014/main" id="{2B1BC0DB-3D6E-4D38-A9A9-6A515C7614F6}"/>
+              </a:ext>
+            </a:extLst>
+          </p:cNvPr>
+          <p:cNvSpPr/>
           <p:nvPr/>
-        </p:nvPicPr>
-        <p:blipFill>
-          <a:blip r:embed="rId4">
-            <a:duotone>
-              <a:schemeClr val="accent6">
-                <a:shade val="45000"/>
-                <a:satMod val="135000"/>
-              </a:schemeClr>
-              <a:prstClr val="white"/>
-            </a:duotone>
-          </a:blip>
-          <a:stretch>
-            <a:fillRect/>
-          </a:stretch>
-        </p:blipFill>
+        </p:nvSpPr>
         <p:spPr>
           <a:xfrm>
-            <a:off x="7054524" y="1243338"/>
-            <a:ext cx="5111041" cy="5111041"/>
+            <a:off x="3497300" y="3686724"/>
+            <a:ext cx="237566" cy="1477328"/>
           </a:xfrm>
           <a:prstGeom prst="rect">
             <a:avLst/>
           </a:prstGeom>
         </p:spPr>
-      </p:pic>
-      <p:sp>
-        <p:nvSpPr>
-          <p:cNvPr id="12" name="Subtitle 2">
-            <a:extLst>
-              <a:ext uri="{FF2B5EF4-FFF2-40B4-BE49-F238E27FC236}">
-                <a16:creationId xmlns:a16="http://schemas.microsoft.com/office/drawing/2014/main" id="{2C713AD6-EF9C-4F34-8470-883D14E40341}"/>
-              </a:ext>
-            </a:extLst>
-          </p:cNvPr>
-          <p:cNvSpPr txBox="1">
-            <a:spLocks/>
-          </p:cNvSpPr>
-          <p:nvPr/>
-        </p:nvSpPr>
-        <p:spPr>
-          <a:xfrm>
-            <a:off x="2837432" y="714079"/>
-            <a:ext cx="2867688" cy="695557"/>
-          </a:xfrm>
-          <a:prstGeom prst="rect">
-            <a:avLst/>
-          </a:prstGeom>
-        </p:spPr>
-        <p:txBody>
-          <a:bodyPr vert="horz" lIns="91440" tIns="45720" rIns="91440" bIns="45720" rtlCol="0" anchor="b">
-            <a:normAutofit fontScale="92500"/>
-          </a:bodyPr>
-          <a:lstStyle>
-            <a:lvl1pPr marL="0" indent="0" algn="l" defTabSz="914400" rtl="0" eaLnBrk="1" latinLnBrk="0" hangingPunct="1">
-              <a:lnSpc>
-                <a:spcPct val="90000"/>
-              </a:lnSpc>
-              <a:spcBef>
-                <a:spcPts val="1000"/>
-              </a:spcBef>
-              <a:buFont typeface="Arial" panose="020B0604020202020204" pitchFamily="34" charset="0"/>
-              <a:buNone/>
-              <a:defRPr sz="2400" b="1" kern="1200">
-                <a:solidFill>
-                  <a:schemeClr val="tx1"/>
-                </a:solidFill>
-                <a:latin typeface="+mn-lt"/>
-                <a:ea typeface="+mn-ea"/>
-                <a:cs typeface="+mn-cs"/>
-              </a:defRPr>
-            </a:lvl1pPr>
-            <a:lvl2pPr marL="457200" indent="0" algn="l" defTabSz="914400" rtl="0" eaLnBrk="1" latinLnBrk="0" hangingPunct="1">
-              <a:lnSpc>
-                <a:spcPct val="90000"/>
-              </a:lnSpc>
-              <a:spcBef>
-                <a:spcPts val="500"/>
-              </a:spcBef>
-              <a:buFont typeface="Arial" panose="020B0604020202020204" pitchFamily="34" charset="0"/>
-              <a:buNone/>
-              <a:defRPr sz="2000" b="1" kern="1200">
-                <a:solidFill>
-                  <a:schemeClr val="tx1"/>
-                </a:solidFill>
-                <a:latin typeface="+mn-lt"/>
-                <a:ea typeface="+mn-ea"/>
-                <a:cs typeface="+mn-cs"/>
-              </a:defRPr>
-            </a:lvl2pPr>
-            <a:lvl3pPr marL="914400" indent="0" algn="l" defTabSz="914400" rtl="0" eaLnBrk="1" latinLnBrk="0" hangingPunct="1">
-              <a:lnSpc>
-                <a:spcPct val="90000"/>
-              </a:lnSpc>
-              <a:spcBef>
-                <a:spcPts val="500"/>
-              </a:spcBef>
-              <a:buFont typeface="Arial" panose="020B0604020202020204" pitchFamily="34" charset="0"/>
-              <a:buNone/>
-              <a:defRPr sz="1800" b="1" kern="1200">
-                <a:solidFill>
-                  <a:schemeClr val="tx1"/>
-                </a:solidFill>
-                <a:latin typeface="+mn-lt"/>
-                <a:ea typeface="+mn-ea"/>
-                <a:cs typeface="+mn-cs"/>
-              </a:defRPr>
-            </a:lvl3pPr>
-            <a:lvl4pPr marL="1371600" indent="0" algn="l" defTabSz="914400" rtl="0" eaLnBrk="1" latinLnBrk="0" hangingPunct="1">
-              <a:lnSpc>
-                <a:spcPct val="90000"/>
-              </a:lnSpc>
-              <a:spcBef>
-                <a:spcPts val="500"/>
-              </a:spcBef>
-              <a:buFont typeface="Arial" panose="020B0604020202020204" pitchFamily="34" charset="0"/>
-              <a:buNone/>
-              <a:defRPr sz="1600" b="1" kern="1200">
-                <a:solidFill>
-                  <a:schemeClr val="tx1"/>
-                </a:solidFill>
-                <a:latin typeface="+mn-lt"/>
-                <a:ea typeface="+mn-ea"/>
-                <a:cs typeface="+mn-cs"/>
-              </a:defRPr>
-            </a:lvl4pPr>
-            <a:lvl5pPr marL="1828800" indent="0" algn="l" defTabSz="914400" rtl="0" eaLnBrk="1" latinLnBrk="0" hangingPunct="1">
-              <a:lnSpc>
-                <a:spcPct val="90000"/>
-              </a:lnSpc>
-              <a:spcBef>
-                <a:spcPts val="500"/>
-              </a:spcBef>
-              <a:buFont typeface="Arial" panose="020B0604020202020204" pitchFamily="34" charset="0"/>
-              <a:buNone/>
-              <a:defRPr sz="1600" b="1" kern="1200">
-                <a:solidFill>
-                  <a:schemeClr val="tx1"/>
-                </a:solidFill>
-                <a:latin typeface="+mn-lt"/>
-                <a:ea typeface="+mn-ea"/>
-                <a:cs typeface="+mn-cs"/>
-              </a:defRPr>
-            </a:lvl5pPr>
-            <a:lvl6pPr marL="2286000" indent="0" algn="l" defTabSz="914400" rtl="0" eaLnBrk="1" latinLnBrk="0" hangingPunct="1">
-              <a:lnSpc>
-                <a:spcPct val="90000"/>
-              </a:lnSpc>
-              <a:spcBef>
-                <a:spcPts val="500"/>
-              </a:spcBef>
-              <a:buFont typeface="Arial" panose="020B0604020202020204" pitchFamily="34" charset="0"/>
-              <a:buNone/>
-              <a:defRPr sz="1600" b="1" kern="1200">
-                <a:solidFill>
-                  <a:schemeClr val="tx1"/>
-                </a:solidFill>
-                <a:latin typeface="+mn-lt"/>
-                <a:ea typeface="+mn-ea"/>
-                <a:cs typeface="+mn-cs"/>
-              </a:defRPr>
-            </a:lvl6pPr>
-            <a:lvl7pPr marL="2743200" indent="0" algn="l" defTabSz="914400" rtl="0" eaLnBrk="1" latinLnBrk="0" hangingPunct="1">
-              <a:lnSpc>
-                <a:spcPct val="90000"/>
-              </a:lnSpc>
-              <a:spcBef>
-                <a:spcPts val="500"/>
-              </a:spcBef>
-              <a:buFont typeface="Arial" panose="020B0604020202020204" pitchFamily="34" charset="0"/>
-              <a:buNone/>
-              <a:defRPr sz="1600" b="1" kern="1200">
-                <a:solidFill>
-                  <a:schemeClr val="tx1"/>
-                </a:solidFill>
-                <a:latin typeface="+mn-lt"/>
-                <a:ea typeface="+mn-ea"/>
-                <a:cs typeface="+mn-cs"/>
-              </a:defRPr>
-            </a:lvl7pPr>
-            <a:lvl8pPr marL="3200400" indent="0" algn="l" defTabSz="914400" rtl="0" eaLnBrk="1" latinLnBrk="0" hangingPunct="1">
-              <a:lnSpc>
-                <a:spcPct val="90000"/>
-              </a:lnSpc>
-              <a:spcBef>
-                <a:spcPts val="500"/>
-              </a:spcBef>
-              <a:buFont typeface="Arial" panose="020B0604020202020204" pitchFamily="34" charset="0"/>
-              <a:buNone/>
-              <a:defRPr sz="1600" b="1" kern="1200">
-                <a:solidFill>
-                  <a:schemeClr val="tx1"/>
-                </a:solidFill>
-                <a:latin typeface="+mn-lt"/>
-                <a:ea typeface="+mn-ea"/>
-                <a:cs typeface="+mn-cs"/>
-              </a:defRPr>
-            </a:lvl8pPr>
-            <a:lvl9pPr marL="3657600" indent="0" algn="l" defTabSz="914400" rtl="0" eaLnBrk="1" latinLnBrk="0" hangingPunct="1">
-              <a:lnSpc>
-                <a:spcPct val="90000"/>
-              </a:lnSpc>
-              <a:spcBef>
-                <a:spcPts val="500"/>
-              </a:spcBef>
-              <a:buFont typeface="Arial" panose="020B0604020202020204" pitchFamily="34" charset="0"/>
-              <a:buNone/>
-              <a:defRPr sz="1600" b="1" kern="1200">
-                <a:solidFill>
-                  <a:schemeClr val="tx1"/>
-                </a:solidFill>
-                <a:latin typeface="+mn-lt"/>
-                <a:ea typeface="+mn-ea"/>
-                <a:cs typeface="+mn-cs"/>
-              </a:defRPr>
-            </a:lvl9pPr>
-          </a:lstStyle>
-          <a:p>
-            <a:pPr algn="r"/>
-            <a:r>
-              <a:rPr lang="en-US" sz="2600" dirty="0"/>
-              <a:t>The Gini Coefficient</a:t>
-            </a:r>
-            <a:endParaRPr lang="en-US" sz="2600" dirty="0">
-              <a:solidFill>
-                <a:srgbClr val="000000"/>
-              </a:solidFill>
-            </a:endParaRPr>
-          </a:p>
-        </p:txBody>
-      </p:sp>
-      <p:sp>
-        <p:nvSpPr>
-          <p:cNvPr id="13" name="TextBox 12">
-            <a:extLst>
-              <a:ext uri="{FF2B5EF4-FFF2-40B4-BE49-F238E27FC236}">
-                <a16:creationId xmlns:a16="http://schemas.microsoft.com/office/drawing/2014/main" id="{62FFA060-329C-4A11-AA1F-72AB8581F143}"/>
-              </a:ext>
-            </a:extLst>
-          </p:cNvPr>
-          <p:cNvSpPr txBox="1"/>
-          <p:nvPr/>
-        </p:nvSpPr>
-        <p:spPr>
-          <a:xfrm>
-            <a:off x="3127107" y="4173515"/>
-            <a:ext cx="3954560" cy="2031325"/>
-          </a:xfrm>
-          <a:prstGeom prst="rect">
-            <a:avLst/>
-          </a:prstGeom>
-          <a:noFill/>
-        </p:spPr>
-        <p:txBody>
-          <a:bodyPr wrap="square" rtlCol="0">
+        <p:txBody>
+          <a:bodyPr wrap="none">
             <a:spAutoFit/>
           </a:bodyPr>
           <a:lstStyle/>
           <a:p>
+            <a:endParaRPr lang="en-US" dirty="0"/>
+          </a:p>
+          <a:p>
             <a:r>
               <a:rPr lang="en-US" dirty="0"/>
-              <a:t>A single number aimed at measuring the degree of inequality in a distribution. It is most often used in economics to measure how far a country's wealth or income distribution deviates from a totally equal distribution</a:t>
+              <a:t> </a:t>
             </a:r>
           </a:p>
-        </p:txBody>
-      </p:sp>
-      <p:sp>
-        <p:nvSpPr>
-          <p:cNvPr id="15" name="Subtitle 2">
-            <a:extLst>
-              <a:ext uri="{FF2B5EF4-FFF2-40B4-BE49-F238E27FC236}">
-                <a16:creationId xmlns:a16="http://schemas.microsoft.com/office/drawing/2014/main" id="{0ACEDCDA-A2A2-42F4-8459-E912092B2611}"/>
-              </a:ext>
-            </a:extLst>
-          </p:cNvPr>
-          <p:cNvSpPr txBox="1">
-            <a:spLocks/>
-          </p:cNvSpPr>
-          <p:nvPr/>
-        </p:nvSpPr>
-        <p:spPr>
-          <a:xfrm>
-            <a:off x="1778000" y="20859"/>
-            <a:ext cx="8236968" cy="838831"/>
-          </a:xfrm>
-          <a:prstGeom prst="rect">
-            <a:avLst/>
-          </a:prstGeom>
-        </p:spPr>
-        <p:txBody>
-          <a:bodyPr vert="horz" lIns="91440" tIns="45720" rIns="91440" bIns="45720" rtlCol="0" anchor="b">
-            <a:noAutofit/>
-          </a:bodyPr>
-          <a:lstStyle>
-            <a:lvl1pPr marL="0" indent="0" algn="l" defTabSz="914400" rtl="0" eaLnBrk="1" latinLnBrk="0" hangingPunct="1">
-              <a:lnSpc>
-                <a:spcPct val="90000"/>
-              </a:lnSpc>
-              <a:spcBef>
-                <a:spcPts val="1000"/>
-              </a:spcBef>
-              <a:buFont typeface="Arial" panose="020B0604020202020204" pitchFamily="34" charset="0"/>
-              <a:buNone/>
-              <a:defRPr sz="2400" b="1" kern="1200">
-                <a:solidFill>
-                  <a:schemeClr val="tx1"/>
-                </a:solidFill>
-                <a:latin typeface="+mn-lt"/>
-                <a:ea typeface="+mn-ea"/>
-                <a:cs typeface="+mn-cs"/>
-              </a:defRPr>
-            </a:lvl1pPr>
-            <a:lvl2pPr marL="457200" indent="0" algn="l" defTabSz="914400" rtl="0" eaLnBrk="1" latinLnBrk="0" hangingPunct="1">
-              <a:lnSpc>
-                <a:spcPct val="90000"/>
-              </a:lnSpc>
-              <a:spcBef>
-                <a:spcPts val="500"/>
-              </a:spcBef>
-              <a:buFont typeface="Arial" panose="020B0604020202020204" pitchFamily="34" charset="0"/>
-              <a:buNone/>
-              <a:defRPr sz="2000" b="1" kern="1200">
-                <a:solidFill>
-                  <a:schemeClr val="tx1"/>
-                </a:solidFill>
-                <a:latin typeface="+mn-lt"/>
-                <a:ea typeface="+mn-ea"/>
-                <a:cs typeface="+mn-cs"/>
-              </a:defRPr>
-            </a:lvl2pPr>
-            <a:lvl3pPr marL="914400" indent="0" algn="l" defTabSz="914400" rtl="0" eaLnBrk="1" latinLnBrk="0" hangingPunct="1">
-              <a:lnSpc>
-                <a:spcPct val="90000"/>
-              </a:lnSpc>
-              <a:spcBef>
-                <a:spcPts val="500"/>
-              </a:spcBef>
-              <a:buFont typeface="Arial" panose="020B0604020202020204" pitchFamily="34" charset="0"/>
-              <a:buNone/>
-              <a:defRPr sz="1800" b="1" kern="1200">
-                <a:solidFill>
-                  <a:schemeClr val="tx1"/>
-                </a:solidFill>
-                <a:latin typeface="+mn-lt"/>
-                <a:ea typeface="+mn-ea"/>
-                <a:cs typeface="+mn-cs"/>
-              </a:defRPr>
-            </a:lvl3pPr>
-            <a:lvl4pPr marL="1371600" indent="0" algn="l" defTabSz="914400" rtl="0" eaLnBrk="1" latinLnBrk="0" hangingPunct="1">
-              <a:lnSpc>
-                <a:spcPct val="90000"/>
-              </a:lnSpc>
-              <a:spcBef>
-                <a:spcPts val="500"/>
-              </a:spcBef>
-              <a:buFont typeface="Arial" panose="020B0604020202020204" pitchFamily="34" charset="0"/>
-              <a:buNone/>
-              <a:defRPr sz="1600" b="1" kern="1200">
-                <a:solidFill>
-                  <a:schemeClr val="tx1"/>
-                </a:solidFill>
-                <a:latin typeface="+mn-lt"/>
-                <a:ea typeface="+mn-ea"/>
-                <a:cs typeface="+mn-cs"/>
-              </a:defRPr>
-            </a:lvl4pPr>
-            <a:lvl5pPr marL="1828800" indent="0" algn="l" defTabSz="914400" rtl="0" eaLnBrk="1" latinLnBrk="0" hangingPunct="1">
-              <a:lnSpc>
-                <a:spcPct val="90000"/>
-              </a:lnSpc>
-              <a:spcBef>
-                <a:spcPts val="500"/>
-              </a:spcBef>
-              <a:buFont typeface="Arial" panose="020B0604020202020204" pitchFamily="34" charset="0"/>
-              <a:buNone/>
-              <a:defRPr sz="1600" b="1" kern="1200">
-                <a:solidFill>
-                  <a:schemeClr val="tx1"/>
-                </a:solidFill>
-                <a:latin typeface="+mn-lt"/>
-                <a:ea typeface="+mn-ea"/>
-                <a:cs typeface="+mn-cs"/>
-              </a:defRPr>
-            </a:lvl5pPr>
-            <a:lvl6pPr marL="2286000" indent="0" algn="l" defTabSz="914400" rtl="0" eaLnBrk="1" latinLnBrk="0" hangingPunct="1">
-              <a:lnSpc>
-                <a:spcPct val="90000"/>
-              </a:lnSpc>
-              <a:spcBef>
-                <a:spcPts val="500"/>
-              </a:spcBef>
-              <a:buFont typeface="Arial" panose="020B0604020202020204" pitchFamily="34" charset="0"/>
-              <a:buNone/>
-              <a:defRPr sz="1600" b="1" kern="1200">
-                <a:solidFill>
-                  <a:schemeClr val="tx1"/>
-                </a:solidFill>
-                <a:latin typeface="+mn-lt"/>
-                <a:ea typeface="+mn-ea"/>
-                <a:cs typeface="+mn-cs"/>
-              </a:defRPr>
-            </a:lvl6pPr>
-            <a:lvl7pPr marL="2743200" indent="0" algn="l" defTabSz="914400" rtl="0" eaLnBrk="1" latinLnBrk="0" hangingPunct="1">
-              <a:lnSpc>
-                <a:spcPct val="90000"/>
-              </a:lnSpc>
-              <a:spcBef>
-                <a:spcPts val="500"/>
-              </a:spcBef>
-              <a:buFont typeface="Arial" panose="020B0604020202020204" pitchFamily="34" charset="0"/>
-              <a:buNone/>
-              <a:defRPr sz="1600" b="1" kern="1200">
-                <a:solidFill>
-                  <a:schemeClr val="tx1"/>
-                </a:solidFill>
-                <a:latin typeface="+mn-lt"/>
-                <a:ea typeface="+mn-ea"/>
-                <a:cs typeface="+mn-cs"/>
-              </a:defRPr>
-            </a:lvl7pPr>
-            <a:lvl8pPr marL="3200400" indent="0" algn="l" defTabSz="914400" rtl="0" eaLnBrk="1" latinLnBrk="0" hangingPunct="1">
-              <a:lnSpc>
-                <a:spcPct val="90000"/>
-              </a:lnSpc>
-              <a:spcBef>
-                <a:spcPts val="500"/>
-              </a:spcBef>
-              <a:buFont typeface="Arial" panose="020B0604020202020204" pitchFamily="34" charset="0"/>
-              <a:buNone/>
-              <a:defRPr sz="1600" b="1" kern="1200">
-                <a:solidFill>
-                  <a:schemeClr val="tx1"/>
-                </a:solidFill>
-                <a:latin typeface="+mn-lt"/>
-                <a:ea typeface="+mn-ea"/>
-                <a:cs typeface="+mn-cs"/>
-              </a:defRPr>
-            </a:lvl8pPr>
-            <a:lvl9pPr marL="3657600" indent="0" algn="l" defTabSz="914400" rtl="0" eaLnBrk="1" latinLnBrk="0" hangingPunct="1">
-              <a:lnSpc>
-                <a:spcPct val="90000"/>
-              </a:lnSpc>
-              <a:spcBef>
-                <a:spcPts val="500"/>
-              </a:spcBef>
-              <a:buFont typeface="Arial" panose="020B0604020202020204" pitchFamily="34" charset="0"/>
-              <a:buNone/>
-              <a:defRPr sz="1600" b="1" kern="1200">
-                <a:solidFill>
-                  <a:schemeClr val="tx1"/>
-                </a:solidFill>
-                <a:latin typeface="+mn-lt"/>
-                <a:ea typeface="+mn-ea"/>
-                <a:cs typeface="+mn-cs"/>
-              </a:defRPr>
-            </a:lvl9pPr>
-          </a:lstStyle>
-          <a:p>
-            <a:pPr algn="r"/>
-            <a:r>
-              <a:rPr lang="en-US" sz="3600" dirty="0"/>
-              <a:t>Data Exploration &amp; Clean-up Process</a:t>
-            </a:r>
-            <a:endParaRPr lang="en-US" sz="3600" dirty="0">
-              <a:solidFill>
-                <a:srgbClr val="000000"/>
-              </a:solidFill>
-            </a:endParaRPr>
+          <a:p>
+            <a:endParaRPr lang="en-US" dirty="0"/>
+          </a:p>
+          <a:p>
+            <a:endParaRPr lang="en-US" dirty="0"/>
+          </a:p>
+          <a:p>
+            <a:endParaRPr lang="en-US" dirty="0"/>
           </a:p>
         </p:txBody>
       </p:sp>
     </p:spTree>
     <p:extLst>
       <p:ext uri="{BB962C8B-B14F-4D97-AF65-F5344CB8AC3E}">
-        <p14:creationId xmlns:p14="http://schemas.microsoft.com/office/powerpoint/2010/main" val="1999621410"/>
+        <p14:creationId xmlns:p14="http://schemas.microsoft.com/office/powerpoint/2010/main" val="2054415527"/>
       </p:ext>
     </p:extLst>
   </p:cSld>
@@ -11343,94 +12934,232 @@
           </a:p>
         </p:txBody>
       </p:sp>
-      <p:sp>
-        <p:nvSpPr>
-          <p:cNvPr id="23" name="Rectangle 22">
-            <a:extLst>
-              <a:ext uri="{FF2B5EF4-FFF2-40B4-BE49-F238E27FC236}">
-                <a16:creationId xmlns:a16="http://schemas.microsoft.com/office/drawing/2014/main" id="{28403A2A-F5B0-4C1E-92F8-F68B4185D272}"/>
-              </a:ext>
-            </a:extLst>
-          </p:cNvPr>
-          <p:cNvSpPr/>
+      <p:grpSp>
+        <p:nvGrpSpPr>
+          <p:cNvPr id="2" name="Group 1">
+            <a:extLst>
+              <a:ext uri="{FF2B5EF4-FFF2-40B4-BE49-F238E27FC236}">
+                <a16:creationId xmlns:a16="http://schemas.microsoft.com/office/drawing/2014/main" id="{0003F93F-024F-402C-9760-B3A204C64DF1}"/>
+              </a:ext>
+            </a:extLst>
+          </p:cNvPr>
+          <p:cNvGrpSpPr/>
+          <p:nvPr/>
+        </p:nvGrpSpPr>
+        <p:grpSpPr>
+          <a:xfrm>
+            <a:off x="-1" y="0"/>
+            <a:ext cx="12165566" cy="6858000"/>
+            <a:chOff x="-1" y="0"/>
+            <a:chExt cx="12165566" cy="6858000"/>
+          </a:xfrm>
+        </p:grpSpPr>
+        <p:sp>
+          <p:nvSpPr>
+            <p:cNvPr id="14" name="Rectangle 13">
+              <a:extLst>
+                <a:ext uri="{FF2B5EF4-FFF2-40B4-BE49-F238E27FC236}">
+                  <a16:creationId xmlns:a16="http://schemas.microsoft.com/office/drawing/2014/main" id="{33E5F303-EAC6-47BA-BC08-2AA48388F971}"/>
+                </a:ext>
+              </a:extLst>
+            </p:cNvPr>
+            <p:cNvSpPr/>
+            <p:nvPr/>
+          </p:nvSpPr>
+          <p:spPr>
+            <a:xfrm>
+              <a:off x="1006777" y="0"/>
+              <a:ext cx="1830655" cy="6858000"/>
+            </a:xfrm>
+            <a:prstGeom prst="rect">
+              <a:avLst/>
+            </a:prstGeom>
+            <a:solidFill>
+              <a:srgbClr val="7EA861"/>
+            </a:solidFill>
+            <a:ln>
+              <a:solidFill>
+                <a:srgbClr val="7EA861"/>
+              </a:solidFill>
+            </a:ln>
+          </p:spPr>
+          <p:style>
+            <a:lnRef idx="2">
+              <a:schemeClr val="accent1">
+                <a:shade val="50000"/>
+              </a:schemeClr>
+            </a:lnRef>
+            <a:fillRef idx="1">
+              <a:schemeClr val="accent1"/>
+            </a:fillRef>
+            <a:effectRef idx="0">
+              <a:schemeClr val="accent1"/>
+            </a:effectRef>
+            <a:fontRef idx="minor">
+              <a:schemeClr val="lt1"/>
+            </a:fontRef>
+          </p:style>
+          <p:txBody>
+            <a:bodyPr rtlCol="0" anchor="ctr"/>
+            <a:lstStyle/>
+            <a:p>
+              <a:pPr algn="ctr"/>
+              <a:endParaRPr lang="en-US" dirty="0"/>
+            </a:p>
+          </p:txBody>
+        </p:sp>
+        <p:sp>
+          <p:nvSpPr>
+            <p:cNvPr id="11" name="Rectangle 10">
+              <a:extLst>
+                <a:ext uri="{FF2B5EF4-FFF2-40B4-BE49-F238E27FC236}">
+                  <a16:creationId xmlns:a16="http://schemas.microsoft.com/office/drawing/2014/main" id="{8FF6D1F6-BE0D-405C-9028-EC70AF75D232}"/>
+                </a:ext>
+              </a:extLst>
+            </p:cNvPr>
+            <p:cNvSpPr/>
+            <p:nvPr/>
+          </p:nvSpPr>
+          <p:spPr>
+            <a:xfrm>
+              <a:off x="-1" y="0"/>
+              <a:ext cx="2013557" cy="6858000"/>
+            </a:xfrm>
+            <a:prstGeom prst="rect">
+              <a:avLst/>
+            </a:prstGeom>
+            <a:solidFill>
+              <a:srgbClr val="262626"/>
+            </a:solidFill>
+          </p:spPr>
+          <p:style>
+            <a:lnRef idx="2">
+              <a:schemeClr val="accent1">
+                <a:shade val="50000"/>
+              </a:schemeClr>
+            </a:lnRef>
+            <a:fillRef idx="1">
+              <a:schemeClr val="accent1"/>
+            </a:fillRef>
+            <a:effectRef idx="0">
+              <a:schemeClr val="accent1"/>
+            </a:effectRef>
+            <a:fontRef idx="minor">
+              <a:schemeClr val="lt1"/>
+            </a:fontRef>
+          </p:style>
+          <p:txBody>
+            <a:bodyPr rtlCol="0" anchor="ctr"/>
+            <a:lstStyle/>
+            <a:p>
+              <a:pPr algn="ctr"/>
+              <a:endParaRPr lang="en-US"/>
+            </a:p>
+          </p:txBody>
+        </p:sp>
+        <p:sp>
+          <p:nvSpPr>
+            <p:cNvPr id="23" name="Rectangle 22">
+              <a:extLst>
+                <a:ext uri="{FF2B5EF4-FFF2-40B4-BE49-F238E27FC236}">
+                  <a16:creationId xmlns:a16="http://schemas.microsoft.com/office/drawing/2014/main" id="{28403A2A-F5B0-4C1E-92F8-F68B4185D272}"/>
+                </a:ext>
+              </a:extLst>
+            </p:cNvPr>
+            <p:cNvSpPr/>
+            <p:nvPr/>
+          </p:nvSpPr>
+          <p:spPr>
+            <a:xfrm>
+              <a:off x="2499360" y="6541462"/>
+              <a:ext cx="9666205" cy="316538"/>
+            </a:xfrm>
+            <a:prstGeom prst="rect">
+              <a:avLst/>
+            </a:prstGeom>
+            <a:solidFill>
+              <a:srgbClr val="7EA861"/>
+            </a:solidFill>
+            <a:ln>
+              <a:solidFill>
+                <a:srgbClr val="7EA861"/>
+              </a:solidFill>
+            </a:ln>
+          </p:spPr>
+          <p:style>
+            <a:lnRef idx="2">
+              <a:schemeClr val="accent1">
+                <a:shade val="50000"/>
+              </a:schemeClr>
+            </a:lnRef>
+            <a:fillRef idx="1">
+              <a:schemeClr val="accent1"/>
+            </a:fillRef>
+            <a:effectRef idx="0">
+              <a:schemeClr val="accent1"/>
+            </a:effectRef>
+            <a:fontRef idx="minor">
+              <a:schemeClr val="lt1"/>
+            </a:fontRef>
+          </p:style>
+          <p:txBody>
+            <a:bodyPr rtlCol="0" anchor="ctr"/>
+            <a:lstStyle/>
+            <a:p>
+              <a:pPr algn="ctr"/>
+              <a:endParaRPr lang="en-US"/>
+            </a:p>
+          </p:txBody>
+        </p:sp>
+      </p:grpSp>
+      <p:sp>
+        <p:nvSpPr>
+          <p:cNvPr id="16" name="TextBox 15">
+            <a:extLst>
+              <a:ext uri="{FF2B5EF4-FFF2-40B4-BE49-F238E27FC236}">
+                <a16:creationId xmlns:a16="http://schemas.microsoft.com/office/drawing/2014/main" id="{28E357FE-66D7-4860-8B9C-16293153E14E}"/>
+              </a:ext>
+            </a:extLst>
+          </p:cNvPr>
+          <p:cNvSpPr txBox="1"/>
           <p:nvPr/>
         </p:nvSpPr>
         <p:spPr>
           <a:xfrm>
-            <a:off x="2499360" y="6541462"/>
-            <a:ext cx="9666205" cy="316538"/>
+            <a:off x="2854005" y="664260"/>
+            <a:ext cx="6593224" cy="369332"/>
           </a:xfrm>
           <a:prstGeom prst="rect">
             <a:avLst/>
           </a:prstGeom>
-          <a:solidFill>
-            <a:srgbClr val="7EA861"/>
-          </a:solidFill>
-          <a:ln>
-            <a:solidFill>
-              <a:srgbClr val="7EA861"/>
-            </a:solidFill>
-          </a:ln>
+          <a:noFill/>
         </p:spPr>
-        <p:style>
-          <a:lnRef idx="2">
-            <a:schemeClr val="accent1">
-              <a:shade val="50000"/>
-            </a:schemeClr>
-          </a:lnRef>
-          <a:fillRef idx="1">
-            <a:schemeClr val="accent1"/>
-          </a:fillRef>
-          <a:effectRef idx="0">
-            <a:schemeClr val="accent1"/>
-          </a:effectRef>
-          <a:fontRef idx="minor">
-            <a:schemeClr val="lt1"/>
-          </a:fontRef>
-        </p:style>
-        <p:txBody>
-          <a:bodyPr rtlCol="0" anchor="ctr"/>
+        <p:txBody>
+          <a:bodyPr wrap="square" rtlCol="0">
+            <a:spAutoFit/>
+          </a:bodyPr>
           <a:lstStyle/>
           <a:p>
-            <a:pPr algn="ctr"/>
-            <a:endParaRPr lang="en-US"/>
-          </a:p>
-        </p:txBody>
-      </p:sp>
-      <p:pic>
-        <p:nvPicPr>
-          <p:cNvPr id="9" name="Content Placeholder 15" descr="A screenshot of a cell phone&#10;&#10;Description automatically generated">
-            <a:extLst>
-              <a:ext uri="{FF2B5EF4-FFF2-40B4-BE49-F238E27FC236}">
-                <a16:creationId xmlns:a16="http://schemas.microsoft.com/office/drawing/2014/main" id="{9F157A56-63A0-4AFD-85DB-BD84CD803572}"/>
-              </a:ext>
-            </a:extLst>
-          </p:cNvPr>
-          <p:cNvPicPr>
-            <a:picLocks noGrp="1" noChangeAspect="1"/>
-          </p:cNvPicPr>
-          <p:nvPr>
-            <p:ph sz="half" idx="2"/>
-          </p:nvPr>
-        </p:nvPicPr>
-        <p:blipFill rotWithShape="1">
-          <a:blip r:embed="rId2"/>
-          <a:srcRect l="10627" r="13937"/>
-          <a:stretch/>
-        </p:blipFill>
-        <p:spPr>
-          <a:xfrm>
-            <a:off x="2424322" y="1766948"/>
-            <a:ext cx="5209674" cy="3511723"/>
-          </a:xfrm>
-        </p:spPr>
-      </p:pic>
-      <p:sp>
-        <p:nvSpPr>
-          <p:cNvPr id="8" name="Subtitle 2">
-            <a:extLst>
-              <a:ext uri="{FF2B5EF4-FFF2-40B4-BE49-F238E27FC236}">
-                <a16:creationId xmlns:a16="http://schemas.microsoft.com/office/drawing/2014/main" id="{3FD876A2-3892-42BE-9CDA-650985982439}"/>
+            <a:r>
+              <a:rPr lang="en-US" b="1" dirty="0">
+                <a:solidFill>
+                  <a:schemeClr val="accent6">
+                    <a:lumMod val="75000"/>
+                  </a:schemeClr>
+                </a:solidFill>
+              </a:rPr>
+              <a:t>Where’s the information?</a:t>
+            </a:r>
+            <a:endParaRPr lang="en-US" b="1" dirty="0"/>
+          </a:p>
+        </p:txBody>
+      </p:sp>
+      <p:sp>
+        <p:nvSpPr>
+          <p:cNvPr id="20" name="Subtitle 2">
+            <a:extLst>
+              <a:ext uri="{FF2B5EF4-FFF2-40B4-BE49-F238E27FC236}">
+                <a16:creationId xmlns:a16="http://schemas.microsoft.com/office/drawing/2014/main" id="{A57814C1-BF80-4E15-B171-D6F88EAE04E4}"/>
               </a:ext>
             </a:extLst>
           </p:cNvPr>
@@ -11441,8 +13170,8 @@
         </p:nvSpPr>
         <p:spPr>
           <a:xfrm>
-            <a:off x="2555433" y="248456"/>
-            <a:ext cx="5354320" cy="597617"/>
+            <a:off x="2668588" y="-40496"/>
+            <a:ext cx="4033870" cy="838831"/>
           </a:xfrm>
           <a:prstGeom prst="rect">
             <a:avLst/>
@@ -11450,7 +13179,7 @@
         </p:spPr>
         <p:txBody>
           <a:bodyPr vert="horz" lIns="91440" tIns="45720" rIns="91440" bIns="45720" rtlCol="0" anchor="b">
-            <a:normAutofit fontScale="55000" lnSpcReduction="20000"/>
+            <a:noAutofit/>
           </a:bodyPr>
           <a:lstStyle>
             <a:lvl1pPr marL="0" indent="0" algn="l" defTabSz="914400" rtl="0" eaLnBrk="1" latinLnBrk="0" hangingPunct="1">
@@ -11619,22 +13348,23 @@
           <a:p>
             <a:pPr algn="r"/>
             <a:r>
-              <a:rPr lang="en-US" sz="5400" dirty="0">
-                <a:solidFill>
-                  <a:srgbClr val="000000"/>
-                </a:solidFill>
-              </a:rPr>
-              <a:t>Conclusions: Happiness Factors</a:t>
+              <a:rPr lang="en-US" sz="4000" dirty="0"/>
+              <a:t>A Deep Data Dive</a:t>
             </a:r>
-          </a:p>
-        </p:txBody>
-      </p:sp>
-      <p:sp>
-        <p:nvSpPr>
-          <p:cNvPr id="12" name="Rectangle 11">
-            <a:extLst>
-              <a:ext uri="{FF2B5EF4-FFF2-40B4-BE49-F238E27FC236}">
-                <a16:creationId xmlns:a16="http://schemas.microsoft.com/office/drawing/2014/main" id="{667506F0-E964-4E08-93A1-B31E6BB62A25}"/>
+            <a:endParaRPr lang="en-US" sz="4000" dirty="0">
+              <a:solidFill>
+                <a:srgbClr val="000000"/>
+              </a:solidFill>
+            </a:endParaRPr>
+          </a:p>
+        </p:txBody>
+      </p:sp>
+      <p:sp>
+        <p:nvSpPr>
+          <p:cNvPr id="4" name="Rectangle 3">
+            <a:extLst>
+              <a:ext uri="{FF2B5EF4-FFF2-40B4-BE49-F238E27FC236}">
+                <a16:creationId xmlns:a16="http://schemas.microsoft.com/office/drawing/2014/main" id="{465AA7FF-9D7F-4763-BA9C-3E0486BFA425}"/>
               </a:ext>
             </a:extLst>
           </p:cNvPr>
@@ -11643,167 +13373,400 @@
         </p:nvSpPr>
         <p:spPr>
           <a:xfrm>
-            <a:off x="1006777" y="0"/>
-            <a:ext cx="1830655" cy="6858000"/>
+            <a:off x="2897064" y="1074088"/>
+            <a:ext cx="2928943" cy="461665"/>
           </a:xfrm>
           <a:prstGeom prst="rect">
             <a:avLst/>
           </a:prstGeom>
-          <a:solidFill>
-            <a:srgbClr val="7EA861"/>
-          </a:solidFill>
-          <a:ln>
-            <a:solidFill>
-              <a:srgbClr val="7EA861"/>
-            </a:solidFill>
-          </a:ln>
         </p:spPr>
-        <p:style>
-          <a:lnRef idx="2">
-            <a:schemeClr val="accent1">
-              <a:shade val="50000"/>
-            </a:schemeClr>
-          </a:lnRef>
-          <a:fillRef idx="1">
-            <a:schemeClr val="accent1"/>
-          </a:fillRef>
-          <a:effectRef idx="0">
-            <a:schemeClr val="accent1"/>
-          </a:effectRef>
-          <a:fontRef idx="minor">
-            <a:schemeClr val="lt1"/>
-          </a:fontRef>
-        </p:style>
-        <p:txBody>
-          <a:bodyPr rtlCol="0" anchor="ctr"/>
+        <p:txBody>
+          <a:bodyPr wrap="none">
+            <a:spAutoFit/>
+          </a:bodyPr>
           <a:lstStyle/>
           <a:p>
-            <a:pPr algn="ctr"/>
-            <a:endParaRPr lang="en-US"/>
-          </a:p>
-        </p:txBody>
-      </p:sp>
-      <p:pic>
-        <p:nvPicPr>
-          <p:cNvPr id="10" name="Content Placeholder 17" descr="A screenshot of a cell phone&#10;&#10;Description automatically generated">
-            <a:extLst>
-              <a:ext uri="{FF2B5EF4-FFF2-40B4-BE49-F238E27FC236}">
-                <a16:creationId xmlns:a16="http://schemas.microsoft.com/office/drawing/2014/main" id="{FFA15AE0-B7BB-49CB-9BD6-DD974CA10C3E}"/>
-              </a:ext>
-            </a:extLst>
-          </p:cNvPr>
-          <p:cNvPicPr>
-            <a:picLocks noGrp="1" noChangeAspect="1"/>
-          </p:cNvPicPr>
-          <p:nvPr>
-            <p:ph sz="quarter" idx="4"/>
-          </p:nvPr>
-        </p:nvPicPr>
-        <p:blipFill rotWithShape="1">
-          <a:blip r:embed="rId3"/>
-          <a:srcRect l="14281" r="16440"/>
-          <a:stretch/>
-        </p:blipFill>
+            <a:r>
+              <a:rPr lang="en-US" sz="2400" b="1" dirty="0">
+                <a:solidFill>
+                  <a:srgbClr val="002060"/>
+                </a:solidFill>
+              </a:rPr>
+              <a:t>Data Cleanup Process</a:t>
+            </a:r>
+          </a:p>
+        </p:txBody>
+      </p:sp>
+      <p:sp>
+        <p:nvSpPr>
+          <p:cNvPr id="6" name="Rectangle 5">
+            <a:extLst>
+              <a:ext uri="{FF2B5EF4-FFF2-40B4-BE49-F238E27FC236}">
+                <a16:creationId xmlns:a16="http://schemas.microsoft.com/office/drawing/2014/main" id="{1C7D7DF3-24AA-4CDC-B870-2D7A29CFC50A}"/>
+              </a:ext>
+            </a:extLst>
+          </p:cNvPr>
+          <p:cNvSpPr>
+            <a:spLocks noChangeAspect="1"/>
+          </p:cNvSpPr>
+          <p:nvPr/>
+        </p:nvSpPr>
         <p:spPr>
           <a:xfrm>
-            <a:off x="7355131" y="1766947"/>
-            <a:ext cx="4915353" cy="3511723"/>
-          </a:xfrm>
-        </p:spPr>
-      </p:pic>
-      <p:sp>
-        <p:nvSpPr>
-          <p:cNvPr id="11" name="Rectangle 10">
-            <a:extLst>
-              <a:ext uri="{FF2B5EF4-FFF2-40B4-BE49-F238E27FC236}">
-                <a16:creationId xmlns:a16="http://schemas.microsoft.com/office/drawing/2014/main" id="{8FF6D1F6-BE0D-405C-9028-EC70AF75D232}"/>
-              </a:ext>
-            </a:extLst>
-          </p:cNvPr>
-          <p:cNvSpPr/>
-          <p:nvPr/>
-        </p:nvSpPr>
-        <p:spPr>
-          <a:xfrm>
-            <a:off x="-1" y="0"/>
-            <a:ext cx="2013557" cy="6858000"/>
+            <a:off x="8159882" y="4919008"/>
+            <a:ext cx="4043260" cy="1938992"/>
           </a:xfrm>
           <a:prstGeom prst="rect">
             <a:avLst/>
           </a:prstGeom>
-          <a:solidFill>
-            <a:srgbClr val="262626"/>
-          </a:solidFill>
         </p:spPr>
-        <p:style>
-          <a:lnRef idx="2">
-            <a:schemeClr val="accent1">
-              <a:shade val="50000"/>
-            </a:schemeClr>
-          </a:lnRef>
-          <a:fillRef idx="1">
-            <a:schemeClr val="accent1"/>
-          </a:fillRef>
-          <a:effectRef idx="0">
-            <a:schemeClr val="accent1"/>
-          </a:effectRef>
-          <a:fontRef idx="minor">
-            <a:schemeClr val="lt1"/>
-          </a:fontRef>
-        </p:style>
-        <p:txBody>
-          <a:bodyPr rtlCol="0" anchor="ctr"/>
+        <p:txBody>
+          <a:bodyPr wrap="square">
+            <a:spAutoFit/>
+          </a:bodyPr>
           <a:lstStyle/>
           <a:p>
-            <a:pPr algn="ctr"/>
-            <a:endParaRPr lang="en-US"/>
-          </a:p>
-        </p:txBody>
-      </p:sp>
-      <p:sp>
-        <p:nvSpPr>
-          <p:cNvPr id="13" name="TextBox 12">
-            <a:extLst>
-              <a:ext uri="{FF2B5EF4-FFF2-40B4-BE49-F238E27FC236}">
-                <a16:creationId xmlns:a16="http://schemas.microsoft.com/office/drawing/2014/main" id="{AFE8CD97-6182-471A-A81E-F229407DE265}"/>
-              </a:ext>
-            </a:extLst>
-          </p:cNvPr>
-          <p:cNvSpPr txBox="1"/>
+            <a:pPr marL="285750" lvl="3" indent="-285750">
+              <a:buFont typeface="Arial" panose="020B0604020202020204" pitchFamily="34" charset="0"/>
+              <a:buChar char="•"/>
+            </a:pPr>
+            <a:r>
+              <a:rPr lang="en-US" sz="2000" dirty="0"/>
+              <a:t>The data exploration and cleanup process (accompanied by your </a:t>
+            </a:r>
+            <a:r>
+              <a:rPr lang="en-US" sz="2000" dirty="0" err="1"/>
+              <a:t>Jupyter</a:t>
+            </a:r>
+            <a:r>
+              <a:rPr lang="en-US" sz="2000" dirty="0"/>
+              <a:t> Notebook)</a:t>
+            </a:r>
+          </a:p>
+          <a:p>
+            <a:pPr marL="285750" lvl="3" indent="-285750">
+              <a:buFont typeface="Arial" panose="020B0604020202020204" pitchFamily="34" charset="0"/>
+              <a:buChar char="•"/>
+            </a:pPr>
+            <a:r>
+              <a:rPr lang="en-US" sz="2000" dirty="0"/>
+              <a:t>The analysis process (accompanied by your </a:t>
+            </a:r>
+            <a:r>
+              <a:rPr lang="en-US" sz="2000" dirty="0" err="1"/>
+              <a:t>Jupyter</a:t>
+            </a:r>
+            <a:r>
+              <a:rPr lang="en-US" sz="2000" dirty="0"/>
+              <a:t> Notebook)</a:t>
+            </a:r>
+          </a:p>
+        </p:txBody>
+      </p:sp>
+      <p:grpSp>
+        <p:nvGrpSpPr>
+          <p:cNvPr id="5" name="Group 4">
+            <a:extLst>
+              <a:ext uri="{FF2B5EF4-FFF2-40B4-BE49-F238E27FC236}">
+                <a16:creationId xmlns:a16="http://schemas.microsoft.com/office/drawing/2014/main" id="{2BF7A79D-84C9-4D03-8709-0E2331F57A72}"/>
+              </a:ext>
+            </a:extLst>
+          </p:cNvPr>
+          <p:cNvGrpSpPr/>
           <p:nvPr/>
-        </p:nvSpPr>
-        <p:spPr>
+        </p:nvGrpSpPr>
+        <p:grpSpPr>
           <a:xfrm>
-            <a:off x="2905153" y="783251"/>
-            <a:ext cx="7571373" cy="861774"/>
+            <a:off x="2948294" y="3238481"/>
+            <a:ext cx="3245259" cy="1477328"/>
+            <a:chOff x="2935585" y="2174845"/>
+            <a:chExt cx="3245259" cy="1477328"/>
+          </a:xfrm>
+        </p:grpSpPr>
+        <p:pic>
+          <p:nvPicPr>
+            <p:cNvPr id="1026" name="Picture 2" descr="Image result for cloud icon">
+              <a:extLst>
+                <a:ext uri="{FF2B5EF4-FFF2-40B4-BE49-F238E27FC236}">
+                  <a16:creationId xmlns:a16="http://schemas.microsoft.com/office/drawing/2014/main" id="{EF3F22E6-DE85-4799-8A5A-D8D7082918B9}"/>
+                </a:ext>
+              </a:extLst>
+            </p:cNvPr>
+            <p:cNvPicPr>
+              <a:picLocks noChangeAspect="1" noChangeArrowheads="1"/>
+            </p:cNvPicPr>
+            <p:nvPr/>
+          </p:nvPicPr>
+          <p:blipFill>
+            <a:blip r:embed="rId2">
+              <a:duotone>
+                <a:schemeClr val="accent6">
+                  <a:shade val="45000"/>
+                  <a:satMod val="135000"/>
+                </a:schemeClr>
+                <a:prstClr val="white"/>
+              </a:duotone>
+              <a:extLst>
+                <a:ext uri="{28A0092B-C50C-407E-A947-70E740481C1C}">
+                  <a14:useLocalDpi xmlns:a14="http://schemas.microsoft.com/office/drawing/2010/main" val="0"/>
+                </a:ext>
+              </a:extLst>
+            </a:blip>
+            <a:srcRect/>
+            <a:stretch>
+              <a:fillRect/>
+            </a:stretch>
+          </p:blipFill>
+          <p:spPr bwMode="auto">
+            <a:xfrm>
+              <a:off x="2935585" y="2406589"/>
+              <a:ext cx="557151" cy="385827"/>
+            </a:xfrm>
+            <a:prstGeom prst="rect">
+              <a:avLst/>
+            </a:prstGeom>
+            <a:noFill/>
+            <a:extLst>
+              <a:ext uri="{909E8E84-426E-40DD-AFC4-6F175D3DCCD1}">
+                <a14:hiddenFill xmlns:a14="http://schemas.microsoft.com/office/drawing/2010/main">
+                  <a:solidFill>
+                    <a:srgbClr val="FFFFFF"/>
+                  </a:solidFill>
+                </a14:hiddenFill>
+              </a:ext>
+            </a:extLst>
+          </p:spPr>
+        </p:pic>
+        <p:sp>
+          <p:nvSpPr>
+            <p:cNvPr id="7" name="Rectangle 6">
+              <a:extLst>
+                <a:ext uri="{FF2B5EF4-FFF2-40B4-BE49-F238E27FC236}">
+                  <a16:creationId xmlns:a16="http://schemas.microsoft.com/office/drawing/2014/main" id="{19D33CC2-70F4-4593-BFAD-4BECC08195B1}"/>
+                </a:ext>
+              </a:extLst>
+            </p:cNvPr>
+            <p:cNvSpPr/>
+            <p:nvPr/>
+          </p:nvSpPr>
+          <p:spPr>
+            <a:xfrm>
+              <a:off x="3492736" y="2174845"/>
+              <a:ext cx="2688108" cy="1477328"/>
+            </a:xfrm>
+            <a:prstGeom prst="rect">
+              <a:avLst/>
+            </a:prstGeom>
+          </p:spPr>
+          <p:txBody>
+            <a:bodyPr wrap="none">
+              <a:spAutoFit/>
+            </a:bodyPr>
+            <a:lstStyle/>
+            <a:p>
+              <a:endParaRPr lang="en-US" dirty="0"/>
+            </a:p>
+            <a:p>
+              <a:r>
+                <a:rPr lang="en-US" dirty="0"/>
+                <a:t>Merge Pandas </a:t>
+              </a:r>
+              <a:r>
+                <a:rPr lang="en-US" dirty="0" err="1"/>
+                <a:t>DataFrames</a:t>
+              </a:r>
+              <a:endParaRPr lang="en-US" dirty="0"/>
+            </a:p>
+            <a:p>
+              <a:endParaRPr lang="en-US" dirty="0"/>
+            </a:p>
+            <a:p>
+              <a:endParaRPr lang="en-US" dirty="0"/>
+            </a:p>
+            <a:p>
+              <a:endParaRPr lang="en-US" dirty="0"/>
+            </a:p>
+          </p:txBody>
+        </p:sp>
+      </p:grpSp>
+      <p:pic>
+        <p:nvPicPr>
+          <p:cNvPr id="10" name="Picture 2" descr="Image result for excel icon">
+            <a:extLst>
+              <a:ext uri="{FF2B5EF4-FFF2-40B4-BE49-F238E27FC236}">
+                <a16:creationId xmlns:a16="http://schemas.microsoft.com/office/drawing/2014/main" id="{42BB2766-3C6E-4841-A02F-9A6AF40A178D}"/>
+              </a:ext>
+            </a:extLst>
+          </p:cNvPr>
+          <p:cNvPicPr>
+            <a:picLocks noChangeAspect="1" noChangeArrowheads="1"/>
+          </p:cNvPicPr>
+          <p:nvPr/>
+        </p:nvPicPr>
+        <p:blipFill>
+          <a:blip r:embed="rId3">
+            <a:extLst>
+              <a:ext uri="{28A0092B-C50C-407E-A947-70E740481C1C}">
+                <a14:useLocalDpi xmlns:a14="http://schemas.microsoft.com/office/drawing/2010/main" val="0"/>
+              </a:ext>
+            </a:extLst>
+          </a:blip>
+          <a:srcRect/>
+          <a:stretch>
+            <a:fillRect/>
+          </a:stretch>
+        </p:blipFill>
+        <p:spPr bwMode="auto">
+          <a:xfrm>
+            <a:off x="2948294" y="1737544"/>
+            <a:ext cx="419830" cy="419830"/>
           </a:xfrm>
           <a:prstGeom prst="rect">
             <a:avLst/>
           </a:prstGeom>
           <a:noFill/>
+          <a:extLst>
+            <a:ext uri="{909E8E84-426E-40DD-AFC4-6F175D3DCCD1}">
+              <a14:hiddenFill xmlns:a14="http://schemas.microsoft.com/office/drawing/2010/main">
+                <a:solidFill>
+                  <a:srgbClr val="FFFFFF"/>
+                </a:solidFill>
+              </a14:hiddenFill>
+            </a:ext>
+          </a:extLst>
         </p:spPr>
-        <p:txBody>
-          <a:bodyPr wrap="square" rtlCol="0">
+      </p:pic>
+      <p:sp>
+        <p:nvSpPr>
+          <p:cNvPr id="21" name="Rectangle 20">
+            <a:extLst>
+              <a:ext uri="{FF2B5EF4-FFF2-40B4-BE49-F238E27FC236}">
+                <a16:creationId xmlns:a16="http://schemas.microsoft.com/office/drawing/2014/main" id="{2B1BC0DB-3D6E-4D38-A9A9-6A515C7614F6}"/>
+              </a:ext>
+            </a:extLst>
+          </p:cNvPr>
+          <p:cNvSpPr/>
+          <p:nvPr/>
+        </p:nvSpPr>
+        <p:spPr>
+          <a:xfrm>
+            <a:off x="3497300" y="3686724"/>
+            <a:ext cx="237566" cy="1477328"/>
+          </a:xfrm>
+          <a:prstGeom prst="rect">
+            <a:avLst/>
+          </a:prstGeom>
+        </p:spPr>
+        <p:txBody>
+          <a:bodyPr wrap="none">
             <a:spAutoFit/>
           </a:bodyPr>
           <a:lstStyle/>
           <a:p>
+            <a:endParaRPr lang="en-US" dirty="0"/>
+          </a:p>
+          <a:p>
             <a:r>
-              <a:rPr lang="en-US" b="1" dirty="0">
-                <a:solidFill>
-                  <a:schemeClr val="accent6">
-                    <a:lumMod val="75000"/>
-                  </a:schemeClr>
-                </a:solidFill>
-              </a:rPr>
-              <a:t>How do the different happiness factors correlate? </a:t>
+              <a:rPr lang="en-US" dirty="0"/>
+              <a:t> </a:t>
             </a:r>
           </a:p>
           <a:p>
+            <a:endParaRPr lang="en-US" dirty="0"/>
+          </a:p>
+          <a:p>
+            <a:endParaRPr lang="en-US" dirty="0"/>
+          </a:p>
+          <a:p>
+            <a:endParaRPr lang="en-US" dirty="0"/>
+          </a:p>
+        </p:txBody>
+      </p:sp>
+      <p:sp>
+        <p:nvSpPr>
+          <p:cNvPr id="22" name="Rectangle 21">
+            <a:extLst>
+              <a:ext uri="{FF2B5EF4-FFF2-40B4-BE49-F238E27FC236}">
+                <a16:creationId xmlns:a16="http://schemas.microsoft.com/office/drawing/2014/main" id="{ACB780E0-D6F2-42C1-AB7E-F236C88B9702}"/>
+              </a:ext>
+            </a:extLst>
+          </p:cNvPr>
+          <p:cNvSpPr/>
+          <p:nvPr/>
+        </p:nvSpPr>
+        <p:spPr>
+          <a:xfrm>
+            <a:off x="3478986" y="1497576"/>
+            <a:ext cx="3073405" cy="2585323"/>
+          </a:xfrm>
+          <a:prstGeom prst="rect">
+            <a:avLst/>
+          </a:prstGeom>
+        </p:spPr>
+        <p:txBody>
+          <a:bodyPr wrap="none">
+            <a:spAutoFit/>
+          </a:bodyPr>
+          <a:lstStyle/>
+          <a:p>
+            <a:endParaRPr lang="en-US" dirty="0"/>
+          </a:p>
+          <a:p>
             <a:r>
-              <a:rPr lang="en-US" sz="1400" dirty="0"/>
-              <a:t>Analyzing household income</a:t>
+              <a:rPr lang="en-US" dirty="0"/>
+              <a:t>Create Pandas </a:t>
             </a:r>
+            <a:r>
+              <a:rPr lang="en-US" dirty="0" err="1"/>
+              <a:t>DataFrames</a:t>
+            </a:r>
+            <a:r>
+              <a:rPr lang="en-US" dirty="0"/>
+              <a:t> for:</a:t>
+            </a:r>
+          </a:p>
+          <a:p>
+            <a:pPr marL="742950" lvl="1" indent="-285750">
+              <a:buFont typeface="Arial" panose="020B0604020202020204" pitchFamily="34" charset="0"/>
+              <a:buChar char="•"/>
+            </a:pPr>
+            <a:r>
+              <a:rPr lang="en-US" dirty="0"/>
+              <a:t>Alcohol data</a:t>
+            </a:r>
+          </a:p>
+          <a:p>
+            <a:pPr marL="742950" lvl="1" indent="-285750">
+              <a:buFont typeface="Arial" panose="020B0604020202020204" pitchFamily="34" charset="0"/>
+              <a:buChar char="•"/>
+            </a:pPr>
+            <a:r>
+              <a:rPr lang="en-US" dirty="0"/>
+              <a:t>Happiness data</a:t>
+            </a:r>
+          </a:p>
+          <a:p>
+            <a:pPr marL="742950" lvl="1" indent="-285750">
+              <a:buFont typeface="Arial" panose="020B0604020202020204" pitchFamily="34" charset="0"/>
+              <a:buChar char="•"/>
+            </a:pPr>
+            <a:r>
+              <a:rPr lang="en-US" dirty="0"/>
+              <a:t>Lat/Long data</a:t>
+            </a:r>
+          </a:p>
+          <a:p>
+            <a:pPr lvl="1"/>
+            <a:r>
+              <a:rPr lang="en-US" dirty="0"/>
+              <a:t> </a:t>
+            </a:r>
+          </a:p>
+          <a:p>
+            <a:endParaRPr lang="en-US" dirty="0"/>
+          </a:p>
+          <a:p>
+            <a:endParaRPr lang="en-US" dirty="0"/>
           </a:p>
           <a:p>
             <a:endParaRPr lang="en-US" dirty="0"/>
@@ -11813,149 +13776,13 @@
     </p:spTree>
     <p:extLst>
       <p:ext uri="{BB962C8B-B14F-4D97-AF65-F5344CB8AC3E}">
-        <p14:creationId xmlns:p14="http://schemas.microsoft.com/office/powerpoint/2010/main" val="551049074"/>
+        <p14:creationId xmlns:p14="http://schemas.microsoft.com/office/powerpoint/2010/main" val="81612011"/>
       </p:ext>
     </p:extLst>
   </p:cSld>
   <p:clrMapOvr>
     <a:masterClrMapping/>
   </p:clrMapOvr>
-  <p:timing>
-    <p:tnLst>
-      <p:par>
-        <p:cTn id="1" dur="indefinite" restart="never" nodeType="tmRoot">
-          <p:childTnLst>
-            <p:seq concurrent="1" nextAc="seek">
-              <p:cTn id="2" dur="indefinite" nodeType="mainSeq">
-                <p:childTnLst>
-                  <p:par>
-                    <p:cTn id="3" fill="hold">
-                      <p:stCondLst>
-                        <p:cond delay="indefinite"/>
-                      </p:stCondLst>
-                      <p:childTnLst>
-                        <p:par>
-                          <p:cTn id="4" fill="hold">
-                            <p:stCondLst>
-                              <p:cond delay="0"/>
-                            </p:stCondLst>
-                            <p:childTnLst>
-                              <p:par>
-                                <p:cTn id="5" presetID="9" presetClass="entr" presetSubtype="0" fill="hold" nodeType="clickEffect">
-                                  <p:stCondLst>
-                                    <p:cond delay="0"/>
-                                  </p:stCondLst>
-                                  <p:childTnLst>
-                                    <p:set>
-                                      <p:cBhvr>
-                                        <p:cTn id="6" dur="1" fill="hold">
-                                          <p:stCondLst>
-                                            <p:cond delay="0"/>
-                                          </p:stCondLst>
-                                        </p:cTn>
-                                        <p:tgtEl>
-                                          <p:spTgt spid="9"/>
-                                        </p:tgtEl>
-                                        <p:attrNameLst>
-                                          <p:attrName>style.visibility</p:attrName>
-                                        </p:attrNameLst>
-                                      </p:cBhvr>
-                                      <p:to>
-                                        <p:strVal val="visible"/>
-                                      </p:to>
-                                    </p:set>
-                                    <p:animEffect transition="in" filter="dissolve">
-                                      <p:cBhvr>
-                                        <p:cTn id="7" dur="500"/>
-                                        <p:tgtEl>
-                                          <p:spTgt spid="9"/>
-                                        </p:tgtEl>
-                                      </p:cBhvr>
-                                    </p:animEffect>
-                                  </p:childTnLst>
-                                </p:cTn>
-                              </p:par>
-                            </p:childTnLst>
-                          </p:cTn>
-                        </p:par>
-                      </p:childTnLst>
-                    </p:cTn>
-                  </p:par>
-                  <p:par>
-                    <p:cTn id="8" fill="hold">
-                      <p:stCondLst>
-                        <p:cond delay="indefinite"/>
-                      </p:stCondLst>
-                      <p:childTnLst>
-                        <p:par>
-                          <p:cTn id="9" fill="hold">
-                            <p:stCondLst>
-                              <p:cond delay="0"/>
-                            </p:stCondLst>
-                            <p:childTnLst>
-                              <p:par>
-                                <p:cTn id="10" presetID="9" presetClass="entr" presetSubtype="0" fill="hold" nodeType="clickEffect">
-                                  <p:stCondLst>
-                                    <p:cond delay="0"/>
-                                  </p:stCondLst>
-                                  <p:childTnLst>
-                                    <p:set>
-                                      <p:cBhvr>
-                                        <p:cTn id="11" dur="1" fill="hold">
-                                          <p:stCondLst>
-                                            <p:cond delay="0"/>
-                                          </p:stCondLst>
-                                        </p:cTn>
-                                        <p:tgtEl>
-                                          <p:spTgt spid="10"/>
-                                        </p:tgtEl>
-                                        <p:attrNameLst>
-                                          <p:attrName>style.visibility</p:attrName>
-                                        </p:attrNameLst>
-                                      </p:cBhvr>
-                                      <p:to>
-                                        <p:strVal val="visible"/>
-                                      </p:to>
-                                    </p:set>
-                                    <p:animEffect transition="in" filter="dissolve">
-                                      <p:cBhvr>
-                                        <p:cTn id="12" dur="500"/>
-                                        <p:tgtEl>
-                                          <p:spTgt spid="10"/>
-                                        </p:tgtEl>
-                                      </p:cBhvr>
-                                    </p:animEffect>
-                                  </p:childTnLst>
-                                </p:cTn>
-                              </p:par>
-                            </p:childTnLst>
-                          </p:cTn>
-                        </p:par>
-                      </p:childTnLst>
-                    </p:cTn>
-                  </p:par>
-                </p:childTnLst>
-              </p:cTn>
-              <p:prevCondLst>
-                <p:cond evt="onPrev" delay="0">
-                  <p:tgtEl>
-                    <p:sldTgt/>
-                  </p:tgtEl>
-                </p:cond>
-              </p:prevCondLst>
-              <p:nextCondLst>
-                <p:cond evt="onNext" delay="0">
-                  <p:tgtEl>
-                    <p:sldTgt/>
-                  </p:tgtEl>
-                </p:cond>
-              </p:nextCondLst>
-            </p:seq>
-          </p:childTnLst>
-        </p:cTn>
-      </p:par>
-    </p:tnLst>
-  </p:timing>
 </p:sld>
 </file>
 

</xml_diff>